<commit_message>
update CRL, OCSP figure
</commit_message>
<xml_diff>
--- a/Part1.Technology/Chapter2.Protocol/Protocol-fig-jp.pptx
+++ b/Part1.Technology/Chapter2.Protocol/Protocol-fig-jp.pptx
@@ -5,7 +5,7 @@
     <p:sldMasterId id="2147483648" r:id="rId1"/>
   </p:sldMasterIdLst>
   <p:notesMasterIdLst>
-    <p:notesMasterId r:id="rId12"/>
+    <p:notesMasterId r:id="rId13"/>
   </p:notesMasterIdLst>
   <p:sldIdLst>
     <p:sldId id="256" r:id="rId2"/>
@@ -18,6 +18,7 @@
     <p:sldId id="295" r:id="rId9"/>
     <p:sldId id="296" r:id="rId10"/>
     <p:sldId id="297" r:id="rId11"/>
+    <p:sldId id="301" r:id="rId12"/>
   </p:sldIdLst>
   <p:sldSz cx="12192000" cy="6858000"/>
   <p:notesSz cx="6858000" cy="9144000"/>
@@ -206,7 +207,7 @@
           <a:p>
             <a:fld id="{617CFC61-3C37-7545-B654-BD5914A64BC5}" type="datetimeFigureOut">
               <a:rPr kumimoji="1" lang="ja-JP" altLang="en-US" smtClean="0"/>
-              <a:t>2021/3/21</a:t>
+              <a:t>2021/5/27</a:t>
             </a:fld>
             <a:endParaRPr kumimoji="1" lang="ja-JP" altLang="en-US"/>
           </a:p>
@@ -736,7 +737,7 @@
           <a:p>
             <a:fld id="{C1D19383-95FF-457C-891A-BBD76E494015}" type="datetimeFigureOut">
               <a:rPr kumimoji="1" lang="ja-JP" altLang="en-US" smtClean="0"/>
-              <a:t>2021/3/21</a:t>
+              <a:t>2021/5/27</a:t>
             </a:fld>
             <a:endParaRPr kumimoji="1" lang="ja-JP" altLang="en-US"/>
           </a:p>
@@ -966,7 +967,7 @@
           <a:p>
             <a:fld id="{C1D19383-95FF-457C-891A-BBD76E494015}" type="datetimeFigureOut">
               <a:rPr kumimoji="1" lang="ja-JP" altLang="en-US" smtClean="0"/>
-              <a:t>2021/3/21</a:t>
+              <a:t>2021/5/27</a:t>
             </a:fld>
             <a:endParaRPr kumimoji="1" lang="ja-JP" altLang="en-US"/>
           </a:p>
@@ -1206,7 +1207,7 @@
           <a:p>
             <a:fld id="{C1D19383-95FF-457C-891A-BBD76E494015}" type="datetimeFigureOut">
               <a:rPr kumimoji="1" lang="ja-JP" altLang="en-US" smtClean="0"/>
-              <a:t>2021/3/21</a:t>
+              <a:t>2021/5/27</a:t>
             </a:fld>
             <a:endParaRPr kumimoji="1" lang="ja-JP" altLang="en-US"/>
           </a:p>
@@ -1436,7 +1437,7 @@
           <a:p>
             <a:fld id="{C1D19383-95FF-457C-891A-BBD76E494015}" type="datetimeFigureOut">
               <a:rPr kumimoji="1" lang="ja-JP" altLang="en-US" smtClean="0"/>
-              <a:t>2021/3/21</a:t>
+              <a:t>2021/5/27</a:t>
             </a:fld>
             <a:endParaRPr kumimoji="1" lang="ja-JP" altLang="en-US"/>
           </a:p>
@@ -1711,7 +1712,7 @@
           <a:p>
             <a:fld id="{C1D19383-95FF-457C-891A-BBD76E494015}" type="datetimeFigureOut">
               <a:rPr kumimoji="1" lang="ja-JP" altLang="en-US" smtClean="0"/>
-              <a:t>2021/3/21</a:t>
+              <a:t>2021/5/27</a:t>
             </a:fld>
             <a:endParaRPr kumimoji="1" lang="ja-JP" altLang="en-US"/>
           </a:p>
@@ -2040,7 +2041,7 @@
           <a:p>
             <a:fld id="{C1D19383-95FF-457C-891A-BBD76E494015}" type="datetimeFigureOut">
               <a:rPr kumimoji="1" lang="ja-JP" altLang="en-US" smtClean="0"/>
-              <a:t>2021/3/21</a:t>
+              <a:t>2021/5/27</a:t>
             </a:fld>
             <a:endParaRPr kumimoji="1" lang="ja-JP" altLang="en-US"/>
           </a:p>
@@ -2516,7 +2517,7 @@
           <a:p>
             <a:fld id="{C1D19383-95FF-457C-891A-BBD76E494015}" type="datetimeFigureOut">
               <a:rPr kumimoji="1" lang="ja-JP" altLang="en-US" smtClean="0"/>
-              <a:t>2021/3/21</a:t>
+              <a:t>2021/5/27</a:t>
             </a:fld>
             <a:endParaRPr kumimoji="1" lang="ja-JP" altLang="en-US"/>
           </a:p>
@@ -2657,7 +2658,7 @@
           <a:p>
             <a:fld id="{C1D19383-95FF-457C-891A-BBD76E494015}" type="datetimeFigureOut">
               <a:rPr kumimoji="1" lang="ja-JP" altLang="en-US" smtClean="0"/>
-              <a:t>2021/3/21</a:t>
+              <a:t>2021/5/27</a:t>
             </a:fld>
             <a:endParaRPr kumimoji="1" lang="ja-JP" altLang="en-US"/>
           </a:p>
@@ -2770,7 +2771,7 @@
           <a:p>
             <a:fld id="{C1D19383-95FF-457C-891A-BBD76E494015}" type="datetimeFigureOut">
               <a:rPr kumimoji="1" lang="ja-JP" altLang="en-US" smtClean="0"/>
-              <a:t>2021/3/21</a:t>
+              <a:t>2021/5/27</a:t>
             </a:fld>
             <a:endParaRPr kumimoji="1" lang="ja-JP" altLang="en-US"/>
           </a:p>
@@ -3113,7 +3114,7 @@
           <a:p>
             <a:fld id="{C1D19383-95FF-457C-891A-BBD76E494015}" type="datetimeFigureOut">
               <a:rPr kumimoji="1" lang="ja-JP" altLang="en-US" smtClean="0"/>
-              <a:t>2021/3/21</a:t>
+              <a:t>2021/5/27</a:t>
             </a:fld>
             <a:endParaRPr kumimoji="1" lang="ja-JP" altLang="en-US"/>
           </a:p>
@@ -3401,7 +3402,7 @@
           <a:p>
             <a:fld id="{C1D19383-95FF-457C-891A-BBD76E494015}" type="datetimeFigureOut">
               <a:rPr kumimoji="1" lang="ja-JP" altLang="en-US" smtClean="0"/>
-              <a:t>2021/3/21</a:t>
+              <a:t>2021/5/27</a:t>
             </a:fld>
             <a:endParaRPr kumimoji="1" lang="ja-JP" altLang="en-US"/>
           </a:p>
@@ -3674,7 +3675,7 @@
           <a:p>
             <a:fld id="{C1D19383-95FF-457C-891A-BBD76E494015}" type="datetimeFigureOut">
               <a:rPr kumimoji="1" lang="ja-JP" altLang="en-US" smtClean="0"/>
-              <a:t>2021/3/21</a:t>
+              <a:t>2021/5/27</a:t>
             </a:fld>
             <a:endParaRPr kumimoji="1" lang="ja-JP" altLang="en-US"/>
           </a:p>
@@ -7320,6 +7321,1928 @@
 </p:sld>
 </file>
 
+<file path=ppt/slides/slide11.xml><?xml version="1.0" encoding="utf-8"?>
+<p:sld xmlns:a="http://schemas.openxmlformats.org/drawingml/2006/main" xmlns:r="http://schemas.openxmlformats.org/officeDocument/2006/relationships" xmlns:p="http://schemas.openxmlformats.org/presentationml/2006/main">
+  <p:cSld>
+    <p:spTree>
+      <p:nvGrpSpPr>
+        <p:cNvPr id="1" name=""/>
+        <p:cNvGrpSpPr/>
+        <p:nvPr/>
+      </p:nvGrpSpPr>
+      <p:grpSpPr>
+        <a:xfrm>
+          <a:off x="0" y="0"/>
+          <a:ext cx="0" cy="0"/>
+          <a:chOff x="0" y="0"/>
+          <a:chExt cx="0" cy="0"/>
+        </a:xfrm>
+      </p:grpSpPr>
+      <p:grpSp>
+        <p:nvGrpSpPr>
+          <p:cNvPr id="58" name="グループ化 57">
+            <a:extLst>
+              <a:ext uri="{FF2B5EF4-FFF2-40B4-BE49-F238E27FC236}">
+                <a16:creationId xmlns:a16="http://schemas.microsoft.com/office/drawing/2014/main" id="{9D5A9A2D-B096-124A-A7D7-D57E00DA1881}"/>
+              </a:ext>
+            </a:extLst>
+          </p:cNvPr>
+          <p:cNvGrpSpPr/>
+          <p:nvPr/>
+        </p:nvGrpSpPr>
+        <p:grpSpPr>
+          <a:xfrm>
+            <a:off x="-364241" y="94954"/>
+            <a:ext cx="12472725" cy="5903913"/>
+            <a:chOff x="-599711" y="-930117"/>
+            <a:chExt cx="12472725" cy="7716064"/>
+          </a:xfrm>
+        </p:grpSpPr>
+        <p:sp>
+          <p:nvSpPr>
+            <p:cNvPr id="4" name="正方形/長方形 3">
+              <a:extLst>
+                <a:ext uri="{FF2B5EF4-FFF2-40B4-BE49-F238E27FC236}">
+                  <a16:creationId xmlns:a16="http://schemas.microsoft.com/office/drawing/2014/main" id="{0D993353-C7BA-154F-9AC3-D4C6EEA9E4FC}"/>
+                </a:ext>
+              </a:extLst>
+            </p:cNvPr>
+            <p:cNvSpPr/>
+            <p:nvPr/>
+          </p:nvSpPr>
+          <p:spPr>
+            <a:xfrm>
+              <a:off x="7877908" y="46226"/>
+              <a:ext cx="3245617" cy="610437"/>
+            </a:xfrm>
+            <a:prstGeom prst="rect">
+              <a:avLst/>
+            </a:prstGeom>
+            <a:noFill/>
+            <a:ln w="19050">
+              <a:solidFill>
+                <a:schemeClr val="tx1"/>
+              </a:solidFill>
+            </a:ln>
+          </p:spPr>
+          <p:style>
+            <a:lnRef idx="2">
+              <a:schemeClr val="accent1">
+                <a:shade val="50000"/>
+              </a:schemeClr>
+            </a:lnRef>
+            <a:fillRef idx="1">
+              <a:schemeClr val="accent1"/>
+            </a:fillRef>
+            <a:effectRef idx="0">
+              <a:schemeClr val="accent1"/>
+            </a:effectRef>
+            <a:fontRef idx="minor">
+              <a:schemeClr val="lt1"/>
+            </a:fontRef>
+          </p:style>
+          <p:txBody>
+            <a:bodyPr rtlCol="0" anchor="ctr"/>
+            <a:lstStyle/>
+            <a:p>
+              <a:pPr algn="ctr"/>
+              <a:endParaRPr kumimoji="1" lang="ja-JP" altLang="en-US" sz="1600"/>
+            </a:p>
+          </p:txBody>
+        </p:sp>
+        <p:sp>
+          <p:nvSpPr>
+            <p:cNvPr id="5" name="テキスト ボックス 4">
+              <a:extLst>
+                <a:ext uri="{FF2B5EF4-FFF2-40B4-BE49-F238E27FC236}">
+                  <a16:creationId xmlns:a16="http://schemas.microsoft.com/office/drawing/2014/main" id="{5861387C-F71C-5743-865A-93A2CCD2DFE8}"/>
+                </a:ext>
+              </a:extLst>
+            </p:cNvPr>
+            <p:cNvSpPr txBox="1"/>
+            <p:nvPr/>
+          </p:nvSpPr>
+          <p:spPr>
+            <a:xfrm>
+              <a:off x="8428146" y="166780"/>
+              <a:ext cx="2137124" cy="405847"/>
+            </a:xfrm>
+            <a:prstGeom prst="rect">
+              <a:avLst/>
+            </a:prstGeom>
+            <a:noFill/>
+          </p:spPr>
+          <p:txBody>
+            <a:bodyPr wrap="square" rtlCol="0">
+              <a:spAutoFit/>
+            </a:bodyPr>
+            <a:lstStyle/>
+            <a:p>
+              <a:r>
+                <a:rPr kumimoji="1" lang="en-US" altLang="ja-JP" sz="1600" dirty="0"/>
+                <a:t>Pre-master Secret</a:t>
+              </a:r>
+              <a:endParaRPr kumimoji="1" lang="ja-JP" altLang="en-US" sz="1600"/>
+            </a:p>
+          </p:txBody>
+        </p:sp>
+        <p:sp>
+          <p:nvSpPr>
+            <p:cNvPr id="6" name="正方形/長方形 5">
+              <a:extLst>
+                <a:ext uri="{FF2B5EF4-FFF2-40B4-BE49-F238E27FC236}">
+                  <a16:creationId xmlns:a16="http://schemas.microsoft.com/office/drawing/2014/main" id="{25FFDC74-D195-E14F-ACA7-0F993576619C}"/>
+                </a:ext>
+              </a:extLst>
+            </p:cNvPr>
+            <p:cNvSpPr/>
+            <p:nvPr/>
+          </p:nvSpPr>
+          <p:spPr>
+            <a:xfrm>
+              <a:off x="7877908" y="1494006"/>
+              <a:ext cx="3245617" cy="610438"/>
+            </a:xfrm>
+            <a:prstGeom prst="rect">
+              <a:avLst/>
+            </a:prstGeom>
+            <a:noFill/>
+            <a:ln w="19050">
+              <a:solidFill>
+                <a:schemeClr val="tx1"/>
+              </a:solidFill>
+            </a:ln>
+          </p:spPr>
+          <p:style>
+            <a:lnRef idx="2">
+              <a:schemeClr val="accent1">
+                <a:shade val="50000"/>
+              </a:schemeClr>
+            </a:lnRef>
+            <a:fillRef idx="1">
+              <a:schemeClr val="accent1"/>
+            </a:fillRef>
+            <a:effectRef idx="0">
+              <a:schemeClr val="accent1"/>
+            </a:effectRef>
+            <a:fontRef idx="minor">
+              <a:schemeClr val="lt1"/>
+            </a:fontRef>
+          </p:style>
+          <p:txBody>
+            <a:bodyPr rtlCol="0" anchor="ctr"/>
+            <a:lstStyle/>
+            <a:p>
+              <a:pPr algn="ctr"/>
+              <a:endParaRPr kumimoji="1" lang="ja-JP" altLang="en-US" sz="1600"/>
+            </a:p>
+          </p:txBody>
+        </p:sp>
+        <p:sp>
+          <p:nvSpPr>
+            <p:cNvPr id="7" name="テキスト ボックス 6">
+              <a:extLst>
+                <a:ext uri="{FF2B5EF4-FFF2-40B4-BE49-F238E27FC236}">
+                  <a16:creationId xmlns:a16="http://schemas.microsoft.com/office/drawing/2014/main" id="{F65CC9C4-FCB9-2D46-9861-B60C029A3794}"/>
+                </a:ext>
+              </a:extLst>
+            </p:cNvPr>
+            <p:cNvSpPr txBox="1"/>
+            <p:nvPr/>
+          </p:nvSpPr>
+          <p:spPr>
+            <a:xfrm>
+              <a:off x="8023635" y="1520772"/>
+              <a:ext cx="2710999" cy="627219"/>
+            </a:xfrm>
+            <a:prstGeom prst="rect">
+              <a:avLst/>
+            </a:prstGeom>
+            <a:noFill/>
+          </p:spPr>
+          <p:txBody>
+            <a:bodyPr wrap="square" rtlCol="0">
+              <a:spAutoFit/>
+            </a:bodyPr>
+            <a:lstStyle/>
+            <a:p>
+              <a:r>
+                <a:rPr lang="en-US" altLang="ja-JP" sz="1400" dirty="0"/>
+                <a:t>Resumption Master Secret</a:t>
+              </a:r>
+            </a:p>
+            <a:p>
+              <a:r>
+                <a:rPr kumimoji="1" lang="en-US" altLang="ja-JP" sz="1400" dirty="0"/>
+                <a:t>Ticket Nonce</a:t>
+              </a:r>
+              <a:endParaRPr kumimoji="1" lang="ja-JP" altLang="en-US" sz="1400"/>
+            </a:p>
+          </p:txBody>
+        </p:sp>
+        <p:cxnSp>
+          <p:nvCxnSpPr>
+            <p:cNvPr id="10" name="直線コネクタ 9">
+              <a:extLst>
+                <a:ext uri="{FF2B5EF4-FFF2-40B4-BE49-F238E27FC236}">
+                  <a16:creationId xmlns:a16="http://schemas.microsoft.com/office/drawing/2014/main" id="{43CA705A-B93B-8546-9D40-AADF3EFAE84E}"/>
+                </a:ext>
+              </a:extLst>
+            </p:cNvPr>
+            <p:cNvCxnSpPr>
+              <a:stCxn id="4" idx="2"/>
+              <a:endCxn id="6" idx="0"/>
+            </p:cNvCxnSpPr>
+            <p:nvPr/>
+          </p:nvCxnSpPr>
+          <p:spPr>
+            <a:xfrm>
+              <a:off x="9500717" y="656663"/>
+              <a:ext cx="0" cy="837342"/>
+            </a:xfrm>
+            <a:prstGeom prst="line">
+              <a:avLst/>
+            </a:prstGeom>
+            <a:ln w="19050">
+              <a:solidFill>
+                <a:schemeClr val="tx1"/>
+              </a:solidFill>
+              <a:headEnd type="none" w="med" len="med"/>
+              <a:tailEnd type="arrow" w="med" len="med"/>
+            </a:ln>
+          </p:spPr>
+          <p:style>
+            <a:lnRef idx="1">
+              <a:schemeClr val="accent1"/>
+            </a:lnRef>
+            <a:fillRef idx="0">
+              <a:schemeClr val="accent1"/>
+            </a:fillRef>
+            <a:effectRef idx="0">
+              <a:schemeClr val="accent1"/>
+            </a:effectRef>
+            <a:fontRef idx="minor">
+              <a:schemeClr val="tx1"/>
+            </a:fontRef>
+          </p:style>
+        </p:cxnSp>
+        <p:cxnSp>
+          <p:nvCxnSpPr>
+            <p:cNvPr id="11" name="直線コネクタ 10">
+              <a:extLst>
+                <a:ext uri="{FF2B5EF4-FFF2-40B4-BE49-F238E27FC236}">
+                  <a16:creationId xmlns:a16="http://schemas.microsoft.com/office/drawing/2014/main" id="{ECEF93A6-C4FB-C141-8900-981EBFBEA63A}"/>
+                </a:ext>
+              </a:extLst>
+            </p:cNvPr>
+            <p:cNvCxnSpPr>
+              <a:cxnSpLocks/>
+              <a:stCxn id="6" idx="1"/>
+            </p:cNvCxnSpPr>
+            <p:nvPr/>
+          </p:nvCxnSpPr>
+          <p:spPr>
+            <a:xfrm flipH="1">
+              <a:off x="4152975" y="1799225"/>
+              <a:ext cx="3724933" cy="0"/>
+            </a:xfrm>
+            <a:prstGeom prst="line">
+              <a:avLst/>
+            </a:prstGeom>
+            <a:ln w="19050">
+              <a:solidFill>
+                <a:schemeClr val="tx1"/>
+              </a:solidFill>
+              <a:headEnd type="none" w="med" len="med"/>
+              <a:tailEnd type="arrow" w="med" len="med"/>
+            </a:ln>
+          </p:spPr>
+          <p:style>
+            <a:lnRef idx="1">
+              <a:schemeClr val="accent1"/>
+            </a:lnRef>
+            <a:fillRef idx="0">
+              <a:schemeClr val="accent1"/>
+            </a:fillRef>
+            <a:effectRef idx="0">
+              <a:schemeClr val="accent1"/>
+            </a:effectRef>
+            <a:fontRef idx="minor">
+              <a:schemeClr val="tx1"/>
+            </a:fontRef>
+          </p:style>
+        </p:cxnSp>
+        <p:sp>
+          <p:nvSpPr>
+            <p:cNvPr id="14" name="正方形/長方形 13">
+              <a:extLst>
+                <a:ext uri="{FF2B5EF4-FFF2-40B4-BE49-F238E27FC236}">
+                  <a16:creationId xmlns:a16="http://schemas.microsoft.com/office/drawing/2014/main" id="{9477197E-5D68-7646-8F1F-23BF1F2A9316}"/>
+                </a:ext>
+              </a:extLst>
+            </p:cNvPr>
+            <p:cNvSpPr/>
+            <p:nvPr/>
+          </p:nvSpPr>
+          <p:spPr>
+            <a:xfrm>
+              <a:off x="907359" y="1494006"/>
+              <a:ext cx="3245617" cy="610438"/>
+            </a:xfrm>
+            <a:prstGeom prst="rect">
+              <a:avLst/>
+            </a:prstGeom>
+            <a:noFill/>
+            <a:ln w="19050">
+              <a:solidFill>
+                <a:schemeClr val="tx1"/>
+              </a:solidFill>
+            </a:ln>
+          </p:spPr>
+          <p:style>
+            <a:lnRef idx="2">
+              <a:schemeClr val="accent1">
+                <a:shade val="50000"/>
+              </a:schemeClr>
+            </a:lnRef>
+            <a:fillRef idx="1">
+              <a:schemeClr val="accent1"/>
+            </a:fillRef>
+            <a:effectRef idx="0">
+              <a:schemeClr val="accent1"/>
+            </a:effectRef>
+            <a:fontRef idx="minor">
+              <a:schemeClr val="lt1"/>
+            </a:fontRef>
+          </p:style>
+          <p:txBody>
+            <a:bodyPr rtlCol="0" anchor="ctr"/>
+            <a:lstStyle/>
+            <a:p>
+              <a:pPr algn="ctr"/>
+              <a:endParaRPr kumimoji="1" lang="ja-JP" altLang="en-US" sz="1600"/>
+            </a:p>
+          </p:txBody>
+        </p:sp>
+        <p:sp>
+          <p:nvSpPr>
+            <p:cNvPr id="15" name="テキスト ボックス 14">
+              <a:extLst>
+                <a:ext uri="{FF2B5EF4-FFF2-40B4-BE49-F238E27FC236}">
+                  <a16:creationId xmlns:a16="http://schemas.microsoft.com/office/drawing/2014/main" id="{5B655627-D378-5D41-BE6F-C2276B9949BB}"/>
+                </a:ext>
+              </a:extLst>
+            </p:cNvPr>
+            <p:cNvSpPr txBox="1"/>
+            <p:nvPr/>
+          </p:nvSpPr>
+          <p:spPr>
+            <a:xfrm>
+              <a:off x="1068475" y="1503759"/>
+              <a:ext cx="2710999" cy="627219"/>
+            </a:xfrm>
+            <a:prstGeom prst="rect">
+              <a:avLst/>
+            </a:prstGeom>
+            <a:noFill/>
+          </p:spPr>
+          <p:txBody>
+            <a:bodyPr wrap="square" rtlCol="0">
+              <a:spAutoFit/>
+            </a:bodyPr>
+            <a:lstStyle/>
+            <a:p>
+              <a:r>
+                <a:rPr lang="en-US" altLang="ja-JP" sz="1400" dirty="0"/>
+                <a:t>Resumption Master Secret</a:t>
+              </a:r>
+            </a:p>
+            <a:p>
+              <a:r>
+                <a:rPr kumimoji="1" lang="en-US" altLang="ja-JP" sz="1400" dirty="0"/>
+                <a:t>Ticket Nonce</a:t>
+              </a:r>
+              <a:endParaRPr kumimoji="1" lang="ja-JP" altLang="en-US" sz="1400"/>
+            </a:p>
+          </p:txBody>
+        </p:sp>
+        <p:cxnSp>
+          <p:nvCxnSpPr>
+            <p:cNvPr id="19" name="直線コネクタ 18">
+              <a:extLst>
+                <a:ext uri="{FF2B5EF4-FFF2-40B4-BE49-F238E27FC236}">
+                  <a16:creationId xmlns:a16="http://schemas.microsoft.com/office/drawing/2014/main" id="{D30A0325-BF38-2646-8F2D-7E0B0D416976}"/>
+                </a:ext>
+              </a:extLst>
+            </p:cNvPr>
+            <p:cNvCxnSpPr>
+              <a:cxnSpLocks/>
+            </p:cNvCxnSpPr>
+            <p:nvPr/>
+          </p:nvCxnSpPr>
+          <p:spPr>
+            <a:xfrm>
+              <a:off x="662552" y="2601440"/>
+              <a:ext cx="11143621" cy="0"/>
+            </a:xfrm>
+            <a:prstGeom prst="line">
+              <a:avLst/>
+            </a:prstGeom>
+            <a:ln w="19050">
+              <a:solidFill>
+                <a:schemeClr val="tx1"/>
+              </a:solidFill>
+              <a:prstDash val="dash"/>
+            </a:ln>
+          </p:spPr>
+          <p:style>
+            <a:lnRef idx="1">
+              <a:schemeClr val="accent1"/>
+            </a:lnRef>
+            <a:fillRef idx="0">
+              <a:schemeClr val="accent1"/>
+            </a:fillRef>
+            <a:effectRef idx="0">
+              <a:schemeClr val="accent1"/>
+            </a:effectRef>
+            <a:fontRef idx="minor">
+              <a:schemeClr val="tx1"/>
+            </a:fontRef>
+          </p:style>
+        </p:cxnSp>
+        <p:sp>
+          <p:nvSpPr>
+            <p:cNvPr id="21" name="テキスト ボックス 20">
+              <a:extLst>
+                <a:ext uri="{FF2B5EF4-FFF2-40B4-BE49-F238E27FC236}">
+                  <a16:creationId xmlns:a16="http://schemas.microsoft.com/office/drawing/2014/main" id="{B3568664-12C9-7142-BA8D-36B75668C681}"/>
+                </a:ext>
+              </a:extLst>
+            </p:cNvPr>
+            <p:cNvSpPr txBox="1"/>
+            <p:nvPr/>
+          </p:nvSpPr>
+          <p:spPr>
+            <a:xfrm>
+              <a:off x="-599711" y="2633926"/>
+              <a:ext cx="3405217" cy="774800"/>
+            </a:xfrm>
+            <a:prstGeom prst="rect">
+              <a:avLst/>
+            </a:prstGeom>
+            <a:noFill/>
+          </p:spPr>
+          <p:txBody>
+            <a:bodyPr wrap="square" rtlCol="0">
+              <a:spAutoFit/>
+            </a:bodyPr>
+            <a:lstStyle/>
+            <a:p>
+              <a:pPr algn="ctr"/>
+              <a:r>
+                <a:rPr lang="en-US" altLang="ja-JP" b="1" dirty="0"/>
+                <a:t>Session Resumption</a:t>
+              </a:r>
+            </a:p>
+            <a:p>
+              <a:pPr algn="ctr"/>
+              <a:r>
+                <a:rPr lang="en-US" altLang="ja-JP" b="1" dirty="0"/>
+                <a:t>by PSK</a:t>
+              </a:r>
+              <a:endParaRPr kumimoji="1" lang="ja-JP" altLang="en-US" b="1"/>
+            </a:p>
+          </p:txBody>
+        </p:sp>
+        <p:sp>
+          <p:nvSpPr>
+            <p:cNvPr id="22" name="テキスト ボックス 21">
+              <a:extLst>
+                <a:ext uri="{FF2B5EF4-FFF2-40B4-BE49-F238E27FC236}">
+                  <a16:creationId xmlns:a16="http://schemas.microsoft.com/office/drawing/2014/main" id="{8A849E41-1D65-2344-9C85-815A58240083}"/>
+                </a:ext>
+              </a:extLst>
+            </p:cNvPr>
+            <p:cNvSpPr txBox="1"/>
+            <p:nvPr/>
+          </p:nvSpPr>
+          <p:spPr>
+            <a:xfrm>
+              <a:off x="-160760" y="-930117"/>
+              <a:ext cx="2629305" cy="442743"/>
+            </a:xfrm>
+            <a:prstGeom prst="rect">
+              <a:avLst/>
+            </a:prstGeom>
+            <a:noFill/>
+          </p:spPr>
+          <p:txBody>
+            <a:bodyPr wrap="square" rtlCol="0">
+              <a:spAutoFit/>
+            </a:bodyPr>
+            <a:lstStyle/>
+            <a:p>
+              <a:pPr algn="ctr"/>
+              <a:r>
+                <a:rPr kumimoji="1" lang="en-US" altLang="ja-JP" b="1" dirty="0"/>
+                <a:t>Secure Session</a:t>
+              </a:r>
+              <a:endParaRPr kumimoji="1" lang="ja-JP" altLang="en-US" b="1" dirty="0"/>
+            </a:p>
+          </p:txBody>
+        </p:sp>
+        <p:sp>
+          <p:nvSpPr>
+            <p:cNvPr id="23" name="テキスト ボックス 22">
+              <a:extLst>
+                <a:ext uri="{FF2B5EF4-FFF2-40B4-BE49-F238E27FC236}">
+                  <a16:creationId xmlns:a16="http://schemas.microsoft.com/office/drawing/2014/main" id="{51A93459-092D-484C-A140-92FD8DE38C3B}"/>
+                </a:ext>
+              </a:extLst>
+            </p:cNvPr>
+            <p:cNvSpPr txBox="1"/>
+            <p:nvPr/>
+          </p:nvSpPr>
+          <p:spPr>
+            <a:xfrm>
+              <a:off x="5214009" y="3162809"/>
+              <a:ext cx="1508746" cy="405847"/>
+            </a:xfrm>
+            <a:prstGeom prst="rect">
+              <a:avLst/>
+            </a:prstGeom>
+            <a:noFill/>
+          </p:spPr>
+          <p:txBody>
+            <a:bodyPr wrap="square" rtlCol="0">
+              <a:spAutoFit/>
+            </a:bodyPr>
+            <a:lstStyle/>
+            <a:p>
+              <a:r>
+                <a:rPr lang="en-US" altLang="ja-JP" sz="1600" dirty="0"/>
+                <a:t>PSK Identity</a:t>
+              </a:r>
+              <a:endParaRPr kumimoji="1" lang="ja-JP" altLang="en-US" sz="1600"/>
+            </a:p>
+          </p:txBody>
+        </p:sp>
+        <p:cxnSp>
+          <p:nvCxnSpPr>
+            <p:cNvPr id="25" name="直線コネクタ 24">
+              <a:extLst>
+                <a:ext uri="{FF2B5EF4-FFF2-40B4-BE49-F238E27FC236}">
+                  <a16:creationId xmlns:a16="http://schemas.microsoft.com/office/drawing/2014/main" id="{7D711540-ECC5-184B-9A10-5755D0E5F6C8}"/>
+                </a:ext>
+              </a:extLst>
+            </p:cNvPr>
+            <p:cNvCxnSpPr>
+              <a:cxnSpLocks/>
+            </p:cNvCxnSpPr>
+            <p:nvPr/>
+          </p:nvCxnSpPr>
+          <p:spPr>
+            <a:xfrm>
+              <a:off x="2468546" y="2104444"/>
+              <a:ext cx="0" cy="2319495"/>
+            </a:xfrm>
+            <a:prstGeom prst="line">
+              <a:avLst/>
+            </a:prstGeom>
+            <a:ln w="19050">
+              <a:solidFill>
+                <a:schemeClr val="tx1"/>
+              </a:solidFill>
+              <a:headEnd type="none" w="med" len="med"/>
+              <a:tailEnd type="arrow" w="med" len="med"/>
+            </a:ln>
+          </p:spPr>
+          <p:style>
+            <a:lnRef idx="1">
+              <a:schemeClr val="accent1"/>
+            </a:lnRef>
+            <a:fillRef idx="0">
+              <a:schemeClr val="accent1"/>
+            </a:fillRef>
+            <a:effectRef idx="0">
+              <a:schemeClr val="accent1"/>
+            </a:effectRef>
+            <a:fontRef idx="minor">
+              <a:schemeClr val="tx1"/>
+            </a:fontRef>
+          </p:style>
+        </p:cxnSp>
+        <p:sp>
+          <p:nvSpPr>
+            <p:cNvPr id="28" name="テキスト ボックス 27">
+              <a:extLst>
+                <a:ext uri="{FF2B5EF4-FFF2-40B4-BE49-F238E27FC236}">
+                  <a16:creationId xmlns:a16="http://schemas.microsoft.com/office/drawing/2014/main" id="{44ECC8DB-A764-FC4E-8BF7-150007699BE8}"/>
+                </a:ext>
+              </a:extLst>
+            </p:cNvPr>
+            <p:cNvSpPr txBox="1"/>
+            <p:nvPr/>
+          </p:nvSpPr>
+          <p:spPr>
+            <a:xfrm>
+              <a:off x="4825281" y="1442815"/>
+              <a:ext cx="2286203" cy="405847"/>
+            </a:xfrm>
+            <a:prstGeom prst="rect">
+              <a:avLst/>
+            </a:prstGeom>
+            <a:noFill/>
+          </p:spPr>
+          <p:txBody>
+            <a:bodyPr wrap="square" rtlCol="0">
+              <a:spAutoFit/>
+            </a:bodyPr>
+            <a:lstStyle/>
+            <a:p>
+              <a:r>
+                <a:rPr kumimoji="1" lang="en-US" altLang="ja-JP" sz="1600" dirty="0"/>
+                <a:t>New Session Ticket</a:t>
+              </a:r>
+              <a:endParaRPr kumimoji="1" lang="ja-JP" altLang="en-US" sz="1600"/>
+            </a:p>
+          </p:txBody>
+        </p:sp>
+        <p:sp>
+          <p:nvSpPr>
+            <p:cNvPr id="29" name="フリーフォーム 28">
+              <a:extLst>
+                <a:ext uri="{FF2B5EF4-FFF2-40B4-BE49-F238E27FC236}">
+                  <a16:creationId xmlns:a16="http://schemas.microsoft.com/office/drawing/2014/main" id="{FF79400E-8D7F-B942-A3C0-935C8CE66BA4}"/>
+                </a:ext>
+              </a:extLst>
+            </p:cNvPr>
+            <p:cNvSpPr/>
+            <p:nvPr/>
+          </p:nvSpPr>
+          <p:spPr>
+            <a:xfrm>
+              <a:off x="2481957" y="3187995"/>
+              <a:ext cx="7014751" cy="1292886"/>
+            </a:xfrm>
+            <a:custGeom>
+              <a:avLst/>
+              <a:gdLst>
+                <a:gd name="connsiteX0" fmla="*/ 0 w 6983605"/>
+                <a:gd name="connsiteY0" fmla="*/ 0 h 1055077"/>
+                <a:gd name="connsiteX1" fmla="*/ 211015 w 6983605"/>
+                <a:gd name="connsiteY1" fmla="*/ 301450 h 1055077"/>
+                <a:gd name="connsiteX2" fmla="*/ 6762541 w 6983605"/>
+                <a:gd name="connsiteY2" fmla="*/ 301450 h 1055077"/>
+                <a:gd name="connsiteX3" fmla="*/ 6983605 w 6983605"/>
+                <a:gd name="connsiteY3" fmla="*/ 522514 h 1055077"/>
+                <a:gd name="connsiteX4" fmla="*/ 6983605 w 6983605"/>
+                <a:gd name="connsiteY4" fmla="*/ 1055077 h 1055077"/>
+              </a:gdLst>
+              <a:ahLst/>
+              <a:cxnLst>
+                <a:cxn ang="0">
+                  <a:pos x="connsiteX0" y="connsiteY0"/>
+                </a:cxn>
+                <a:cxn ang="0">
+                  <a:pos x="connsiteX1" y="connsiteY1"/>
+                </a:cxn>
+                <a:cxn ang="0">
+                  <a:pos x="connsiteX2" y="connsiteY2"/>
+                </a:cxn>
+                <a:cxn ang="0">
+                  <a:pos x="connsiteX3" y="connsiteY3"/>
+                </a:cxn>
+                <a:cxn ang="0">
+                  <a:pos x="connsiteX4" y="connsiteY4"/>
+                </a:cxn>
+              </a:cxnLst>
+              <a:rect l="l" t="t" r="r" b="b"/>
+              <a:pathLst>
+                <a:path w="6983605" h="1055077">
+                  <a:moveTo>
+                    <a:pt x="0" y="0"/>
+                  </a:moveTo>
+                  <a:lnTo>
+                    <a:pt x="211015" y="301450"/>
+                  </a:lnTo>
+                  <a:lnTo>
+                    <a:pt x="6762541" y="301450"/>
+                  </a:lnTo>
+                  <a:lnTo>
+                    <a:pt x="6983605" y="522514"/>
+                  </a:lnTo>
+                  <a:lnTo>
+                    <a:pt x="6983605" y="1055077"/>
+                  </a:lnTo>
+                </a:path>
+              </a:pathLst>
+            </a:custGeom>
+            <a:noFill/>
+            <a:ln w="19050">
+              <a:solidFill>
+                <a:schemeClr val="tx1"/>
+              </a:solidFill>
+              <a:headEnd type="none" w="med" len="med"/>
+              <a:tailEnd type="arrow" w="med" len="med"/>
+            </a:ln>
+          </p:spPr>
+          <p:style>
+            <a:lnRef idx="2">
+              <a:schemeClr val="accent1">
+                <a:shade val="50000"/>
+              </a:schemeClr>
+            </a:lnRef>
+            <a:fillRef idx="1">
+              <a:schemeClr val="accent1"/>
+            </a:fillRef>
+            <a:effectRef idx="0">
+              <a:schemeClr val="accent1"/>
+            </a:effectRef>
+            <a:fontRef idx="minor">
+              <a:schemeClr val="lt1"/>
+            </a:fontRef>
+          </p:style>
+          <p:txBody>
+            <a:bodyPr rtlCol="0" anchor="ctr"/>
+            <a:lstStyle/>
+            <a:p>
+              <a:pPr algn="ctr"/>
+              <a:endParaRPr kumimoji="1" lang="ja-JP" altLang="en-US" sz="1600"/>
+            </a:p>
+          </p:txBody>
+        </p:sp>
+        <p:sp>
+          <p:nvSpPr>
+            <p:cNvPr id="27" name="正方形/長方形 26">
+              <a:extLst>
+                <a:ext uri="{FF2B5EF4-FFF2-40B4-BE49-F238E27FC236}">
+                  <a16:creationId xmlns:a16="http://schemas.microsoft.com/office/drawing/2014/main" id="{9C5EC1C2-E5C6-BB42-BD0A-01C0FB719339}"/>
+                </a:ext>
+              </a:extLst>
+            </p:cNvPr>
+            <p:cNvSpPr/>
+            <p:nvPr/>
+          </p:nvSpPr>
+          <p:spPr>
+            <a:xfrm>
+              <a:off x="8409145" y="3793728"/>
+              <a:ext cx="2271957" cy="368953"/>
+            </a:xfrm>
+            <a:prstGeom prst="rect">
+              <a:avLst/>
+            </a:prstGeom>
+            <a:solidFill>
+              <a:schemeClr val="bg1"/>
+            </a:solidFill>
+          </p:spPr>
+          <p:txBody>
+            <a:bodyPr wrap="square">
+              <a:spAutoFit/>
+            </a:bodyPr>
+            <a:lstStyle/>
+            <a:p>
+              <a:r>
+                <a:rPr lang="en-US" altLang="ja-JP" sz="1400" dirty="0"/>
+                <a:t>HKDF("resumption")</a:t>
+              </a:r>
+              <a:endParaRPr lang="ja-JP" altLang="en-US" sz="1400"/>
+            </a:p>
+          </p:txBody>
+        </p:sp>
+        <p:sp>
+          <p:nvSpPr>
+            <p:cNvPr id="24" name="正方形/長方形 23">
+              <a:extLst>
+                <a:ext uri="{FF2B5EF4-FFF2-40B4-BE49-F238E27FC236}">
+                  <a16:creationId xmlns:a16="http://schemas.microsoft.com/office/drawing/2014/main" id="{F846E367-F46B-8B4F-90E8-C1E666BCCD0E}"/>
+                </a:ext>
+              </a:extLst>
+            </p:cNvPr>
+            <p:cNvSpPr/>
+            <p:nvPr/>
+          </p:nvSpPr>
+          <p:spPr>
+            <a:xfrm>
+              <a:off x="1468490" y="3711958"/>
+              <a:ext cx="2591940" cy="368953"/>
+            </a:xfrm>
+            <a:prstGeom prst="rect">
+              <a:avLst/>
+            </a:prstGeom>
+            <a:solidFill>
+              <a:schemeClr val="bg1"/>
+            </a:solidFill>
+          </p:spPr>
+          <p:txBody>
+            <a:bodyPr wrap="square">
+              <a:spAutoFit/>
+            </a:bodyPr>
+            <a:lstStyle/>
+            <a:p>
+              <a:r>
+                <a:rPr lang="en-US" altLang="ja-JP" sz="1400" dirty="0"/>
+                <a:t>HKDF("resumption")</a:t>
+              </a:r>
+              <a:endParaRPr lang="ja-JP" altLang="en-US" sz="1400"/>
+            </a:p>
+          </p:txBody>
+        </p:sp>
+        <p:sp>
+          <p:nvSpPr>
+            <p:cNvPr id="36" name="正方形/長方形 35">
+              <a:extLst>
+                <a:ext uri="{FF2B5EF4-FFF2-40B4-BE49-F238E27FC236}">
+                  <a16:creationId xmlns:a16="http://schemas.microsoft.com/office/drawing/2014/main" id="{05292F4B-047B-2640-B65F-C5DFB6C4B2CF}"/>
+                </a:ext>
+              </a:extLst>
+            </p:cNvPr>
+            <p:cNvSpPr/>
+            <p:nvPr/>
+          </p:nvSpPr>
+          <p:spPr>
+            <a:xfrm>
+              <a:off x="125379" y="5017285"/>
+              <a:ext cx="1396722" cy="610438"/>
+            </a:xfrm>
+            <a:prstGeom prst="rect">
+              <a:avLst/>
+            </a:prstGeom>
+            <a:noFill/>
+            <a:ln w="19050">
+              <a:solidFill>
+                <a:schemeClr val="tx1"/>
+              </a:solidFill>
+            </a:ln>
+          </p:spPr>
+          <p:style>
+            <a:lnRef idx="2">
+              <a:schemeClr val="accent1">
+                <a:shade val="50000"/>
+              </a:schemeClr>
+            </a:lnRef>
+            <a:fillRef idx="1">
+              <a:schemeClr val="accent1"/>
+            </a:fillRef>
+            <a:effectRef idx="0">
+              <a:schemeClr val="accent1"/>
+            </a:effectRef>
+            <a:fontRef idx="minor">
+              <a:schemeClr val="lt1"/>
+            </a:fontRef>
+          </p:style>
+          <p:txBody>
+            <a:bodyPr rtlCol="0" anchor="ctr"/>
+            <a:lstStyle/>
+            <a:p>
+              <a:pPr algn="ctr"/>
+              <a:endParaRPr kumimoji="1" lang="ja-JP" altLang="en-US" sz="1600"/>
+            </a:p>
+          </p:txBody>
+        </p:sp>
+        <p:sp>
+          <p:nvSpPr>
+            <p:cNvPr id="37" name="テキスト ボックス 36">
+              <a:extLst>
+                <a:ext uri="{FF2B5EF4-FFF2-40B4-BE49-F238E27FC236}">
+                  <a16:creationId xmlns:a16="http://schemas.microsoft.com/office/drawing/2014/main" id="{DB8B0FCA-B0A0-AA46-8E07-8771070D9A6B}"/>
+                </a:ext>
+              </a:extLst>
+            </p:cNvPr>
+            <p:cNvSpPr txBox="1"/>
+            <p:nvPr/>
+          </p:nvSpPr>
+          <p:spPr>
+            <a:xfrm>
+              <a:off x="214357" y="5042948"/>
+              <a:ext cx="1151277" cy="627219"/>
+            </a:xfrm>
+            <a:prstGeom prst="rect">
+              <a:avLst/>
+            </a:prstGeom>
+            <a:noFill/>
+          </p:spPr>
+          <p:txBody>
+            <a:bodyPr wrap="square" rtlCol="0">
+              <a:spAutoFit/>
+            </a:bodyPr>
+            <a:lstStyle/>
+            <a:p>
+              <a:pPr algn="ctr"/>
+              <a:r>
+                <a:rPr kumimoji="1" lang="en-US" altLang="ja-JP" sz="1400" dirty="0"/>
+                <a:t>DH</a:t>
+              </a:r>
+            </a:p>
+            <a:p>
+              <a:pPr algn="ctr"/>
+              <a:r>
+                <a:rPr lang="en-US" altLang="ja-JP" sz="1400" dirty="0"/>
+                <a:t>Key Share</a:t>
+              </a:r>
+              <a:endParaRPr kumimoji="1" lang="ja-JP" altLang="en-US" sz="1400"/>
+            </a:p>
+          </p:txBody>
+        </p:sp>
+        <p:sp>
+          <p:nvSpPr>
+            <p:cNvPr id="41" name="正方形/長方形 40">
+              <a:extLst>
+                <a:ext uri="{FF2B5EF4-FFF2-40B4-BE49-F238E27FC236}">
+                  <a16:creationId xmlns:a16="http://schemas.microsoft.com/office/drawing/2014/main" id="{0583D151-9A49-A248-802B-2C46AF5E8B0E}"/>
+                </a:ext>
+              </a:extLst>
+            </p:cNvPr>
+            <p:cNvSpPr/>
+            <p:nvPr/>
+          </p:nvSpPr>
+          <p:spPr>
+            <a:xfrm>
+              <a:off x="10476292" y="5037376"/>
+              <a:ext cx="1396722" cy="610438"/>
+            </a:xfrm>
+            <a:prstGeom prst="rect">
+              <a:avLst/>
+            </a:prstGeom>
+            <a:noFill/>
+            <a:ln w="19050">
+              <a:solidFill>
+                <a:schemeClr val="tx1"/>
+              </a:solidFill>
+            </a:ln>
+          </p:spPr>
+          <p:style>
+            <a:lnRef idx="2">
+              <a:schemeClr val="accent1">
+                <a:shade val="50000"/>
+              </a:schemeClr>
+            </a:lnRef>
+            <a:fillRef idx="1">
+              <a:schemeClr val="accent1"/>
+            </a:fillRef>
+            <a:effectRef idx="0">
+              <a:schemeClr val="accent1"/>
+            </a:effectRef>
+            <a:fontRef idx="minor">
+              <a:schemeClr val="lt1"/>
+            </a:fontRef>
+          </p:style>
+          <p:txBody>
+            <a:bodyPr rtlCol="0" anchor="ctr"/>
+            <a:lstStyle/>
+            <a:p>
+              <a:pPr algn="ctr"/>
+              <a:endParaRPr kumimoji="1" lang="ja-JP" altLang="en-US" sz="1600"/>
+            </a:p>
+          </p:txBody>
+        </p:sp>
+        <p:sp>
+          <p:nvSpPr>
+            <p:cNvPr id="42" name="テキスト ボックス 41">
+              <a:extLst>
+                <a:ext uri="{FF2B5EF4-FFF2-40B4-BE49-F238E27FC236}">
+                  <a16:creationId xmlns:a16="http://schemas.microsoft.com/office/drawing/2014/main" id="{84370A4D-41BD-8F46-872A-414C683EF15F}"/>
+                </a:ext>
+              </a:extLst>
+            </p:cNvPr>
+            <p:cNvSpPr txBox="1"/>
+            <p:nvPr/>
+          </p:nvSpPr>
+          <p:spPr>
+            <a:xfrm>
+              <a:off x="10565270" y="5063039"/>
+              <a:ext cx="1151277" cy="627219"/>
+            </a:xfrm>
+            <a:prstGeom prst="rect">
+              <a:avLst/>
+            </a:prstGeom>
+            <a:noFill/>
+          </p:spPr>
+          <p:txBody>
+            <a:bodyPr wrap="square" rtlCol="0">
+              <a:spAutoFit/>
+            </a:bodyPr>
+            <a:lstStyle/>
+            <a:p>
+              <a:pPr algn="ctr"/>
+              <a:r>
+                <a:rPr kumimoji="1" lang="en-US" altLang="ja-JP" sz="1400" dirty="0"/>
+                <a:t>DH</a:t>
+              </a:r>
+            </a:p>
+            <a:p>
+              <a:pPr algn="ctr"/>
+              <a:r>
+                <a:rPr lang="en-US" altLang="ja-JP" sz="1400" dirty="0"/>
+                <a:t>Key Share</a:t>
+              </a:r>
+              <a:endParaRPr kumimoji="1" lang="ja-JP" altLang="en-US" sz="1400"/>
+            </a:p>
+          </p:txBody>
+        </p:sp>
+        <p:cxnSp>
+          <p:nvCxnSpPr>
+            <p:cNvPr id="44" name="直線コネクタ 43">
+              <a:extLst>
+                <a:ext uri="{FF2B5EF4-FFF2-40B4-BE49-F238E27FC236}">
+                  <a16:creationId xmlns:a16="http://schemas.microsoft.com/office/drawing/2014/main" id="{DC6F7D6B-2E80-1E47-A60F-EA0A1FEE5D9E}"/>
+                </a:ext>
+              </a:extLst>
+            </p:cNvPr>
+            <p:cNvCxnSpPr>
+              <a:cxnSpLocks/>
+            </p:cNvCxnSpPr>
+            <p:nvPr/>
+          </p:nvCxnSpPr>
+          <p:spPr>
+            <a:xfrm>
+              <a:off x="1522101" y="5320650"/>
+              <a:ext cx="8954191" cy="16455"/>
+            </a:xfrm>
+            <a:prstGeom prst="line">
+              <a:avLst/>
+            </a:prstGeom>
+            <a:ln w="19050">
+              <a:solidFill>
+                <a:schemeClr val="tx1"/>
+              </a:solidFill>
+              <a:headEnd type="none" w="med" len="med"/>
+              <a:tailEnd type="arrow" w="med" len="med"/>
+            </a:ln>
+          </p:spPr>
+          <p:style>
+            <a:lnRef idx="1">
+              <a:schemeClr val="accent1"/>
+            </a:lnRef>
+            <a:fillRef idx="0">
+              <a:schemeClr val="accent1"/>
+            </a:fillRef>
+            <a:effectRef idx="0">
+              <a:schemeClr val="accent1"/>
+            </a:effectRef>
+            <a:fontRef idx="minor">
+              <a:schemeClr val="tx1"/>
+            </a:fontRef>
+          </p:style>
+        </p:cxnSp>
+        <p:sp>
+          <p:nvSpPr>
+            <p:cNvPr id="45" name="正方形/長方形 44">
+              <a:extLst>
+                <a:ext uri="{FF2B5EF4-FFF2-40B4-BE49-F238E27FC236}">
+                  <a16:creationId xmlns:a16="http://schemas.microsoft.com/office/drawing/2014/main" id="{CD33FFB4-3146-9747-B413-1AFA70DC1DF7}"/>
+                </a:ext>
+              </a:extLst>
+            </p:cNvPr>
+            <p:cNvSpPr/>
+            <p:nvPr/>
+          </p:nvSpPr>
+          <p:spPr>
+            <a:xfrm>
+              <a:off x="8234582" y="6241325"/>
+              <a:ext cx="2524251" cy="535285"/>
+            </a:xfrm>
+            <a:prstGeom prst="rect">
+              <a:avLst/>
+            </a:prstGeom>
+            <a:noFill/>
+            <a:ln w="19050">
+              <a:solidFill>
+                <a:schemeClr val="tx1"/>
+              </a:solidFill>
+            </a:ln>
+          </p:spPr>
+          <p:style>
+            <a:lnRef idx="2">
+              <a:schemeClr val="accent1">
+                <a:shade val="50000"/>
+              </a:schemeClr>
+            </a:lnRef>
+            <a:fillRef idx="1">
+              <a:schemeClr val="accent1"/>
+            </a:fillRef>
+            <a:effectRef idx="0">
+              <a:schemeClr val="accent1"/>
+            </a:effectRef>
+            <a:fontRef idx="minor">
+              <a:schemeClr val="lt1"/>
+            </a:fontRef>
+          </p:style>
+          <p:txBody>
+            <a:bodyPr rtlCol="0" anchor="ctr"/>
+            <a:lstStyle/>
+            <a:p>
+              <a:pPr algn="ctr"/>
+              <a:endParaRPr kumimoji="1" lang="ja-JP" altLang="en-US" sz="1600"/>
+            </a:p>
+          </p:txBody>
+        </p:sp>
+        <p:sp>
+          <p:nvSpPr>
+            <p:cNvPr id="46" name="テキスト ボックス 45">
+              <a:extLst>
+                <a:ext uri="{FF2B5EF4-FFF2-40B4-BE49-F238E27FC236}">
+                  <a16:creationId xmlns:a16="http://schemas.microsoft.com/office/drawing/2014/main" id="{F9ACBC8F-69AF-DF41-87C9-77FF7D76AFBF}"/>
+                </a:ext>
+              </a:extLst>
+            </p:cNvPr>
+            <p:cNvSpPr txBox="1"/>
+            <p:nvPr/>
+          </p:nvSpPr>
+          <p:spPr>
+            <a:xfrm>
+              <a:off x="8468107" y="6311552"/>
+              <a:ext cx="2247308" cy="368953"/>
+            </a:xfrm>
+            <a:prstGeom prst="rect">
+              <a:avLst/>
+            </a:prstGeom>
+            <a:noFill/>
+          </p:spPr>
+          <p:txBody>
+            <a:bodyPr wrap="square" rtlCol="0">
+              <a:spAutoFit/>
+            </a:bodyPr>
+            <a:lstStyle/>
+            <a:p>
+              <a:r>
+                <a:rPr kumimoji="1" lang="en-US" altLang="ja-JP" sz="1400" dirty="0"/>
+                <a:t>Pre-master Secret</a:t>
+              </a:r>
+            </a:p>
+          </p:txBody>
+        </p:sp>
+        <p:sp>
+          <p:nvSpPr>
+            <p:cNvPr id="47" name="正方形/長方形 46">
+              <a:extLst>
+                <a:ext uri="{FF2B5EF4-FFF2-40B4-BE49-F238E27FC236}">
+                  <a16:creationId xmlns:a16="http://schemas.microsoft.com/office/drawing/2014/main" id="{341E6C62-223A-B74D-AE7B-CAFCD9B818D1}"/>
+                </a:ext>
+              </a:extLst>
+            </p:cNvPr>
+            <p:cNvSpPr/>
+            <p:nvPr/>
+          </p:nvSpPr>
+          <p:spPr>
+            <a:xfrm>
+              <a:off x="1288576" y="6250663"/>
+              <a:ext cx="2524251" cy="535284"/>
+            </a:xfrm>
+            <a:prstGeom prst="rect">
+              <a:avLst/>
+            </a:prstGeom>
+            <a:noFill/>
+            <a:ln w="19050">
+              <a:solidFill>
+                <a:schemeClr val="tx1"/>
+              </a:solidFill>
+            </a:ln>
+          </p:spPr>
+          <p:style>
+            <a:lnRef idx="2">
+              <a:schemeClr val="accent1">
+                <a:shade val="50000"/>
+              </a:schemeClr>
+            </a:lnRef>
+            <a:fillRef idx="1">
+              <a:schemeClr val="accent1"/>
+            </a:fillRef>
+            <a:effectRef idx="0">
+              <a:schemeClr val="accent1"/>
+            </a:effectRef>
+            <a:fontRef idx="minor">
+              <a:schemeClr val="lt1"/>
+            </a:fontRef>
+          </p:style>
+          <p:txBody>
+            <a:bodyPr rtlCol="0" anchor="ctr"/>
+            <a:lstStyle/>
+            <a:p>
+              <a:pPr algn="ctr"/>
+              <a:endParaRPr kumimoji="1" lang="ja-JP" altLang="en-US" sz="1600"/>
+            </a:p>
+          </p:txBody>
+        </p:sp>
+        <p:sp>
+          <p:nvSpPr>
+            <p:cNvPr id="48" name="テキスト ボックス 47">
+              <a:extLst>
+                <a:ext uri="{FF2B5EF4-FFF2-40B4-BE49-F238E27FC236}">
+                  <a16:creationId xmlns:a16="http://schemas.microsoft.com/office/drawing/2014/main" id="{BA19D37D-45C3-684E-88F2-04BFF5C8AC84}"/>
+                </a:ext>
+              </a:extLst>
+            </p:cNvPr>
+            <p:cNvSpPr txBox="1"/>
+            <p:nvPr/>
+          </p:nvSpPr>
+          <p:spPr>
+            <a:xfrm>
+              <a:off x="1522101" y="6320888"/>
+              <a:ext cx="2247308" cy="368953"/>
+            </a:xfrm>
+            <a:prstGeom prst="rect">
+              <a:avLst/>
+            </a:prstGeom>
+            <a:noFill/>
+          </p:spPr>
+          <p:txBody>
+            <a:bodyPr wrap="square" rtlCol="0">
+              <a:spAutoFit/>
+            </a:bodyPr>
+            <a:lstStyle/>
+            <a:p>
+              <a:r>
+                <a:rPr kumimoji="1" lang="en-US" altLang="ja-JP" sz="1400" dirty="0"/>
+                <a:t>Pre-master Secret</a:t>
+              </a:r>
+            </a:p>
+          </p:txBody>
+        </p:sp>
+        <p:sp>
+          <p:nvSpPr>
+            <p:cNvPr id="50" name="円柱 49">
+              <a:extLst>
+                <a:ext uri="{FF2B5EF4-FFF2-40B4-BE49-F238E27FC236}">
+                  <a16:creationId xmlns:a16="http://schemas.microsoft.com/office/drawing/2014/main" id="{BE273921-F424-0A4A-BEFE-C33688AAD4EE}"/>
+                </a:ext>
+              </a:extLst>
+            </p:cNvPr>
+            <p:cNvSpPr/>
+            <p:nvPr/>
+          </p:nvSpPr>
+          <p:spPr>
+            <a:xfrm rot="5400000">
+              <a:off x="5878952" y="4634604"/>
+              <a:ext cx="359628" cy="2191472"/>
+            </a:xfrm>
+            <a:prstGeom prst="can">
+              <a:avLst/>
+            </a:prstGeom>
+            <a:noFill/>
+            <a:ln w="19050">
+              <a:solidFill>
+                <a:schemeClr val="tx1"/>
+              </a:solidFill>
+            </a:ln>
+          </p:spPr>
+          <p:style>
+            <a:lnRef idx="2">
+              <a:schemeClr val="accent1">
+                <a:shade val="50000"/>
+              </a:schemeClr>
+            </a:lnRef>
+            <a:fillRef idx="1">
+              <a:schemeClr val="accent1"/>
+            </a:fillRef>
+            <a:effectRef idx="0">
+              <a:schemeClr val="accent1"/>
+            </a:effectRef>
+            <a:fontRef idx="minor">
+              <a:schemeClr val="lt1"/>
+            </a:fontRef>
+          </p:style>
+          <p:txBody>
+            <a:bodyPr rtlCol="0" anchor="ctr"/>
+            <a:lstStyle/>
+            <a:p>
+              <a:pPr algn="ctr"/>
+              <a:endParaRPr kumimoji="1" lang="ja-JP" altLang="en-US" sz="1600"/>
+            </a:p>
+          </p:txBody>
+        </p:sp>
+        <p:sp>
+          <p:nvSpPr>
+            <p:cNvPr id="51" name="テキスト ボックス 50">
+              <a:extLst>
+                <a:ext uri="{FF2B5EF4-FFF2-40B4-BE49-F238E27FC236}">
+                  <a16:creationId xmlns:a16="http://schemas.microsoft.com/office/drawing/2014/main" id="{19197817-3EB6-0245-B6DE-BE7769268F97}"/>
+                </a:ext>
+              </a:extLst>
+            </p:cNvPr>
+            <p:cNvSpPr txBox="1"/>
+            <p:nvPr/>
+          </p:nvSpPr>
+          <p:spPr>
+            <a:xfrm>
+              <a:off x="5402856" y="5550524"/>
+              <a:ext cx="1151277" cy="368953"/>
+            </a:xfrm>
+            <a:prstGeom prst="rect">
+              <a:avLst/>
+            </a:prstGeom>
+            <a:noFill/>
+          </p:spPr>
+          <p:txBody>
+            <a:bodyPr wrap="square" rtlCol="0">
+              <a:spAutoFit/>
+            </a:bodyPr>
+            <a:lstStyle/>
+            <a:p>
+              <a:pPr algn="ctr"/>
+              <a:r>
+                <a:rPr kumimoji="1" lang="en-US" altLang="ja-JP" sz="1400" dirty="0"/>
+                <a:t>DH</a:t>
+              </a:r>
+            </a:p>
+          </p:txBody>
+        </p:sp>
+        <p:sp>
+          <p:nvSpPr>
+            <p:cNvPr id="54" name="フリーフォーム 53">
+              <a:extLst>
+                <a:ext uri="{FF2B5EF4-FFF2-40B4-BE49-F238E27FC236}">
+                  <a16:creationId xmlns:a16="http://schemas.microsoft.com/office/drawing/2014/main" id="{E0BAA64A-FA1D-2240-9988-2DCB9F01774F}"/>
+                </a:ext>
+              </a:extLst>
+            </p:cNvPr>
+            <p:cNvSpPr/>
+            <p:nvPr/>
+          </p:nvSpPr>
+          <p:spPr>
+            <a:xfrm flipH="1" flipV="1">
+              <a:off x="7064333" y="5753411"/>
+              <a:ext cx="2471895" cy="480011"/>
+            </a:xfrm>
+            <a:custGeom>
+              <a:avLst/>
+              <a:gdLst>
+                <a:gd name="connsiteX0" fmla="*/ 0 w 2471895"/>
+                <a:gd name="connsiteY0" fmla="*/ 0 h 823965"/>
+                <a:gd name="connsiteX1" fmla="*/ 0 w 2471895"/>
+                <a:gd name="connsiteY1" fmla="*/ 673239 h 823965"/>
+                <a:gd name="connsiteX2" fmla="*/ 100484 w 2471895"/>
+                <a:gd name="connsiteY2" fmla="*/ 823965 h 823965"/>
+                <a:gd name="connsiteX3" fmla="*/ 2471895 w 2471895"/>
+                <a:gd name="connsiteY3" fmla="*/ 823965 h 823965"/>
+              </a:gdLst>
+              <a:ahLst/>
+              <a:cxnLst>
+                <a:cxn ang="0">
+                  <a:pos x="connsiteX0" y="connsiteY0"/>
+                </a:cxn>
+                <a:cxn ang="0">
+                  <a:pos x="connsiteX1" y="connsiteY1"/>
+                </a:cxn>
+                <a:cxn ang="0">
+                  <a:pos x="connsiteX2" y="connsiteY2"/>
+                </a:cxn>
+                <a:cxn ang="0">
+                  <a:pos x="connsiteX3" y="connsiteY3"/>
+                </a:cxn>
+              </a:cxnLst>
+              <a:rect l="l" t="t" r="r" b="b"/>
+              <a:pathLst>
+                <a:path w="2471895" h="823965">
+                  <a:moveTo>
+                    <a:pt x="0" y="0"/>
+                  </a:moveTo>
+                  <a:lnTo>
+                    <a:pt x="0" y="673239"/>
+                  </a:lnTo>
+                  <a:lnTo>
+                    <a:pt x="100484" y="823965"/>
+                  </a:lnTo>
+                  <a:lnTo>
+                    <a:pt x="2471895" y="823965"/>
+                  </a:lnTo>
+                </a:path>
+              </a:pathLst>
+            </a:custGeom>
+            <a:noFill/>
+            <a:ln w="19050">
+              <a:solidFill>
+                <a:schemeClr val="tx1"/>
+              </a:solidFill>
+              <a:headEnd type="arrow" w="med" len="med"/>
+              <a:tailEnd type="none" w="med" len="med"/>
+            </a:ln>
+          </p:spPr>
+          <p:style>
+            <a:lnRef idx="2">
+              <a:schemeClr val="accent1">
+                <a:shade val="50000"/>
+              </a:schemeClr>
+            </a:lnRef>
+            <a:fillRef idx="1">
+              <a:schemeClr val="accent1"/>
+            </a:fillRef>
+            <a:effectRef idx="0">
+              <a:schemeClr val="accent1"/>
+            </a:effectRef>
+            <a:fontRef idx="minor">
+              <a:schemeClr val="lt1"/>
+            </a:fontRef>
+          </p:style>
+          <p:txBody>
+            <a:bodyPr rtlCol="0" anchor="ctr"/>
+            <a:lstStyle/>
+            <a:p>
+              <a:pPr algn="ctr"/>
+              <a:endParaRPr kumimoji="1" lang="ja-JP" altLang="en-US" sz="1600"/>
+            </a:p>
+          </p:txBody>
+        </p:sp>
+        <p:sp>
+          <p:nvSpPr>
+            <p:cNvPr id="57" name="フリーフォーム 56">
+              <a:extLst>
+                <a:ext uri="{FF2B5EF4-FFF2-40B4-BE49-F238E27FC236}">
+                  <a16:creationId xmlns:a16="http://schemas.microsoft.com/office/drawing/2014/main" id="{7E7F8067-77BC-8B45-9972-B08A7B3FFF77}"/>
+                </a:ext>
+              </a:extLst>
+            </p:cNvPr>
+            <p:cNvSpPr/>
+            <p:nvPr/>
+          </p:nvSpPr>
+          <p:spPr>
+            <a:xfrm flipV="1">
+              <a:off x="2505392" y="5770652"/>
+              <a:ext cx="2471895" cy="480011"/>
+            </a:xfrm>
+            <a:custGeom>
+              <a:avLst/>
+              <a:gdLst>
+                <a:gd name="connsiteX0" fmla="*/ 0 w 2471895"/>
+                <a:gd name="connsiteY0" fmla="*/ 0 h 823965"/>
+                <a:gd name="connsiteX1" fmla="*/ 0 w 2471895"/>
+                <a:gd name="connsiteY1" fmla="*/ 673239 h 823965"/>
+                <a:gd name="connsiteX2" fmla="*/ 100484 w 2471895"/>
+                <a:gd name="connsiteY2" fmla="*/ 823965 h 823965"/>
+                <a:gd name="connsiteX3" fmla="*/ 2471895 w 2471895"/>
+                <a:gd name="connsiteY3" fmla="*/ 823965 h 823965"/>
+              </a:gdLst>
+              <a:ahLst/>
+              <a:cxnLst>
+                <a:cxn ang="0">
+                  <a:pos x="connsiteX0" y="connsiteY0"/>
+                </a:cxn>
+                <a:cxn ang="0">
+                  <a:pos x="connsiteX1" y="connsiteY1"/>
+                </a:cxn>
+                <a:cxn ang="0">
+                  <a:pos x="connsiteX2" y="connsiteY2"/>
+                </a:cxn>
+                <a:cxn ang="0">
+                  <a:pos x="connsiteX3" y="connsiteY3"/>
+                </a:cxn>
+              </a:cxnLst>
+              <a:rect l="l" t="t" r="r" b="b"/>
+              <a:pathLst>
+                <a:path w="2471895" h="823965">
+                  <a:moveTo>
+                    <a:pt x="0" y="0"/>
+                  </a:moveTo>
+                  <a:lnTo>
+                    <a:pt x="0" y="673239"/>
+                  </a:lnTo>
+                  <a:lnTo>
+                    <a:pt x="100484" y="823965"/>
+                  </a:lnTo>
+                  <a:lnTo>
+                    <a:pt x="2471895" y="823965"/>
+                  </a:lnTo>
+                </a:path>
+              </a:pathLst>
+            </a:custGeom>
+            <a:noFill/>
+            <a:ln w="19050">
+              <a:solidFill>
+                <a:schemeClr val="tx1"/>
+              </a:solidFill>
+              <a:headEnd type="arrow" w="med" len="med"/>
+              <a:tailEnd type="none" w="med" len="med"/>
+            </a:ln>
+          </p:spPr>
+          <p:style>
+            <a:lnRef idx="2">
+              <a:schemeClr val="accent1">
+                <a:shade val="50000"/>
+              </a:schemeClr>
+            </a:lnRef>
+            <a:fillRef idx="1">
+              <a:schemeClr val="accent1"/>
+            </a:fillRef>
+            <a:effectRef idx="0">
+              <a:schemeClr val="accent1"/>
+            </a:effectRef>
+            <a:fontRef idx="minor">
+              <a:schemeClr val="lt1"/>
+            </a:fontRef>
+          </p:style>
+          <p:txBody>
+            <a:bodyPr rtlCol="0" anchor="ctr"/>
+            <a:lstStyle/>
+            <a:p>
+              <a:pPr algn="ctr"/>
+              <a:endParaRPr kumimoji="1" lang="ja-JP" altLang="en-US" sz="1600"/>
+            </a:p>
+          </p:txBody>
+        </p:sp>
+        <p:sp>
+          <p:nvSpPr>
+            <p:cNvPr id="31" name="正方形/長方形 30">
+              <a:extLst>
+                <a:ext uri="{FF2B5EF4-FFF2-40B4-BE49-F238E27FC236}">
+                  <a16:creationId xmlns:a16="http://schemas.microsoft.com/office/drawing/2014/main" id="{A165FC1C-03B1-8647-A91B-FDE46CC3979C}"/>
+                </a:ext>
+              </a:extLst>
+            </p:cNvPr>
+            <p:cNvSpPr/>
+            <p:nvPr/>
+          </p:nvSpPr>
+          <p:spPr>
+            <a:xfrm>
+              <a:off x="1828800" y="4423939"/>
+              <a:ext cx="1396722" cy="463164"/>
+            </a:xfrm>
+            <a:prstGeom prst="rect">
+              <a:avLst/>
+            </a:prstGeom>
+            <a:solidFill>
+              <a:schemeClr val="bg1"/>
+            </a:solidFill>
+            <a:ln w="19050">
+              <a:solidFill>
+                <a:schemeClr val="tx1"/>
+              </a:solidFill>
+            </a:ln>
+          </p:spPr>
+          <p:style>
+            <a:lnRef idx="2">
+              <a:schemeClr val="accent1">
+                <a:shade val="50000"/>
+              </a:schemeClr>
+            </a:lnRef>
+            <a:fillRef idx="1">
+              <a:schemeClr val="accent1"/>
+            </a:fillRef>
+            <a:effectRef idx="0">
+              <a:schemeClr val="accent1"/>
+            </a:effectRef>
+            <a:fontRef idx="minor">
+              <a:schemeClr val="lt1"/>
+            </a:fontRef>
+          </p:style>
+          <p:txBody>
+            <a:bodyPr rtlCol="0" anchor="ctr"/>
+            <a:lstStyle/>
+            <a:p>
+              <a:pPr algn="ctr"/>
+              <a:endParaRPr kumimoji="1" lang="ja-JP" altLang="en-US" sz="1600"/>
+            </a:p>
+          </p:txBody>
+        </p:sp>
+        <p:sp>
+          <p:nvSpPr>
+            <p:cNvPr id="33" name="テキスト ボックス 32">
+              <a:extLst>
+                <a:ext uri="{FF2B5EF4-FFF2-40B4-BE49-F238E27FC236}">
+                  <a16:creationId xmlns:a16="http://schemas.microsoft.com/office/drawing/2014/main" id="{B77A94D4-E44F-B942-A3F4-495DD132276D}"/>
+                </a:ext>
+              </a:extLst>
+            </p:cNvPr>
+            <p:cNvSpPr txBox="1"/>
+            <p:nvPr/>
+          </p:nvSpPr>
+          <p:spPr>
+            <a:xfrm>
+              <a:off x="2172631" y="4537822"/>
+              <a:ext cx="591829" cy="368953"/>
+            </a:xfrm>
+            <a:prstGeom prst="rect">
+              <a:avLst/>
+            </a:prstGeom>
+            <a:noFill/>
+          </p:spPr>
+          <p:txBody>
+            <a:bodyPr wrap="square" rtlCol="0">
+              <a:spAutoFit/>
+            </a:bodyPr>
+            <a:lstStyle/>
+            <a:p>
+              <a:r>
+                <a:rPr kumimoji="1" lang="en-US" altLang="ja-JP" sz="1400" dirty="0"/>
+                <a:t>PSK</a:t>
+              </a:r>
+              <a:endParaRPr kumimoji="1" lang="ja-JP" altLang="en-US" sz="1400"/>
+            </a:p>
+          </p:txBody>
+        </p:sp>
+        <p:sp>
+          <p:nvSpPr>
+            <p:cNvPr id="34" name="正方形/長方形 33">
+              <a:extLst>
+                <a:ext uri="{FF2B5EF4-FFF2-40B4-BE49-F238E27FC236}">
+                  <a16:creationId xmlns:a16="http://schemas.microsoft.com/office/drawing/2014/main" id="{5FAAC5D9-5500-C644-A5D4-4C704DEA93E6}"/>
+                </a:ext>
+              </a:extLst>
+            </p:cNvPr>
+            <p:cNvSpPr/>
+            <p:nvPr/>
+          </p:nvSpPr>
+          <p:spPr>
+            <a:xfrm>
+              <a:off x="8837868" y="4526937"/>
+              <a:ext cx="1396722" cy="433504"/>
+            </a:xfrm>
+            <a:prstGeom prst="rect">
+              <a:avLst/>
+            </a:prstGeom>
+            <a:solidFill>
+              <a:schemeClr val="bg1"/>
+            </a:solidFill>
+            <a:ln w="19050">
+              <a:solidFill>
+                <a:schemeClr val="tx1"/>
+              </a:solidFill>
+            </a:ln>
+          </p:spPr>
+          <p:style>
+            <a:lnRef idx="2">
+              <a:schemeClr val="accent1">
+                <a:shade val="50000"/>
+              </a:schemeClr>
+            </a:lnRef>
+            <a:fillRef idx="1">
+              <a:schemeClr val="accent1"/>
+            </a:fillRef>
+            <a:effectRef idx="0">
+              <a:schemeClr val="accent1"/>
+            </a:effectRef>
+            <a:fontRef idx="minor">
+              <a:schemeClr val="lt1"/>
+            </a:fontRef>
+          </p:style>
+          <p:txBody>
+            <a:bodyPr rtlCol="0" anchor="ctr"/>
+            <a:lstStyle/>
+            <a:p>
+              <a:pPr algn="ctr"/>
+              <a:endParaRPr kumimoji="1" lang="ja-JP" altLang="en-US" sz="1600"/>
+            </a:p>
+          </p:txBody>
+        </p:sp>
+        <p:sp>
+          <p:nvSpPr>
+            <p:cNvPr id="35" name="テキスト ボックス 34">
+              <a:extLst>
+                <a:ext uri="{FF2B5EF4-FFF2-40B4-BE49-F238E27FC236}">
+                  <a16:creationId xmlns:a16="http://schemas.microsoft.com/office/drawing/2014/main" id="{C01167D6-9F3B-CE4F-A7B7-E953CBEC1F97}"/>
+                </a:ext>
+              </a:extLst>
+            </p:cNvPr>
+            <p:cNvSpPr txBox="1"/>
+            <p:nvPr/>
+          </p:nvSpPr>
+          <p:spPr>
+            <a:xfrm>
+              <a:off x="9200792" y="4559212"/>
+              <a:ext cx="591829" cy="368953"/>
+            </a:xfrm>
+            <a:prstGeom prst="rect">
+              <a:avLst/>
+            </a:prstGeom>
+            <a:noFill/>
+          </p:spPr>
+          <p:txBody>
+            <a:bodyPr wrap="square" rtlCol="0">
+              <a:spAutoFit/>
+            </a:bodyPr>
+            <a:lstStyle/>
+            <a:p>
+              <a:r>
+                <a:rPr kumimoji="1" lang="en-US" altLang="ja-JP" sz="1400" dirty="0"/>
+                <a:t>PSK</a:t>
+              </a:r>
+              <a:endParaRPr kumimoji="1" lang="ja-JP" altLang="en-US" sz="1400"/>
+            </a:p>
+          </p:txBody>
+        </p:sp>
+        <p:sp>
+          <p:nvSpPr>
+            <p:cNvPr id="8" name="テキスト ボックス 7">
+              <a:extLst>
+                <a:ext uri="{FF2B5EF4-FFF2-40B4-BE49-F238E27FC236}">
+                  <a16:creationId xmlns:a16="http://schemas.microsoft.com/office/drawing/2014/main" id="{67267F13-C660-0147-9E8B-49AB435D971B}"/>
+                </a:ext>
+              </a:extLst>
+            </p:cNvPr>
+            <p:cNvSpPr txBox="1"/>
+            <p:nvPr/>
+          </p:nvSpPr>
+          <p:spPr>
+            <a:xfrm>
+              <a:off x="8618832" y="881683"/>
+              <a:ext cx="2710996" cy="368953"/>
+            </a:xfrm>
+            <a:prstGeom prst="rect">
+              <a:avLst/>
+            </a:prstGeom>
+            <a:solidFill>
+              <a:schemeClr val="bg1"/>
+            </a:solidFill>
+          </p:spPr>
+          <p:txBody>
+            <a:bodyPr wrap="square" rtlCol="0">
+              <a:spAutoFit/>
+            </a:bodyPr>
+            <a:lstStyle/>
+            <a:p>
+              <a:r>
+                <a:rPr kumimoji="1" lang="en-US" altLang="ja-JP" sz="1400" dirty="0"/>
+                <a:t>HKDF(</a:t>
+              </a:r>
+              <a:r>
+                <a:rPr lang="en-US" altLang="ja-JP" sz="1400" dirty="0"/>
+                <a:t>"s ap traffic"</a:t>
+              </a:r>
+              <a:r>
+                <a:rPr kumimoji="1" lang="en-US" altLang="ja-JP" sz="1400" dirty="0"/>
+                <a:t>)</a:t>
+              </a:r>
+              <a:endParaRPr kumimoji="1" lang="ja-JP" altLang="en-US" sz="1400"/>
+            </a:p>
+          </p:txBody>
+        </p:sp>
+      </p:grpSp>
+      <p:cxnSp>
+        <p:nvCxnSpPr>
+          <p:cNvPr id="60" name="直線コネクタ 59">
+            <a:extLst>
+              <a:ext uri="{FF2B5EF4-FFF2-40B4-BE49-F238E27FC236}">
+                <a16:creationId xmlns:a16="http://schemas.microsoft.com/office/drawing/2014/main" id="{2C8E4D59-0C9D-D340-8D8C-06E4C7EA2940}"/>
+              </a:ext>
+            </a:extLst>
+          </p:cNvPr>
+          <p:cNvCxnSpPr>
+            <a:cxnSpLocks/>
+          </p:cNvCxnSpPr>
+          <p:nvPr/>
+        </p:nvCxnSpPr>
+        <p:spPr>
+          <a:xfrm flipH="1">
+            <a:off x="7299804" y="5032687"/>
+            <a:ext cx="2728287" cy="0"/>
+          </a:xfrm>
+          <a:prstGeom prst="line">
+            <a:avLst/>
+          </a:prstGeom>
+          <a:ln w="19050">
+            <a:solidFill>
+              <a:schemeClr val="tx1"/>
+            </a:solidFill>
+            <a:headEnd type="none" w="med" len="med"/>
+            <a:tailEnd type="arrow" w="med" len="med"/>
+          </a:ln>
+        </p:spPr>
+        <p:style>
+          <a:lnRef idx="1">
+            <a:schemeClr val="accent1"/>
+          </a:lnRef>
+          <a:fillRef idx="0">
+            <a:schemeClr val="accent1"/>
+          </a:fillRef>
+          <a:effectRef idx="0">
+            <a:schemeClr val="accent1"/>
+          </a:effectRef>
+          <a:fontRef idx="minor">
+            <a:schemeClr val="tx1"/>
+          </a:fontRef>
+        </p:style>
+      </p:cxnSp>
+      <p:cxnSp>
+        <p:nvCxnSpPr>
+          <p:cNvPr id="62" name="直線コネクタ 61">
+            <a:extLst>
+              <a:ext uri="{FF2B5EF4-FFF2-40B4-BE49-F238E27FC236}">
+                <a16:creationId xmlns:a16="http://schemas.microsoft.com/office/drawing/2014/main" id="{2A140F28-1BA1-214E-997C-34CE8E16F14E}"/>
+              </a:ext>
+            </a:extLst>
+          </p:cNvPr>
+          <p:cNvCxnSpPr>
+            <a:cxnSpLocks/>
+          </p:cNvCxnSpPr>
+          <p:nvPr/>
+        </p:nvCxnSpPr>
+        <p:spPr>
+          <a:xfrm>
+            <a:off x="2470213" y="5032687"/>
+            <a:ext cx="2728287" cy="0"/>
+          </a:xfrm>
+          <a:prstGeom prst="line">
+            <a:avLst/>
+          </a:prstGeom>
+          <a:ln w="19050">
+            <a:solidFill>
+              <a:schemeClr val="tx1"/>
+            </a:solidFill>
+            <a:headEnd type="none" w="med" len="med"/>
+            <a:tailEnd type="arrow" w="med" len="med"/>
+          </a:ln>
+        </p:spPr>
+        <p:style>
+          <a:lnRef idx="1">
+            <a:schemeClr val="accent1"/>
+          </a:lnRef>
+          <a:fillRef idx="0">
+            <a:schemeClr val="accent1"/>
+          </a:fillRef>
+          <a:effectRef idx="0">
+            <a:schemeClr val="accent1"/>
+          </a:effectRef>
+          <a:fontRef idx="minor">
+            <a:schemeClr val="tx1"/>
+          </a:fontRef>
+        </p:style>
+      </p:cxnSp>
+      <p:sp>
+        <p:nvSpPr>
+          <p:cNvPr id="40" name="テキスト ボックス 39">
+            <a:extLst>
+              <a:ext uri="{FF2B5EF4-FFF2-40B4-BE49-F238E27FC236}">
+                <a16:creationId xmlns:a16="http://schemas.microsoft.com/office/drawing/2014/main" id="{4DD795BD-2F36-4D1C-BDD7-4CE66953EA1E}"/>
+              </a:ext>
+            </a:extLst>
+          </p:cNvPr>
+          <p:cNvSpPr txBox="1"/>
+          <p:nvPr/>
+        </p:nvSpPr>
+        <p:spPr>
+          <a:xfrm>
+            <a:off x="8457045" y="352936"/>
+            <a:ext cx="2629305" cy="369332"/>
+          </a:xfrm>
+          <a:prstGeom prst="rect">
+            <a:avLst/>
+          </a:prstGeom>
+          <a:noFill/>
+        </p:spPr>
+        <p:txBody>
+          <a:bodyPr wrap="square" rtlCol="0">
+            <a:spAutoFit/>
+          </a:bodyPr>
+          <a:lstStyle/>
+          <a:p>
+            <a:pPr algn="ctr"/>
+            <a:r>
+              <a:rPr kumimoji="1" lang="en-US" altLang="ja-JP" b="1" dirty="0"/>
+              <a:t>Server</a:t>
+            </a:r>
+            <a:endParaRPr kumimoji="1" lang="ja-JP" altLang="en-US" b="1" dirty="0"/>
+          </a:p>
+        </p:txBody>
+      </p:sp>
+      <p:sp>
+        <p:nvSpPr>
+          <p:cNvPr id="43" name="テキスト ボックス 42">
+            <a:extLst>
+              <a:ext uri="{FF2B5EF4-FFF2-40B4-BE49-F238E27FC236}">
+                <a16:creationId xmlns:a16="http://schemas.microsoft.com/office/drawing/2014/main" id="{6F6EED98-BBE3-4162-936D-3665CF00B4F6}"/>
+              </a:ext>
+            </a:extLst>
+          </p:cNvPr>
+          <p:cNvSpPr txBox="1"/>
+          <p:nvPr/>
+        </p:nvSpPr>
+        <p:spPr>
+          <a:xfrm>
+            <a:off x="1299487" y="929844"/>
+            <a:ext cx="2629305" cy="369332"/>
+          </a:xfrm>
+          <a:prstGeom prst="rect">
+            <a:avLst/>
+          </a:prstGeom>
+          <a:noFill/>
+        </p:spPr>
+        <p:txBody>
+          <a:bodyPr wrap="square" rtlCol="0">
+            <a:spAutoFit/>
+          </a:bodyPr>
+          <a:lstStyle/>
+          <a:p>
+            <a:pPr algn="ctr"/>
+            <a:r>
+              <a:rPr kumimoji="1" lang="en-US" altLang="ja-JP" b="1" dirty="0"/>
+              <a:t>Client</a:t>
+            </a:r>
+            <a:endParaRPr kumimoji="1" lang="ja-JP" altLang="en-US" b="1" dirty="0"/>
+          </a:p>
+        </p:txBody>
+      </p:sp>
+    </p:spTree>
+    <p:extLst>
+      <p:ext uri="{BB962C8B-B14F-4D97-AF65-F5344CB8AC3E}">
+        <p14:creationId xmlns:p14="http://schemas.microsoft.com/office/powerpoint/2010/main" val="2315509012"/>
+      </p:ext>
+    </p:extLst>
+  </p:cSld>
+  <p:clrMapOvr>
+    <a:masterClrMapping/>
+  </p:clrMapOvr>
+</p:sld>
+</file>
+
 <file path=ppt/slides/slide2.xml><?xml version="1.0" encoding="utf-8"?>
 <p:sld xmlns:a="http://schemas.openxmlformats.org/drawingml/2006/main" xmlns:r="http://schemas.openxmlformats.org/officeDocument/2006/relationships" xmlns:p="http://schemas.openxmlformats.org/presentationml/2006/main">
   <p:cSld>
@@ -17866,8 +19789,8 @@
           <a:lstStyle/>
           <a:p>
             <a:r>
-              <a:rPr kumimoji="1" lang="en-US" altLang="ja-JP" sz="1400" dirty="0" err="1"/>
-              <a:t>VerifyCertificate</a:t>
+              <a:rPr lang="en-US" altLang="ja-JP" sz="1400" dirty="0" err="1"/>
+              <a:t>CertificateVerify</a:t>
             </a:r>
             <a:endParaRPr kumimoji="1" lang="en-US" altLang="ja-JP" sz="1400" dirty="0"/>
           </a:p>
@@ -28002,7 +29925,65 @@
       </a:bgFillStyleLst>
     </a:fmtScheme>
   </a:themeElements>
-  <a:objectDefaults/>
+  <a:objectDefaults>
+    <a:spDef>
+      <a:spPr>
+        <a:noFill/>
+        <a:ln w="19050">
+          <a:solidFill>
+            <a:schemeClr val="tx1"/>
+          </a:solidFill>
+        </a:ln>
+      </a:spPr>
+      <a:bodyPr rtlCol="0" anchor="ctr"/>
+      <a:lstStyle>
+        <a:defPPr algn="ctr">
+          <a:defRPr kumimoji="1"/>
+        </a:defPPr>
+      </a:lstStyle>
+      <a:style>
+        <a:lnRef idx="2">
+          <a:schemeClr val="accent1">
+            <a:shade val="50000"/>
+          </a:schemeClr>
+        </a:lnRef>
+        <a:fillRef idx="1">
+          <a:schemeClr val="accent1"/>
+        </a:fillRef>
+        <a:effectRef idx="0">
+          <a:schemeClr val="accent1"/>
+        </a:effectRef>
+        <a:fontRef idx="minor">
+          <a:schemeClr val="lt1"/>
+        </a:fontRef>
+      </a:style>
+    </a:spDef>
+    <a:lnDef>
+      <a:spPr>
+        <a:ln w="19050">
+          <a:solidFill>
+            <a:schemeClr val="tx1"/>
+          </a:solidFill>
+        </a:ln>
+      </a:spPr>
+      <a:bodyPr/>
+      <a:lstStyle/>
+      <a:style>
+        <a:lnRef idx="1">
+          <a:schemeClr val="accent1"/>
+        </a:lnRef>
+        <a:fillRef idx="0">
+          <a:schemeClr val="accent1"/>
+        </a:fillRef>
+        <a:effectRef idx="0">
+          <a:schemeClr val="accent1"/>
+        </a:effectRef>
+        <a:fontRef idx="minor">
+          <a:schemeClr val="tx1"/>
+        </a:fontRef>
+      </a:style>
+    </a:lnDef>
+  </a:objectDefaults>
   <a:extraClrSchemeLst/>
   <a:extLst>
     <a:ext uri="{05A4C25C-085E-4340-85A3-A5531E510DB2}">

</xml_diff>

<commit_message>
key derivation for session resumption
</commit_message>
<xml_diff>
--- a/Part1.Technology/Chapter2.Protocol/Protocol-fig-jp.pptx
+++ b/Part1.Technology/Chapter2.Protocol/Protocol-fig-jp.pptx
@@ -207,7 +207,7 @@
           <a:p>
             <a:fld id="{617CFC61-3C37-7545-B654-BD5914A64BC5}" type="datetimeFigureOut">
               <a:rPr kumimoji="1" lang="ja-JP" altLang="en-US" smtClean="0"/>
-              <a:t>2021/5/27</a:t>
+              <a:t>2021/5/28</a:t>
             </a:fld>
             <a:endParaRPr kumimoji="1" lang="ja-JP" altLang="en-US"/>
           </a:p>
@@ -737,7 +737,7 @@
           <a:p>
             <a:fld id="{C1D19383-95FF-457C-891A-BBD76E494015}" type="datetimeFigureOut">
               <a:rPr kumimoji="1" lang="ja-JP" altLang="en-US" smtClean="0"/>
-              <a:t>2021/5/27</a:t>
+              <a:t>2021/5/28</a:t>
             </a:fld>
             <a:endParaRPr kumimoji="1" lang="ja-JP" altLang="en-US"/>
           </a:p>
@@ -967,7 +967,7 @@
           <a:p>
             <a:fld id="{C1D19383-95FF-457C-891A-BBD76E494015}" type="datetimeFigureOut">
               <a:rPr kumimoji="1" lang="ja-JP" altLang="en-US" smtClean="0"/>
-              <a:t>2021/5/27</a:t>
+              <a:t>2021/5/28</a:t>
             </a:fld>
             <a:endParaRPr kumimoji="1" lang="ja-JP" altLang="en-US"/>
           </a:p>
@@ -1207,7 +1207,7 @@
           <a:p>
             <a:fld id="{C1D19383-95FF-457C-891A-BBD76E494015}" type="datetimeFigureOut">
               <a:rPr kumimoji="1" lang="ja-JP" altLang="en-US" smtClean="0"/>
-              <a:t>2021/5/27</a:t>
+              <a:t>2021/5/28</a:t>
             </a:fld>
             <a:endParaRPr kumimoji="1" lang="ja-JP" altLang="en-US"/>
           </a:p>
@@ -1437,7 +1437,7 @@
           <a:p>
             <a:fld id="{C1D19383-95FF-457C-891A-BBD76E494015}" type="datetimeFigureOut">
               <a:rPr kumimoji="1" lang="ja-JP" altLang="en-US" smtClean="0"/>
-              <a:t>2021/5/27</a:t>
+              <a:t>2021/5/28</a:t>
             </a:fld>
             <a:endParaRPr kumimoji="1" lang="ja-JP" altLang="en-US"/>
           </a:p>
@@ -1712,7 +1712,7 @@
           <a:p>
             <a:fld id="{C1D19383-95FF-457C-891A-BBD76E494015}" type="datetimeFigureOut">
               <a:rPr kumimoji="1" lang="ja-JP" altLang="en-US" smtClean="0"/>
-              <a:t>2021/5/27</a:t>
+              <a:t>2021/5/28</a:t>
             </a:fld>
             <a:endParaRPr kumimoji="1" lang="ja-JP" altLang="en-US"/>
           </a:p>
@@ -2041,7 +2041,7 @@
           <a:p>
             <a:fld id="{C1D19383-95FF-457C-891A-BBD76E494015}" type="datetimeFigureOut">
               <a:rPr kumimoji="1" lang="ja-JP" altLang="en-US" smtClean="0"/>
-              <a:t>2021/5/27</a:t>
+              <a:t>2021/5/28</a:t>
             </a:fld>
             <a:endParaRPr kumimoji="1" lang="ja-JP" altLang="en-US"/>
           </a:p>
@@ -2517,7 +2517,7 @@
           <a:p>
             <a:fld id="{C1D19383-95FF-457C-891A-BBD76E494015}" type="datetimeFigureOut">
               <a:rPr kumimoji="1" lang="ja-JP" altLang="en-US" smtClean="0"/>
-              <a:t>2021/5/27</a:t>
+              <a:t>2021/5/28</a:t>
             </a:fld>
             <a:endParaRPr kumimoji="1" lang="ja-JP" altLang="en-US"/>
           </a:p>
@@ -2658,7 +2658,7 @@
           <a:p>
             <a:fld id="{C1D19383-95FF-457C-891A-BBD76E494015}" type="datetimeFigureOut">
               <a:rPr kumimoji="1" lang="ja-JP" altLang="en-US" smtClean="0"/>
-              <a:t>2021/5/27</a:t>
+              <a:t>2021/5/28</a:t>
             </a:fld>
             <a:endParaRPr kumimoji="1" lang="ja-JP" altLang="en-US"/>
           </a:p>
@@ -2771,7 +2771,7 @@
           <a:p>
             <a:fld id="{C1D19383-95FF-457C-891A-BBD76E494015}" type="datetimeFigureOut">
               <a:rPr kumimoji="1" lang="ja-JP" altLang="en-US" smtClean="0"/>
-              <a:t>2021/5/27</a:t>
+              <a:t>2021/5/28</a:t>
             </a:fld>
             <a:endParaRPr kumimoji="1" lang="ja-JP" altLang="en-US"/>
           </a:p>
@@ -3114,7 +3114,7 @@
           <a:p>
             <a:fld id="{C1D19383-95FF-457C-891A-BBD76E494015}" type="datetimeFigureOut">
               <a:rPr kumimoji="1" lang="ja-JP" altLang="en-US" smtClean="0"/>
-              <a:t>2021/5/27</a:t>
+              <a:t>2021/5/28</a:t>
             </a:fld>
             <a:endParaRPr kumimoji="1" lang="ja-JP" altLang="en-US"/>
           </a:p>
@@ -3402,7 +3402,7 @@
           <a:p>
             <a:fld id="{C1D19383-95FF-457C-891A-BBD76E494015}" type="datetimeFigureOut">
               <a:rPr kumimoji="1" lang="ja-JP" altLang="en-US" smtClean="0"/>
-              <a:t>2021/5/27</a:t>
+              <a:t>2021/5/28</a:t>
             </a:fld>
             <a:endParaRPr kumimoji="1" lang="ja-JP" altLang="en-US"/>
           </a:p>
@@ -3675,7 +3675,7 @@
           <a:p>
             <a:fld id="{C1D19383-95FF-457C-891A-BBD76E494015}" type="datetimeFigureOut">
               <a:rPr kumimoji="1" lang="ja-JP" altLang="en-US" smtClean="0"/>
-              <a:t>2021/5/27</a:t>
+              <a:t>2021/5/28</a:t>
             </a:fld>
             <a:endParaRPr kumimoji="1" lang="ja-JP" altLang="en-US"/>
           </a:p>
@@ -7338,1734 +7338,1657 @@
           <a:chExt cx="0" cy="0"/>
         </a:xfrm>
       </p:grpSpPr>
-      <p:grpSp>
-        <p:nvGrpSpPr>
-          <p:cNvPr id="58" name="グループ化 57">
-            <a:extLst>
-              <a:ext uri="{FF2B5EF4-FFF2-40B4-BE49-F238E27FC236}">
-                <a16:creationId xmlns:a16="http://schemas.microsoft.com/office/drawing/2014/main" id="{9D5A9A2D-B096-124A-A7D7-D57E00DA1881}"/>
-              </a:ext>
-            </a:extLst>
-          </p:cNvPr>
-          <p:cNvGrpSpPr/>
-          <p:nvPr/>
-        </p:nvGrpSpPr>
-        <p:grpSpPr>
-          <a:xfrm>
-            <a:off x="-364241" y="94954"/>
-            <a:ext cx="12472725" cy="5903913"/>
-            <a:chOff x="-599711" y="-930117"/>
-            <a:chExt cx="12472725" cy="7716064"/>
-          </a:xfrm>
-        </p:grpSpPr>
-        <p:sp>
-          <p:nvSpPr>
-            <p:cNvPr id="4" name="正方形/長方形 3">
-              <a:extLst>
-                <a:ext uri="{FF2B5EF4-FFF2-40B4-BE49-F238E27FC236}">
-                  <a16:creationId xmlns:a16="http://schemas.microsoft.com/office/drawing/2014/main" id="{0D993353-C7BA-154F-9AC3-D4C6EEA9E4FC}"/>
-                </a:ext>
-              </a:extLst>
-            </p:cNvPr>
-            <p:cNvSpPr/>
-            <p:nvPr/>
-          </p:nvSpPr>
-          <p:spPr>
-            <a:xfrm>
-              <a:off x="7877908" y="46226"/>
-              <a:ext cx="3245617" cy="610437"/>
-            </a:xfrm>
-            <a:prstGeom prst="rect">
-              <a:avLst/>
-            </a:prstGeom>
-            <a:noFill/>
-            <a:ln w="19050">
-              <a:solidFill>
-                <a:schemeClr val="tx1"/>
-              </a:solidFill>
-            </a:ln>
-          </p:spPr>
-          <p:style>
-            <a:lnRef idx="2">
-              <a:schemeClr val="accent1">
-                <a:shade val="50000"/>
-              </a:schemeClr>
-            </a:lnRef>
-            <a:fillRef idx="1">
-              <a:schemeClr val="accent1"/>
-            </a:fillRef>
-            <a:effectRef idx="0">
-              <a:schemeClr val="accent1"/>
-            </a:effectRef>
-            <a:fontRef idx="minor">
-              <a:schemeClr val="lt1"/>
-            </a:fontRef>
-          </p:style>
-          <p:txBody>
-            <a:bodyPr rtlCol="0" anchor="ctr"/>
-            <a:lstStyle/>
-            <a:p>
-              <a:pPr algn="ctr"/>
-              <a:endParaRPr kumimoji="1" lang="ja-JP" altLang="en-US" sz="1600"/>
-            </a:p>
-          </p:txBody>
-        </p:sp>
-        <p:sp>
-          <p:nvSpPr>
-            <p:cNvPr id="5" name="テキスト ボックス 4">
-              <a:extLst>
-                <a:ext uri="{FF2B5EF4-FFF2-40B4-BE49-F238E27FC236}">
-                  <a16:creationId xmlns:a16="http://schemas.microsoft.com/office/drawing/2014/main" id="{5861387C-F71C-5743-865A-93A2CCD2DFE8}"/>
-                </a:ext>
-              </a:extLst>
-            </p:cNvPr>
-            <p:cNvSpPr txBox="1"/>
-            <p:nvPr/>
-          </p:nvSpPr>
-          <p:spPr>
-            <a:xfrm>
-              <a:off x="8428146" y="166780"/>
-              <a:ext cx="2137124" cy="405847"/>
-            </a:xfrm>
-            <a:prstGeom prst="rect">
-              <a:avLst/>
-            </a:prstGeom>
-            <a:noFill/>
-          </p:spPr>
-          <p:txBody>
-            <a:bodyPr wrap="square" rtlCol="0">
-              <a:spAutoFit/>
-            </a:bodyPr>
-            <a:lstStyle/>
-            <a:p>
-              <a:r>
-                <a:rPr kumimoji="1" lang="en-US" altLang="ja-JP" sz="1600" dirty="0"/>
-                <a:t>Pre-master Secret</a:t>
-              </a:r>
-              <a:endParaRPr kumimoji="1" lang="ja-JP" altLang="en-US" sz="1600"/>
-            </a:p>
-          </p:txBody>
-        </p:sp>
-        <p:sp>
-          <p:nvSpPr>
-            <p:cNvPr id="6" name="正方形/長方形 5">
-              <a:extLst>
-                <a:ext uri="{FF2B5EF4-FFF2-40B4-BE49-F238E27FC236}">
-                  <a16:creationId xmlns:a16="http://schemas.microsoft.com/office/drawing/2014/main" id="{25FFDC74-D195-E14F-ACA7-0F993576619C}"/>
-                </a:ext>
-              </a:extLst>
-            </p:cNvPr>
-            <p:cNvSpPr/>
-            <p:nvPr/>
-          </p:nvSpPr>
-          <p:spPr>
-            <a:xfrm>
-              <a:off x="7877908" y="1494006"/>
-              <a:ext cx="3245617" cy="610438"/>
-            </a:xfrm>
-            <a:prstGeom prst="rect">
-              <a:avLst/>
-            </a:prstGeom>
-            <a:noFill/>
-            <a:ln w="19050">
-              <a:solidFill>
-                <a:schemeClr val="tx1"/>
-              </a:solidFill>
-            </a:ln>
-          </p:spPr>
-          <p:style>
-            <a:lnRef idx="2">
-              <a:schemeClr val="accent1">
-                <a:shade val="50000"/>
-              </a:schemeClr>
-            </a:lnRef>
-            <a:fillRef idx="1">
-              <a:schemeClr val="accent1"/>
-            </a:fillRef>
-            <a:effectRef idx="0">
-              <a:schemeClr val="accent1"/>
-            </a:effectRef>
-            <a:fontRef idx="minor">
-              <a:schemeClr val="lt1"/>
-            </a:fontRef>
-          </p:style>
-          <p:txBody>
-            <a:bodyPr rtlCol="0" anchor="ctr"/>
-            <a:lstStyle/>
-            <a:p>
-              <a:pPr algn="ctr"/>
-              <a:endParaRPr kumimoji="1" lang="ja-JP" altLang="en-US" sz="1600"/>
-            </a:p>
-          </p:txBody>
-        </p:sp>
-        <p:sp>
-          <p:nvSpPr>
-            <p:cNvPr id="7" name="テキスト ボックス 6">
-              <a:extLst>
-                <a:ext uri="{FF2B5EF4-FFF2-40B4-BE49-F238E27FC236}">
-                  <a16:creationId xmlns:a16="http://schemas.microsoft.com/office/drawing/2014/main" id="{F65CC9C4-FCB9-2D46-9861-B60C029A3794}"/>
-                </a:ext>
-              </a:extLst>
-            </p:cNvPr>
-            <p:cNvSpPr txBox="1"/>
-            <p:nvPr/>
-          </p:nvSpPr>
-          <p:spPr>
-            <a:xfrm>
-              <a:off x="8023635" y="1520772"/>
-              <a:ext cx="2710999" cy="627219"/>
-            </a:xfrm>
-            <a:prstGeom prst="rect">
-              <a:avLst/>
-            </a:prstGeom>
-            <a:noFill/>
-          </p:spPr>
-          <p:txBody>
-            <a:bodyPr wrap="square" rtlCol="0">
-              <a:spAutoFit/>
-            </a:bodyPr>
-            <a:lstStyle/>
-            <a:p>
-              <a:r>
-                <a:rPr lang="en-US" altLang="ja-JP" sz="1400" dirty="0"/>
-                <a:t>Resumption Master Secret</a:t>
-              </a:r>
-            </a:p>
-            <a:p>
-              <a:r>
-                <a:rPr kumimoji="1" lang="en-US" altLang="ja-JP" sz="1400" dirty="0"/>
-                <a:t>Ticket Nonce</a:t>
-              </a:r>
-              <a:endParaRPr kumimoji="1" lang="ja-JP" altLang="en-US" sz="1400"/>
-            </a:p>
-          </p:txBody>
-        </p:sp>
-        <p:cxnSp>
-          <p:nvCxnSpPr>
-            <p:cNvPr id="10" name="直線コネクタ 9">
-              <a:extLst>
-                <a:ext uri="{FF2B5EF4-FFF2-40B4-BE49-F238E27FC236}">
-                  <a16:creationId xmlns:a16="http://schemas.microsoft.com/office/drawing/2014/main" id="{43CA705A-B93B-8546-9D40-AADF3EFAE84E}"/>
-                </a:ext>
-              </a:extLst>
-            </p:cNvPr>
-            <p:cNvCxnSpPr>
-              <a:stCxn id="4" idx="2"/>
-              <a:endCxn id="6" idx="0"/>
-            </p:cNvCxnSpPr>
-            <p:nvPr/>
-          </p:nvCxnSpPr>
-          <p:spPr>
-            <a:xfrm>
-              <a:off x="9500717" y="656663"/>
-              <a:ext cx="0" cy="837342"/>
-            </a:xfrm>
-            <a:prstGeom prst="line">
-              <a:avLst/>
-            </a:prstGeom>
-            <a:ln w="19050">
-              <a:solidFill>
-                <a:schemeClr val="tx1"/>
-              </a:solidFill>
-              <a:headEnd type="none" w="med" len="med"/>
-              <a:tailEnd type="arrow" w="med" len="med"/>
-            </a:ln>
-          </p:spPr>
-          <p:style>
-            <a:lnRef idx="1">
-              <a:schemeClr val="accent1"/>
-            </a:lnRef>
-            <a:fillRef idx="0">
-              <a:schemeClr val="accent1"/>
-            </a:fillRef>
-            <a:effectRef idx="0">
-              <a:schemeClr val="accent1"/>
-            </a:effectRef>
-            <a:fontRef idx="minor">
+      <p:sp>
+        <p:nvSpPr>
+          <p:cNvPr id="4" name="正方形/長方形 3">
+            <a:extLst>
+              <a:ext uri="{FF2B5EF4-FFF2-40B4-BE49-F238E27FC236}">
+                <a16:creationId xmlns:a16="http://schemas.microsoft.com/office/drawing/2014/main" id="{0D993353-C7BA-154F-9AC3-D4C6EEA9E4FC}"/>
+              </a:ext>
+            </a:extLst>
+          </p:cNvPr>
+          <p:cNvSpPr/>
+          <p:nvPr/>
+        </p:nvSpPr>
+        <p:spPr>
+          <a:xfrm>
+            <a:off x="8096878" y="777349"/>
+            <a:ext cx="3245617" cy="467073"/>
+          </a:xfrm>
+          <a:prstGeom prst="rect">
+            <a:avLst/>
+          </a:prstGeom>
+          <a:noFill/>
+          <a:ln w="19050">
+            <a:solidFill>
               <a:schemeClr val="tx1"/>
-            </a:fontRef>
-          </p:style>
-        </p:cxnSp>
-        <p:cxnSp>
-          <p:nvCxnSpPr>
-            <p:cNvPr id="11" name="直線コネクタ 10">
-              <a:extLst>
-                <a:ext uri="{FF2B5EF4-FFF2-40B4-BE49-F238E27FC236}">
-                  <a16:creationId xmlns:a16="http://schemas.microsoft.com/office/drawing/2014/main" id="{ECEF93A6-C4FB-C141-8900-981EBFBEA63A}"/>
-                </a:ext>
-              </a:extLst>
-            </p:cNvPr>
-            <p:cNvCxnSpPr>
-              <a:cxnSpLocks/>
-              <a:stCxn id="6" idx="1"/>
-            </p:cNvCxnSpPr>
-            <p:nvPr/>
-          </p:nvCxnSpPr>
-          <p:spPr>
-            <a:xfrm flipH="1">
-              <a:off x="4152975" y="1799225"/>
-              <a:ext cx="3724933" cy="0"/>
-            </a:xfrm>
-            <a:prstGeom prst="line">
-              <a:avLst/>
-            </a:prstGeom>
-            <a:ln w="19050">
-              <a:solidFill>
-                <a:schemeClr val="tx1"/>
-              </a:solidFill>
-              <a:headEnd type="none" w="med" len="med"/>
-              <a:tailEnd type="arrow" w="med" len="med"/>
-            </a:ln>
-          </p:spPr>
-          <p:style>
-            <a:lnRef idx="1">
-              <a:schemeClr val="accent1"/>
-            </a:lnRef>
-            <a:fillRef idx="0">
-              <a:schemeClr val="accent1"/>
-            </a:fillRef>
-            <a:effectRef idx="0">
-              <a:schemeClr val="accent1"/>
-            </a:effectRef>
-            <a:fontRef idx="minor">
+            </a:solidFill>
+          </a:ln>
+        </p:spPr>
+        <p:style>
+          <a:lnRef idx="2">
+            <a:schemeClr val="accent1">
+              <a:shade val="50000"/>
+            </a:schemeClr>
+          </a:lnRef>
+          <a:fillRef idx="1">
+            <a:schemeClr val="accent1"/>
+          </a:fillRef>
+          <a:effectRef idx="0">
+            <a:schemeClr val="accent1"/>
+          </a:effectRef>
+          <a:fontRef idx="minor">
+            <a:schemeClr val="lt1"/>
+          </a:fontRef>
+        </p:style>
+        <p:txBody>
+          <a:bodyPr rtlCol="0" anchor="ctr"/>
+          <a:lstStyle/>
+          <a:p>
+            <a:pPr algn="ctr"/>
+            <a:endParaRPr kumimoji="1" lang="ja-JP" altLang="en-US" sz="1600"/>
+          </a:p>
+        </p:txBody>
+      </p:sp>
+      <p:sp>
+        <p:nvSpPr>
+          <p:cNvPr id="5" name="テキスト ボックス 4">
+            <a:extLst>
+              <a:ext uri="{FF2B5EF4-FFF2-40B4-BE49-F238E27FC236}">
+                <a16:creationId xmlns:a16="http://schemas.microsoft.com/office/drawing/2014/main" id="{5861387C-F71C-5743-865A-93A2CCD2DFE8}"/>
+              </a:ext>
+            </a:extLst>
+          </p:cNvPr>
+          <p:cNvSpPr txBox="1"/>
+          <p:nvPr/>
+        </p:nvSpPr>
+        <p:spPr>
+          <a:xfrm>
+            <a:off x="8647116" y="869590"/>
+            <a:ext cx="2137124" cy="310532"/>
+          </a:xfrm>
+          <a:prstGeom prst="rect">
+            <a:avLst/>
+          </a:prstGeom>
+          <a:noFill/>
+        </p:spPr>
+        <p:txBody>
+          <a:bodyPr wrap="square" rtlCol="0">
+            <a:spAutoFit/>
+          </a:bodyPr>
+          <a:lstStyle/>
+          <a:p>
+            <a:r>
+              <a:rPr kumimoji="1" lang="en-US" altLang="ja-JP" sz="1600" dirty="0"/>
+              <a:t>Pre-master Secret</a:t>
+            </a:r>
+            <a:endParaRPr kumimoji="1" lang="ja-JP" altLang="en-US" sz="1600"/>
+          </a:p>
+        </p:txBody>
+      </p:sp>
+      <p:cxnSp>
+        <p:nvCxnSpPr>
+          <p:cNvPr id="10" name="直線コネクタ 9">
+            <a:extLst>
+              <a:ext uri="{FF2B5EF4-FFF2-40B4-BE49-F238E27FC236}">
+                <a16:creationId xmlns:a16="http://schemas.microsoft.com/office/drawing/2014/main" id="{43CA705A-B93B-8546-9D40-AADF3EFAE84E}"/>
+              </a:ext>
+            </a:extLst>
+          </p:cNvPr>
+          <p:cNvCxnSpPr>
+            <a:stCxn id="4" idx="2"/>
+            <a:endCxn id="6" idx="0"/>
+          </p:cNvCxnSpPr>
+          <p:nvPr/>
+        </p:nvCxnSpPr>
+        <p:spPr>
+          <a:xfrm>
+            <a:off x="9719687" y="1244422"/>
+            <a:ext cx="0" cy="812145"/>
+          </a:xfrm>
+          <a:prstGeom prst="line">
+            <a:avLst/>
+          </a:prstGeom>
+          <a:ln w="19050">
+            <a:solidFill>
               <a:schemeClr val="tx1"/>
-            </a:fontRef>
-          </p:style>
-        </p:cxnSp>
-        <p:sp>
-          <p:nvSpPr>
-            <p:cNvPr id="14" name="正方形/長方形 13">
-              <a:extLst>
-                <a:ext uri="{FF2B5EF4-FFF2-40B4-BE49-F238E27FC236}">
-                  <a16:creationId xmlns:a16="http://schemas.microsoft.com/office/drawing/2014/main" id="{9477197E-5D68-7646-8F1F-23BF1F2A9316}"/>
-                </a:ext>
-              </a:extLst>
-            </p:cNvPr>
-            <p:cNvSpPr/>
-            <p:nvPr/>
-          </p:nvSpPr>
-          <p:spPr>
-            <a:xfrm>
-              <a:off x="907359" y="1494006"/>
-              <a:ext cx="3245617" cy="610438"/>
-            </a:xfrm>
-            <a:prstGeom prst="rect">
-              <a:avLst/>
-            </a:prstGeom>
-            <a:noFill/>
-            <a:ln w="19050">
-              <a:solidFill>
-                <a:schemeClr val="tx1"/>
-              </a:solidFill>
-            </a:ln>
-          </p:spPr>
-          <p:style>
-            <a:lnRef idx="2">
-              <a:schemeClr val="accent1">
-                <a:shade val="50000"/>
-              </a:schemeClr>
-            </a:lnRef>
-            <a:fillRef idx="1">
-              <a:schemeClr val="accent1"/>
-            </a:fillRef>
-            <a:effectRef idx="0">
-              <a:schemeClr val="accent1"/>
-            </a:effectRef>
-            <a:fontRef idx="minor">
-              <a:schemeClr val="lt1"/>
-            </a:fontRef>
-          </p:style>
-          <p:txBody>
-            <a:bodyPr rtlCol="0" anchor="ctr"/>
-            <a:lstStyle/>
-            <a:p>
-              <a:pPr algn="ctr"/>
-              <a:endParaRPr kumimoji="1" lang="ja-JP" altLang="en-US" sz="1600"/>
-            </a:p>
-          </p:txBody>
-        </p:sp>
-        <p:sp>
-          <p:nvSpPr>
-            <p:cNvPr id="15" name="テキスト ボックス 14">
-              <a:extLst>
-                <a:ext uri="{FF2B5EF4-FFF2-40B4-BE49-F238E27FC236}">
-                  <a16:creationId xmlns:a16="http://schemas.microsoft.com/office/drawing/2014/main" id="{5B655627-D378-5D41-BE6F-C2276B9949BB}"/>
-                </a:ext>
-              </a:extLst>
-            </p:cNvPr>
-            <p:cNvSpPr txBox="1"/>
-            <p:nvPr/>
-          </p:nvSpPr>
-          <p:spPr>
-            <a:xfrm>
-              <a:off x="1068475" y="1503759"/>
-              <a:ext cx="2710999" cy="627219"/>
-            </a:xfrm>
-            <a:prstGeom prst="rect">
-              <a:avLst/>
-            </a:prstGeom>
-            <a:noFill/>
-          </p:spPr>
-          <p:txBody>
-            <a:bodyPr wrap="square" rtlCol="0">
-              <a:spAutoFit/>
-            </a:bodyPr>
-            <a:lstStyle/>
-            <a:p>
-              <a:r>
-                <a:rPr lang="en-US" altLang="ja-JP" sz="1400" dirty="0"/>
-                <a:t>Resumption Master Secret</a:t>
-              </a:r>
-            </a:p>
-            <a:p>
-              <a:r>
-                <a:rPr kumimoji="1" lang="en-US" altLang="ja-JP" sz="1400" dirty="0"/>
-                <a:t>Ticket Nonce</a:t>
-              </a:r>
-              <a:endParaRPr kumimoji="1" lang="ja-JP" altLang="en-US" sz="1400"/>
-            </a:p>
-          </p:txBody>
-        </p:sp>
-        <p:cxnSp>
-          <p:nvCxnSpPr>
-            <p:cNvPr id="19" name="直線コネクタ 18">
-              <a:extLst>
-                <a:ext uri="{FF2B5EF4-FFF2-40B4-BE49-F238E27FC236}">
-                  <a16:creationId xmlns:a16="http://schemas.microsoft.com/office/drawing/2014/main" id="{D30A0325-BF38-2646-8F2D-7E0B0D416976}"/>
-                </a:ext>
-              </a:extLst>
-            </p:cNvPr>
-            <p:cNvCxnSpPr>
-              <a:cxnSpLocks/>
-            </p:cNvCxnSpPr>
-            <p:nvPr/>
-          </p:nvCxnSpPr>
-          <p:spPr>
-            <a:xfrm>
-              <a:off x="662552" y="2601440"/>
-              <a:ext cx="11143621" cy="0"/>
-            </a:xfrm>
-            <a:prstGeom prst="line">
-              <a:avLst/>
-            </a:prstGeom>
-            <a:ln w="19050">
-              <a:solidFill>
-                <a:schemeClr val="tx1"/>
-              </a:solidFill>
-              <a:prstDash val="dash"/>
-            </a:ln>
-          </p:spPr>
-          <p:style>
-            <a:lnRef idx="1">
-              <a:schemeClr val="accent1"/>
-            </a:lnRef>
-            <a:fillRef idx="0">
-              <a:schemeClr val="accent1"/>
-            </a:fillRef>
-            <a:effectRef idx="0">
-              <a:schemeClr val="accent1"/>
-            </a:effectRef>
-            <a:fontRef idx="minor">
+            </a:solidFill>
+            <a:headEnd type="none" w="med" len="med"/>
+            <a:tailEnd type="arrow" w="med" len="med"/>
+          </a:ln>
+        </p:spPr>
+        <p:style>
+          <a:lnRef idx="1">
+            <a:schemeClr val="accent1"/>
+          </a:lnRef>
+          <a:fillRef idx="0">
+            <a:schemeClr val="accent1"/>
+          </a:fillRef>
+          <a:effectRef idx="0">
+            <a:schemeClr val="accent1"/>
+          </a:effectRef>
+          <a:fontRef idx="minor">
+            <a:schemeClr val="tx1"/>
+          </a:fontRef>
+        </p:style>
+      </p:cxnSp>
+      <p:cxnSp>
+        <p:nvCxnSpPr>
+          <p:cNvPr id="11" name="直線コネクタ 10">
+            <a:extLst>
+              <a:ext uri="{FF2B5EF4-FFF2-40B4-BE49-F238E27FC236}">
+                <a16:creationId xmlns:a16="http://schemas.microsoft.com/office/drawing/2014/main" id="{ECEF93A6-C4FB-C141-8900-981EBFBEA63A}"/>
+              </a:ext>
+            </a:extLst>
+          </p:cNvPr>
+          <p:cNvCxnSpPr>
+            <a:cxnSpLocks/>
+            <a:stCxn id="6" idx="1"/>
+          </p:cNvCxnSpPr>
+          <p:nvPr/>
+        </p:nvCxnSpPr>
+        <p:spPr>
+          <a:xfrm flipH="1">
+            <a:off x="4371945" y="2290104"/>
+            <a:ext cx="3724933" cy="0"/>
+          </a:xfrm>
+          <a:prstGeom prst="line">
+            <a:avLst/>
+          </a:prstGeom>
+          <a:ln w="19050">
+            <a:solidFill>
               <a:schemeClr val="tx1"/>
-            </a:fontRef>
-          </p:style>
-        </p:cxnSp>
-        <p:sp>
-          <p:nvSpPr>
-            <p:cNvPr id="21" name="テキスト ボックス 20">
-              <a:extLst>
-                <a:ext uri="{FF2B5EF4-FFF2-40B4-BE49-F238E27FC236}">
-                  <a16:creationId xmlns:a16="http://schemas.microsoft.com/office/drawing/2014/main" id="{B3568664-12C9-7142-BA8D-36B75668C681}"/>
-                </a:ext>
-              </a:extLst>
-            </p:cNvPr>
-            <p:cNvSpPr txBox="1"/>
-            <p:nvPr/>
-          </p:nvSpPr>
-          <p:spPr>
-            <a:xfrm>
-              <a:off x="-599711" y="2633926"/>
-              <a:ext cx="3405217" cy="774800"/>
-            </a:xfrm>
-            <a:prstGeom prst="rect">
-              <a:avLst/>
-            </a:prstGeom>
-            <a:noFill/>
-          </p:spPr>
-          <p:txBody>
-            <a:bodyPr wrap="square" rtlCol="0">
-              <a:spAutoFit/>
-            </a:bodyPr>
-            <a:lstStyle/>
-            <a:p>
-              <a:pPr algn="ctr"/>
-              <a:r>
-                <a:rPr lang="en-US" altLang="ja-JP" b="1" dirty="0"/>
-                <a:t>Session Resumption</a:t>
-              </a:r>
-            </a:p>
-            <a:p>
-              <a:pPr algn="ctr"/>
-              <a:r>
-                <a:rPr lang="en-US" altLang="ja-JP" b="1" dirty="0"/>
-                <a:t>by PSK</a:t>
-              </a:r>
-              <a:endParaRPr kumimoji="1" lang="ja-JP" altLang="en-US" b="1"/>
-            </a:p>
-          </p:txBody>
-        </p:sp>
-        <p:sp>
-          <p:nvSpPr>
-            <p:cNvPr id="22" name="テキスト ボックス 21">
-              <a:extLst>
-                <a:ext uri="{FF2B5EF4-FFF2-40B4-BE49-F238E27FC236}">
-                  <a16:creationId xmlns:a16="http://schemas.microsoft.com/office/drawing/2014/main" id="{8A849E41-1D65-2344-9C85-815A58240083}"/>
-                </a:ext>
-              </a:extLst>
-            </p:cNvPr>
-            <p:cNvSpPr txBox="1"/>
-            <p:nvPr/>
-          </p:nvSpPr>
-          <p:spPr>
-            <a:xfrm>
-              <a:off x="-160760" y="-930117"/>
-              <a:ext cx="2629305" cy="442743"/>
-            </a:xfrm>
-            <a:prstGeom prst="rect">
-              <a:avLst/>
-            </a:prstGeom>
-            <a:noFill/>
-          </p:spPr>
-          <p:txBody>
-            <a:bodyPr wrap="square" rtlCol="0">
-              <a:spAutoFit/>
-            </a:bodyPr>
-            <a:lstStyle/>
-            <a:p>
-              <a:pPr algn="ctr"/>
-              <a:r>
-                <a:rPr kumimoji="1" lang="en-US" altLang="ja-JP" b="1" dirty="0"/>
-                <a:t>Secure Session</a:t>
-              </a:r>
-              <a:endParaRPr kumimoji="1" lang="ja-JP" altLang="en-US" b="1" dirty="0"/>
-            </a:p>
-          </p:txBody>
-        </p:sp>
-        <p:sp>
-          <p:nvSpPr>
-            <p:cNvPr id="23" name="テキスト ボックス 22">
-              <a:extLst>
-                <a:ext uri="{FF2B5EF4-FFF2-40B4-BE49-F238E27FC236}">
-                  <a16:creationId xmlns:a16="http://schemas.microsoft.com/office/drawing/2014/main" id="{51A93459-092D-484C-A140-92FD8DE38C3B}"/>
-                </a:ext>
-              </a:extLst>
-            </p:cNvPr>
-            <p:cNvSpPr txBox="1"/>
-            <p:nvPr/>
-          </p:nvSpPr>
-          <p:spPr>
-            <a:xfrm>
-              <a:off x="5214009" y="3162809"/>
-              <a:ext cx="1508746" cy="405847"/>
-            </a:xfrm>
-            <a:prstGeom prst="rect">
-              <a:avLst/>
-            </a:prstGeom>
-            <a:noFill/>
-          </p:spPr>
-          <p:txBody>
-            <a:bodyPr wrap="square" rtlCol="0">
-              <a:spAutoFit/>
-            </a:bodyPr>
-            <a:lstStyle/>
-            <a:p>
-              <a:r>
-                <a:rPr lang="en-US" altLang="ja-JP" sz="1600" dirty="0"/>
-                <a:t>PSK Identity</a:t>
-              </a:r>
-              <a:endParaRPr kumimoji="1" lang="ja-JP" altLang="en-US" sz="1600"/>
-            </a:p>
-          </p:txBody>
-        </p:sp>
-        <p:cxnSp>
-          <p:nvCxnSpPr>
-            <p:cNvPr id="25" name="直線コネクタ 24">
-              <a:extLst>
-                <a:ext uri="{FF2B5EF4-FFF2-40B4-BE49-F238E27FC236}">
-                  <a16:creationId xmlns:a16="http://schemas.microsoft.com/office/drawing/2014/main" id="{7D711540-ECC5-184B-9A10-5755D0E5F6C8}"/>
-                </a:ext>
-              </a:extLst>
-            </p:cNvPr>
-            <p:cNvCxnSpPr>
-              <a:cxnSpLocks/>
-            </p:cNvCxnSpPr>
-            <p:nvPr/>
-          </p:nvCxnSpPr>
-          <p:spPr>
-            <a:xfrm>
-              <a:off x="2468546" y="2104444"/>
-              <a:ext cx="0" cy="2319495"/>
-            </a:xfrm>
-            <a:prstGeom prst="line">
-              <a:avLst/>
-            </a:prstGeom>
-            <a:ln w="19050">
-              <a:solidFill>
-                <a:schemeClr val="tx1"/>
-              </a:solidFill>
-              <a:headEnd type="none" w="med" len="med"/>
-              <a:tailEnd type="arrow" w="med" len="med"/>
-            </a:ln>
-          </p:spPr>
-          <p:style>
-            <a:lnRef idx="1">
-              <a:schemeClr val="accent1"/>
-            </a:lnRef>
-            <a:fillRef idx="0">
-              <a:schemeClr val="accent1"/>
-            </a:fillRef>
-            <a:effectRef idx="0">
-              <a:schemeClr val="accent1"/>
-            </a:effectRef>
-            <a:fontRef idx="minor">
+            </a:solidFill>
+            <a:headEnd type="none" w="med" len="med"/>
+            <a:tailEnd type="arrow" w="med" len="med"/>
+          </a:ln>
+        </p:spPr>
+        <p:style>
+          <a:lnRef idx="1">
+            <a:schemeClr val="accent1"/>
+          </a:lnRef>
+          <a:fillRef idx="0">
+            <a:schemeClr val="accent1"/>
+          </a:fillRef>
+          <a:effectRef idx="0">
+            <a:schemeClr val="accent1"/>
+          </a:effectRef>
+          <a:fontRef idx="minor">
+            <a:schemeClr val="tx1"/>
+          </a:fontRef>
+        </p:style>
+      </p:cxnSp>
+      <p:cxnSp>
+        <p:nvCxnSpPr>
+          <p:cNvPr id="19" name="直線コネクタ 18">
+            <a:extLst>
+              <a:ext uri="{FF2B5EF4-FFF2-40B4-BE49-F238E27FC236}">
+                <a16:creationId xmlns:a16="http://schemas.microsoft.com/office/drawing/2014/main" id="{D30A0325-BF38-2646-8F2D-7E0B0D416976}"/>
+              </a:ext>
+            </a:extLst>
+          </p:cNvPr>
+          <p:cNvCxnSpPr>
+            <a:cxnSpLocks/>
+          </p:cNvCxnSpPr>
+          <p:nvPr/>
+        </p:nvCxnSpPr>
+        <p:spPr>
+          <a:xfrm>
+            <a:off x="881522" y="2932484"/>
+            <a:ext cx="11143621" cy="0"/>
+          </a:xfrm>
+          <a:prstGeom prst="line">
+            <a:avLst/>
+          </a:prstGeom>
+          <a:ln w="19050">
+            <a:solidFill>
               <a:schemeClr val="tx1"/>
-            </a:fontRef>
-          </p:style>
-        </p:cxnSp>
-        <p:sp>
-          <p:nvSpPr>
-            <p:cNvPr id="28" name="テキスト ボックス 27">
-              <a:extLst>
-                <a:ext uri="{FF2B5EF4-FFF2-40B4-BE49-F238E27FC236}">
-                  <a16:creationId xmlns:a16="http://schemas.microsoft.com/office/drawing/2014/main" id="{44ECC8DB-A764-FC4E-8BF7-150007699BE8}"/>
-                </a:ext>
-              </a:extLst>
-            </p:cNvPr>
-            <p:cNvSpPr txBox="1"/>
-            <p:nvPr/>
-          </p:nvSpPr>
-          <p:spPr>
-            <a:xfrm>
-              <a:off x="4825281" y="1442815"/>
-              <a:ext cx="2286203" cy="405847"/>
-            </a:xfrm>
-            <a:prstGeom prst="rect">
-              <a:avLst/>
-            </a:prstGeom>
-            <a:noFill/>
-          </p:spPr>
-          <p:txBody>
-            <a:bodyPr wrap="square" rtlCol="0">
-              <a:spAutoFit/>
-            </a:bodyPr>
-            <a:lstStyle/>
-            <a:p>
-              <a:r>
-                <a:rPr kumimoji="1" lang="en-US" altLang="ja-JP" sz="1600" dirty="0"/>
-                <a:t>New Session Ticket</a:t>
-              </a:r>
-              <a:endParaRPr kumimoji="1" lang="ja-JP" altLang="en-US" sz="1600"/>
-            </a:p>
-          </p:txBody>
-        </p:sp>
-        <p:sp>
-          <p:nvSpPr>
-            <p:cNvPr id="29" name="フリーフォーム 28">
-              <a:extLst>
-                <a:ext uri="{FF2B5EF4-FFF2-40B4-BE49-F238E27FC236}">
-                  <a16:creationId xmlns:a16="http://schemas.microsoft.com/office/drawing/2014/main" id="{FF79400E-8D7F-B942-A3C0-935C8CE66BA4}"/>
-                </a:ext>
-              </a:extLst>
-            </p:cNvPr>
-            <p:cNvSpPr/>
-            <p:nvPr/>
-          </p:nvSpPr>
-          <p:spPr>
-            <a:xfrm>
-              <a:off x="2481957" y="3187995"/>
-              <a:ext cx="7014751" cy="1292886"/>
-            </a:xfrm>
-            <a:custGeom>
-              <a:avLst/>
-              <a:gdLst>
-                <a:gd name="connsiteX0" fmla="*/ 0 w 6983605"/>
-                <a:gd name="connsiteY0" fmla="*/ 0 h 1055077"/>
-                <a:gd name="connsiteX1" fmla="*/ 211015 w 6983605"/>
-                <a:gd name="connsiteY1" fmla="*/ 301450 h 1055077"/>
-                <a:gd name="connsiteX2" fmla="*/ 6762541 w 6983605"/>
-                <a:gd name="connsiteY2" fmla="*/ 301450 h 1055077"/>
-                <a:gd name="connsiteX3" fmla="*/ 6983605 w 6983605"/>
-                <a:gd name="connsiteY3" fmla="*/ 522514 h 1055077"/>
-                <a:gd name="connsiteX4" fmla="*/ 6983605 w 6983605"/>
-                <a:gd name="connsiteY4" fmla="*/ 1055077 h 1055077"/>
-              </a:gdLst>
-              <a:ahLst/>
-              <a:cxnLst>
-                <a:cxn ang="0">
-                  <a:pos x="connsiteX0" y="connsiteY0"/>
-                </a:cxn>
-                <a:cxn ang="0">
-                  <a:pos x="connsiteX1" y="connsiteY1"/>
-                </a:cxn>
-                <a:cxn ang="0">
-                  <a:pos x="connsiteX2" y="connsiteY2"/>
-                </a:cxn>
-                <a:cxn ang="0">
-                  <a:pos x="connsiteX3" y="connsiteY3"/>
-                </a:cxn>
-                <a:cxn ang="0">
-                  <a:pos x="connsiteX4" y="connsiteY4"/>
-                </a:cxn>
-              </a:cxnLst>
-              <a:rect l="l" t="t" r="r" b="b"/>
-              <a:pathLst>
-                <a:path w="6983605" h="1055077">
-                  <a:moveTo>
-                    <a:pt x="0" y="0"/>
-                  </a:moveTo>
-                  <a:lnTo>
-                    <a:pt x="211015" y="301450"/>
-                  </a:lnTo>
-                  <a:lnTo>
-                    <a:pt x="6762541" y="301450"/>
-                  </a:lnTo>
-                  <a:lnTo>
-                    <a:pt x="6983605" y="522514"/>
-                  </a:lnTo>
-                  <a:lnTo>
-                    <a:pt x="6983605" y="1055077"/>
-                  </a:lnTo>
-                </a:path>
-              </a:pathLst>
-            </a:custGeom>
-            <a:noFill/>
-            <a:ln w="19050">
-              <a:solidFill>
-                <a:schemeClr val="tx1"/>
-              </a:solidFill>
-              <a:headEnd type="none" w="med" len="med"/>
-              <a:tailEnd type="arrow" w="med" len="med"/>
-            </a:ln>
-          </p:spPr>
-          <p:style>
-            <a:lnRef idx="2">
-              <a:schemeClr val="accent1">
-                <a:shade val="50000"/>
-              </a:schemeClr>
-            </a:lnRef>
-            <a:fillRef idx="1">
-              <a:schemeClr val="accent1"/>
-            </a:fillRef>
-            <a:effectRef idx="0">
-              <a:schemeClr val="accent1"/>
-            </a:effectRef>
-            <a:fontRef idx="minor">
-              <a:schemeClr val="lt1"/>
-            </a:fontRef>
-          </p:style>
-          <p:txBody>
-            <a:bodyPr rtlCol="0" anchor="ctr"/>
-            <a:lstStyle/>
-            <a:p>
-              <a:pPr algn="ctr"/>
-              <a:endParaRPr kumimoji="1" lang="ja-JP" altLang="en-US" sz="1600"/>
-            </a:p>
-          </p:txBody>
-        </p:sp>
-        <p:sp>
-          <p:nvSpPr>
-            <p:cNvPr id="27" name="正方形/長方形 26">
-              <a:extLst>
-                <a:ext uri="{FF2B5EF4-FFF2-40B4-BE49-F238E27FC236}">
-                  <a16:creationId xmlns:a16="http://schemas.microsoft.com/office/drawing/2014/main" id="{9C5EC1C2-E5C6-BB42-BD0A-01C0FB719339}"/>
-                </a:ext>
-              </a:extLst>
-            </p:cNvPr>
-            <p:cNvSpPr/>
-            <p:nvPr/>
-          </p:nvSpPr>
-          <p:spPr>
-            <a:xfrm>
-              <a:off x="8409145" y="3793728"/>
-              <a:ext cx="2271957" cy="368953"/>
-            </a:xfrm>
-            <a:prstGeom prst="rect">
-              <a:avLst/>
-            </a:prstGeom>
+            </a:solidFill>
+            <a:prstDash val="dash"/>
+          </a:ln>
+        </p:spPr>
+        <p:style>
+          <a:lnRef idx="1">
+            <a:schemeClr val="accent1"/>
+          </a:lnRef>
+          <a:fillRef idx="0">
+            <a:schemeClr val="accent1"/>
+          </a:fillRef>
+          <a:effectRef idx="0">
+            <a:schemeClr val="accent1"/>
+          </a:effectRef>
+          <a:fontRef idx="minor">
+            <a:schemeClr val="tx1"/>
+          </a:fontRef>
+        </p:style>
+      </p:cxnSp>
+      <p:sp>
+        <p:nvSpPr>
+          <p:cNvPr id="21" name="テキスト ボックス 20">
+            <a:extLst>
+              <a:ext uri="{FF2B5EF4-FFF2-40B4-BE49-F238E27FC236}">
+                <a16:creationId xmlns:a16="http://schemas.microsoft.com/office/drawing/2014/main" id="{B3568664-12C9-7142-BA8D-36B75668C681}"/>
+              </a:ext>
+            </a:extLst>
+          </p:cNvPr>
+          <p:cNvSpPr txBox="1"/>
+          <p:nvPr/>
+        </p:nvSpPr>
+        <p:spPr>
+          <a:xfrm>
+            <a:off x="-339052" y="3042265"/>
+            <a:ext cx="3405217" cy="592835"/>
+          </a:xfrm>
+          <a:prstGeom prst="rect">
+            <a:avLst/>
+          </a:prstGeom>
+          <a:noFill/>
+        </p:spPr>
+        <p:txBody>
+          <a:bodyPr wrap="square" rtlCol="0">
+            <a:spAutoFit/>
+          </a:bodyPr>
+          <a:lstStyle/>
+          <a:p>
+            <a:pPr algn="ctr"/>
+            <a:r>
+              <a:rPr lang="en-US" altLang="ja-JP" b="1" dirty="0"/>
+              <a:t>Session Resumption</a:t>
+            </a:r>
+          </a:p>
+          <a:p>
+            <a:pPr algn="ctr"/>
+            <a:r>
+              <a:rPr lang="en-US" altLang="ja-JP" b="1" dirty="0"/>
+              <a:t>by PSK</a:t>
+            </a:r>
+            <a:endParaRPr kumimoji="1" lang="ja-JP" altLang="en-US" b="1" dirty="0"/>
+          </a:p>
+        </p:txBody>
+      </p:sp>
+      <p:sp>
+        <p:nvSpPr>
+          <p:cNvPr id="22" name="テキスト ボックス 21">
+            <a:extLst>
+              <a:ext uri="{FF2B5EF4-FFF2-40B4-BE49-F238E27FC236}">
+                <a16:creationId xmlns:a16="http://schemas.microsoft.com/office/drawing/2014/main" id="{8A849E41-1D65-2344-9C85-815A58240083}"/>
+              </a:ext>
+            </a:extLst>
+          </p:cNvPr>
+          <p:cNvSpPr txBox="1"/>
+          <p:nvPr/>
+        </p:nvSpPr>
+        <p:spPr>
+          <a:xfrm>
+            <a:off x="58210" y="30304"/>
+            <a:ext cx="2629305" cy="338763"/>
+          </a:xfrm>
+          <a:prstGeom prst="rect">
+            <a:avLst/>
+          </a:prstGeom>
+          <a:noFill/>
+        </p:spPr>
+        <p:txBody>
+          <a:bodyPr wrap="square" rtlCol="0">
+            <a:spAutoFit/>
+          </a:bodyPr>
+          <a:lstStyle/>
+          <a:p>
+            <a:pPr algn="ctr"/>
+            <a:r>
+              <a:rPr kumimoji="1" lang="en-US" altLang="ja-JP" b="1" dirty="0"/>
+              <a:t>Secure Session</a:t>
+            </a:r>
+            <a:endParaRPr kumimoji="1" lang="ja-JP" altLang="en-US" b="1" dirty="0"/>
+          </a:p>
+        </p:txBody>
+      </p:sp>
+      <p:sp>
+        <p:nvSpPr>
+          <p:cNvPr id="23" name="テキスト ボックス 22">
+            <a:extLst>
+              <a:ext uri="{FF2B5EF4-FFF2-40B4-BE49-F238E27FC236}">
+                <a16:creationId xmlns:a16="http://schemas.microsoft.com/office/drawing/2014/main" id="{51A93459-092D-484C-A140-92FD8DE38C3B}"/>
+              </a:ext>
+            </a:extLst>
+          </p:cNvPr>
+          <p:cNvSpPr txBox="1"/>
+          <p:nvPr/>
+        </p:nvSpPr>
+        <p:spPr>
+          <a:xfrm>
+            <a:off x="5369230" y="3197417"/>
+            <a:ext cx="1697872" cy="584775"/>
+          </a:xfrm>
+          <a:prstGeom prst="rect">
+            <a:avLst/>
+          </a:prstGeom>
+          <a:noFill/>
+        </p:spPr>
+        <p:txBody>
+          <a:bodyPr wrap="square" rtlCol="0">
+            <a:spAutoFit/>
+          </a:bodyPr>
+          <a:lstStyle/>
+          <a:p>
+            <a:pPr algn="ctr"/>
+            <a:r>
+              <a:rPr lang="en-US" altLang="ja-JP" sz="1600" dirty="0"/>
+              <a:t>PSK Identity</a:t>
+            </a:r>
+          </a:p>
+          <a:p>
+            <a:pPr algn="ctr"/>
+            <a:r>
+              <a:rPr lang="en-US" altLang="ja-JP" sz="1600" dirty="0"/>
+              <a:t>Session Ticket</a:t>
+            </a:r>
+          </a:p>
+        </p:txBody>
+      </p:sp>
+      <p:cxnSp>
+        <p:nvCxnSpPr>
+          <p:cNvPr id="25" name="直線コネクタ 24">
+            <a:extLst>
+              <a:ext uri="{FF2B5EF4-FFF2-40B4-BE49-F238E27FC236}">
+                <a16:creationId xmlns:a16="http://schemas.microsoft.com/office/drawing/2014/main" id="{7D711540-ECC5-184B-9A10-5755D0E5F6C8}"/>
+              </a:ext>
+            </a:extLst>
+          </p:cNvPr>
+          <p:cNvCxnSpPr>
+            <a:cxnSpLocks/>
+          </p:cNvCxnSpPr>
+          <p:nvPr/>
+        </p:nvCxnSpPr>
+        <p:spPr>
+          <a:xfrm flipH="1">
+            <a:off x="2673578" y="2280745"/>
+            <a:ext cx="13940" cy="2392993"/>
+          </a:xfrm>
+          <a:prstGeom prst="line">
+            <a:avLst/>
+          </a:prstGeom>
+          <a:ln w="19050">
             <a:solidFill>
-              <a:schemeClr val="bg1"/>
+              <a:schemeClr val="tx1"/>
             </a:solidFill>
-          </p:spPr>
-          <p:txBody>
-            <a:bodyPr wrap="square">
-              <a:spAutoFit/>
-            </a:bodyPr>
-            <a:lstStyle/>
-            <a:p>
-              <a:r>
-                <a:rPr lang="en-US" altLang="ja-JP" sz="1400" dirty="0"/>
-                <a:t>HKDF("resumption")</a:t>
-              </a:r>
-              <a:endParaRPr lang="ja-JP" altLang="en-US" sz="1400"/>
-            </a:p>
-          </p:txBody>
-        </p:sp>
-        <p:sp>
-          <p:nvSpPr>
-            <p:cNvPr id="24" name="正方形/長方形 23">
-              <a:extLst>
-                <a:ext uri="{FF2B5EF4-FFF2-40B4-BE49-F238E27FC236}">
-                  <a16:creationId xmlns:a16="http://schemas.microsoft.com/office/drawing/2014/main" id="{F846E367-F46B-8B4F-90E8-C1E666BCCD0E}"/>
-                </a:ext>
-              </a:extLst>
-            </p:cNvPr>
-            <p:cNvSpPr/>
-            <p:nvPr/>
-          </p:nvSpPr>
-          <p:spPr>
-            <a:xfrm>
-              <a:off x="1468490" y="3711958"/>
-              <a:ext cx="2591940" cy="368953"/>
-            </a:xfrm>
-            <a:prstGeom prst="rect">
-              <a:avLst/>
-            </a:prstGeom>
+            <a:headEnd type="none" w="med" len="med"/>
+            <a:tailEnd type="arrow" w="med" len="med"/>
+          </a:ln>
+        </p:spPr>
+        <p:style>
+          <a:lnRef idx="1">
+            <a:schemeClr val="accent1"/>
+          </a:lnRef>
+          <a:fillRef idx="0">
+            <a:schemeClr val="accent1"/>
+          </a:fillRef>
+          <a:effectRef idx="0">
+            <a:schemeClr val="accent1"/>
+          </a:effectRef>
+          <a:fontRef idx="minor">
+            <a:schemeClr val="tx1"/>
+          </a:fontRef>
+        </p:style>
+      </p:cxnSp>
+      <p:sp>
+        <p:nvSpPr>
+          <p:cNvPr id="28" name="テキスト ボックス 27">
+            <a:extLst>
+              <a:ext uri="{FF2B5EF4-FFF2-40B4-BE49-F238E27FC236}">
+                <a16:creationId xmlns:a16="http://schemas.microsoft.com/office/drawing/2014/main" id="{44ECC8DB-A764-FC4E-8BF7-150007699BE8}"/>
+              </a:ext>
+            </a:extLst>
+          </p:cNvPr>
+          <p:cNvSpPr txBox="1"/>
+          <p:nvPr/>
+        </p:nvSpPr>
+        <p:spPr>
+          <a:xfrm>
+            <a:off x="5044251" y="2017399"/>
+            <a:ext cx="2286203" cy="584775"/>
+          </a:xfrm>
+          <a:prstGeom prst="rect">
+            <a:avLst/>
+          </a:prstGeom>
+          <a:noFill/>
+        </p:spPr>
+        <p:txBody>
+          <a:bodyPr wrap="square" rtlCol="0">
+            <a:spAutoFit/>
+          </a:bodyPr>
+          <a:lstStyle/>
+          <a:p>
+            <a:r>
+              <a:rPr kumimoji="1" lang="en-US" altLang="ja-JP" sz="1600" dirty="0"/>
+              <a:t>New Session Ticket</a:t>
+            </a:r>
+          </a:p>
+          <a:p>
+            <a:r>
+              <a:rPr lang="en-US" altLang="ja-JP" sz="1600" dirty="0" err="1"/>
+              <a:t>Ticket_nonce</a:t>
+            </a:r>
+            <a:endParaRPr kumimoji="1" lang="ja-JP" altLang="en-US" sz="1600" dirty="0"/>
+          </a:p>
+        </p:txBody>
+      </p:sp>
+      <p:sp>
+        <p:nvSpPr>
+          <p:cNvPr id="29" name="フリーフォーム 28">
+            <a:extLst>
+              <a:ext uri="{FF2B5EF4-FFF2-40B4-BE49-F238E27FC236}">
+                <a16:creationId xmlns:a16="http://schemas.microsoft.com/office/drawing/2014/main" id="{FF79400E-8D7F-B942-A3C0-935C8CE66BA4}"/>
+              </a:ext>
+            </a:extLst>
+          </p:cNvPr>
+          <p:cNvSpPr/>
+          <p:nvPr/>
+        </p:nvSpPr>
+        <p:spPr>
+          <a:xfrm>
+            <a:off x="2700927" y="2967805"/>
+            <a:ext cx="6985998" cy="1870484"/>
+          </a:xfrm>
+          <a:custGeom>
+            <a:avLst/>
+            <a:gdLst>
+              <a:gd name="connsiteX0" fmla="*/ 0 w 6983605"/>
+              <a:gd name="connsiteY0" fmla="*/ 0 h 1055077"/>
+              <a:gd name="connsiteX1" fmla="*/ 211015 w 6983605"/>
+              <a:gd name="connsiteY1" fmla="*/ 301450 h 1055077"/>
+              <a:gd name="connsiteX2" fmla="*/ 6762541 w 6983605"/>
+              <a:gd name="connsiteY2" fmla="*/ 301450 h 1055077"/>
+              <a:gd name="connsiteX3" fmla="*/ 6983605 w 6983605"/>
+              <a:gd name="connsiteY3" fmla="*/ 522514 h 1055077"/>
+              <a:gd name="connsiteX4" fmla="*/ 6983605 w 6983605"/>
+              <a:gd name="connsiteY4" fmla="*/ 1055077 h 1055077"/>
+            </a:gdLst>
+            <a:ahLst/>
+            <a:cxnLst>
+              <a:cxn ang="0">
+                <a:pos x="connsiteX0" y="connsiteY0"/>
+              </a:cxn>
+              <a:cxn ang="0">
+                <a:pos x="connsiteX1" y="connsiteY1"/>
+              </a:cxn>
+              <a:cxn ang="0">
+                <a:pos x="connsiteX2" y="connsiteY2"/>
+              </a:cxn>
+              <a:cxn ang="0">
+                <a:pos x="connsiteX3" y="connsiteY3"/>
+              </a:cxn>
+              <a:cxn ang="0">
+                <a:pos x="connsiteX4" y="connsiteY4"/>
+              </a:cxn>
+            </a:cxnLst>
+            <a:rect l="l" t="t" r="r" b="b"/>
+            <a:pathLst>
+              <a:path w="6983605" h="1055077">
+                <a:moveTo>
+                  <a:pt x="0" y="0"/>
+                </a:moveTo>
+                <a:lnTo>
+                  <a:pt x="211015" y="301450"/>
+                </a:lnTo>
+                <a:lnTo>
+                  <a:pt x="6762541" y="301450"/>
+                </a:lnTo>
+                <a:lnTo>
+                  <a:pt x="6983605" y="522514"/>
+                </a:lnTo>
+                <a:lnTo>
+                  <a:pt x="6983605" y="1055077"/>
+                </a:lnTo>
+              </a:path>
+            </a:pathLst>
+          </a:custGeom>
+          <a:noFill/>
+          <a:ln w="19050">
             <a:solidFill>
-              <a:schemeClr val="bg1"/>
+              <a:schemeClr val="tx1"/>
             </a:solidFill>
-          </p:spPr>
-          <p:txBody>
-            <a:bodyPr wrap="square">
-              <a:spAutoFit/>
-            </a:bodyPr>
-            <a:lstStyle/>
-            <a:p>
-              <a:r>
-                <a:rPr lang="en-US" altLang="ja-JP" sz="1400" dirty="0"/>
-                <a:t>HKDF("resumption")</a:t>
-              </a:r>
-              <a:endParaRPr lang="ja-JP" altLang="en-US" sz="1400"/>
-            </a:p>
-          </p:txBody>
-        </p:sp>
-        <p:sp>
-          <p:nvSpPr>
-            <p:cNvPr id="36" name="正方形/長方形 35">
-              <a:extLst>
-                <a:ext uri="{FF2B5EF4-FFF2-40B4-BE49-F238E27FC236}">
-                  <a16:creationId xmlns:a16="http://schemas.microsoft.com/office/drawing/2014/main" id="{05292F4B-047B-2640-B65F-C5DFB6C4B2CF}"/>
-                </a:ext>
-              </a:extLst>
-            </p:cNvPr>
-            <p:cNvSpPr/>
-            <p:nvPr/>
-          </p:nvSpPr>
-          <p:spPr>
-            <a:xfrm>
-              <a:off x="125379" y="5017285"/>
-              <a:ext cx="1396722" cy="610438"/>
-            </a:xfrm>
-            <a:prstGeom prst="rect">
-              <a:avLst/>
-            </a:prstGeom>
-            <a:noFill/>
-            <a:ln w="19050">
-              <a:solidFill>
-                <a:schemeClr val="tx1"/>
-              </a:solidFill>
-            </a:ln>
-          </p:spPr>
-          <p:style>
-            <a:lnRef idx="2">
-              <a:schemeClr val="accent1">
-                <a:shade val="50000"/>
-              </a:schemeClr>
-            </a:lnRef>
-            <a:fillRef idx="1">
-              <a:schemeClr val="accent1"/>
-            </a:fillRef>
-            <a:effectRef idx="0">
-              <a:schemeClr val="accent1"/>
-            </a:effectRef>
-            <a:fontRef idx="minor">
-              <a:schemeClr val="lt1"/>
-            </a:fontRef>
-          </p:style>
-          <p:txBody>
-            <a:bodyPr rtlCol="0" anchor="ctr"/>
-            <a:lstStyle/>
-            <a:p>
-              <a:pPr algn="ctr"/>
-              <a:endParaRPr kumimoji="1" lang="ja-JP" altLang="en-US" sz="1600"/>
-            </a:p>
-          </p:txBody>
-        </p:sp>
-        <p:sp>
-          <p:nvSpPr>
-            <p:cNvPr id="37" name="テキスト ボックス 36">
-              <a:extLst>
-                <a:ext uri="{FF2B5EF4-FFF2-40B4-BE49-F238E27FC236}">
-                  <a16:creationId xmlns:a16="http://schemas.microsoft.com/office/drawing/2014/main" id="{DB8B0FCA-B0A0-AA46-8E07-8771070D9A6B}"/>
-                </a:ext>
-              </a:extLst>
-            </p:cNvPr>
-            <p:cNvSpPr txBox="1"/>
-            <p:nvPr/>
-          </p:nvSpPr>
-          <p:spPr>
-            <a:xfrm>
-              <a:off x="214357" y="5042948"/>
-              <a:ext cx="1151277" cy="627219"/>
-            </a:xfrm>
-            <a:prstGeom prst="rect">
-              <a:avLst/>
-            </a:prstGeom>
-            <a:noFill/>
-          </p:spPr>
-          <p:txBody>
-            <a:bodyPr wrap="square" rtlCol="0">
-              <a:spAutoFit/>
-            </a:bodyPr>
-            <a:lstStyle/>
-            <a:p>
-              <a:pPr algn="ctr"/>
-              <a:r>
-                <a:rPr kumimoji="1" lang="en-US" altLang="ja-JP" sz="1400" dirty="0"/>
-                <a:t>DH</a:t>
-              </a:r>
-            </a:p>
-            <a:p>
-              <a:pPr algn="ctr"/>
-              <a:r>
-                <a:rPr lang="en-US" altLang="ja-JP" sz="1400" dirty="0"/>
-                <a:t>Key Share</a:t>
-              </a:r>
-              <a:endParaRPr kumimoji="1" lang="ja-JP" altLang="en-US" sz="1400"/>
-            </a:p>
-          </p:txBody>
-        </p:sp>
-        <p:sp>
-          <p:nvSpPr>
-            <p:cNvPr id="41" name="正方形/長方形 40">
-              <a:extLst>
-                <a:ext uri="{FF2B5EF4-FFF2-40B4-BE49-F238E27FC236}">
-                  <a16:creationId xmlns:a16="http://schemas.microsoft.com/office/drawing/2014/main" id="{0583D151-9A49-A248-802B-2C46AF5E8B0E}"/>
-                </a:ext>
-              </a:extLst>
-            </p:cNvPr>
-            <p:cNvSpPr/>
-            <p:nvPr/>
-          </p:nvSpPr>
-          <p:spPr>
-            <a:xfrm>
-              <a:off x="10476292" y="5037376"/>
-              <a:ext cx="1396722" cy="610438"/>
-            </a:xfrm>
-            <a:prstGeom prst="rect">
-              <a:avLst/>
-            </a:prstGeom>
-            <a:noFill/>
-            <a:ln w="19050">
-              <a:solidFill>
-                <a:schemeClr val="tx1"/>
-              </a:solidFill>
-            </a:ln>
-          </p:spPr>
-          <p:style>
-            <a:lnRef idx="2">
-              <a:schemeClr val="accent1">
-                <a:shade val="50000"/>
-              </a:schemeClr>
-            </a:lnRef>
-            <a:fillRef idx="1">
-              <a:schemeClr val="accent1"/>
-            </a:fillRef>
-            <a:effectRef idx="0">
-              <a:schemeClr val="accent1"/>
-            </a:effectRef>
-            <a:fontRef idx="minor">
-              <a:schemeClr val="lt1"/>
-            </a:fontRef>
-          </p:style>
-          <p:txBody>
-            <a:bodyPr rtlCol="0" anchor="ctr"/>
-            <a:lstStyle/>
-            <a:p>
-              <a:pPr algn="ctr"/>
-              <a:endParaRPr kumimoji="1" lang="ja-JP" altLang="en-US" sz="1600"/>
-            </a:p>
-          </p:txBody>
-        </p:sp>
-        <p:sp>
-          <p:nvSpPr>
-            <p:cNvPr id="42" name="テキスト ボックス 41">
-              <a:extLst>
-                <a:ext uri="{FF2B5EF4-FFF2-40B4-BE49-F238E27FC236}">
-                  <a16:creationId xmlns:a16="http://schemas.microsoft.com/office/drawing/2014/main" id="{84370A4D-41BD-8F46-872A-414C683EF15F}"/>
-                </a:ext>
-              </a:extLst>
-            </p:cNvPr>
-            <p:cNvSpPr txBox="1"/>
-            <p:nvPr/>
-          </p:nvSpPr>
-          <p:spPr>
-            <a:xfrm>
-              <a:off x="10565270" y="5063039"/>
-              <a:ext cx="1151277" cy="627219"/>
-            </a:xfrm>
-            <a:prstGeom prst="rect">
-              <a:avLst/>
-            </a:prstGeom>
-            <a:noFill/>
-          </p:spPr>
-          <p:txBody>
-            <a:bodyPr wrap="square" rtlCol="0">
-              <a:spAutoFit/>
-            </a:bodyPr>
-            <a:lstStyle/>
-            <a:p>
-              <a:pPr algn="ctr"/>
-              <a:r>
-                <a:rPr kumimoji="1" lang="en-US" altLang="ja-JP" sz="1400" dirty="0"/>
-                <a:t>DH</a:t>
-              </a:r>
-            </a:p>
-            <a:p>
-              <a:pPr algn="ctr"/>
-              <a:r>
-                <a:rPr lang="en-US" altLang="ja-JP" sz="1400" dirty="0"/>
-                <a:t>Key Share</a:t>
-              </a:r>
-              <a:endParaRPr kumimoji="1" lang="ja-JP" altLang="en-US" sz="1400"/>
-            </a:p>
-          </p:txBody>
-        </p:sp>
-        <p:cxnSp>
-          <p:nvCxnSpPr>
-            <p:cNvPr id="44" name="直線コネクタ 43">
-              <a:extLst>
-                <a:ext uri="{FF2B5EF4-FFF2-40B4-BE49-F238E27FC236}">
-                  <a16:creationId xmlns:a16="http://schemas.microsoft.com/office/drawing/2014/main" id="{DC6F7D6B-2E80-1E47-A60F-EA0A1FEE5D9E}"/>
-                </a:ext>
-              </a:extLst>
-            </p:cNvPr>
-            <p:cNvCxnSpPr>
-              <a:cxnSpLocks/>
-            </p:cNvCxnSpPr>
-            <p:nvPr/>
-          </p:nvCxnSpPr>
-          <p:spPr>
-            <a:xfrm>
-              <a:off x="1522101" y="5320650"/>
-              <a:ext cx="8954191" cy="16455"/>
-            </a:xfrm>
-            <a:prstGeom prst="line">
-              <a:avLst/>
-            </a:prstGeom>
-            <a:ln w="19050">
-              <a:solidFill>
-                <a:schemeClr val="tx1"/>
-              </a:solidFill>
-              <a:headEnd type="none" w="med" len="med"/>
-              <a:tailEnd type="arrow" w="med" len="med"/>
-            </a:ln>
-          </p:spPr>
-          <p:style>
-            <a:lnRef idx="1">
-              <a:schemeClr val="accent1"/>
-            </a:lnRef>
-            <a:fillRef idx="0">
-              <a:schemeClr val="accent1"/>
-            </a:fillRef>
-            <a:effectRef idx="0">
-              <a:schemeClr val="accent1"/>
-            </a:effectRef>
-            <a:fontRef idx="minor">
+            <a:headEnd type="none" w="med" len="med"/>
+            <a:tailEnd type="arrow" w="med" len="med"/>
+          </a:ln>
+        </p:spPr>
+        <p:style>
+          <a:lnRef idx="2">
+            <a:schemeClr val="accent1">
+              <a:shade val="50000"/>
+            </a:schemeClr>
+          </a:lnRef>
+          <a:fillRef idx="1">
+            <a:schemeClr val="accent1"/>
+          </a:fillRef>
+          <a:effectRef idx="0">
+            <a:schemeClr val="accent1"/>
+          </a:effectRef>
+          <a:fontRef idx="minor">
+            <a:schemeClr val="lt1"/>
+          </a:fontRef>
+        </p:style>
+        <p:txBody>
+          <a:bodyPr rtlCol="0" anchor="ctr"/>
+          <a:lstStyle/>
+          <a:p>
+            <a:pPr algn="ctr"/>
+            <a:endParaRPr kumimoji="1" lang="ja-JP" altLang="en-US" sz="1600"/>
+          </a:p>
+        </p:txBody>
+      </p:sp>
+      <p:sp>
+        <p:nvSpPr>
+          <p:cNvPr id="27" name="正方形/長方形 26">
+            <a:extLst>
+              <a:ext uri="{FF2B5EF4-FFF2-40B4-BE49-F238E27FC236}">
+                <a16:creationId xmlns:a16="http://schemas.microsoft.com/office/drawing/2014/main" id="{9C5EC1C2-E5C6-BB42-BD0A-01C0FB719339}"/>
+              </a:ext>
+            </a:extLst>
+          </p:cNvPr>
+          <p:cNvSpPr/>
+          <p:nvPr/>
+        </p:nvSpPr>
+        <p:spPr>
+          <a:xfrm>
+            <a:off x="8148554" y="4404062"/>
+            <a:ext cx="3047023" cy="307777"/>
+          </a:xfrm>
+          <a:prstGeom prst="rect">
+            <a:avLst/>
+          </a:prstGeom>
+          <a:solidFill>
+            <a:schemeClr val="bg1"/>
+          </a:solidFill>
+        </p:spPr>
+        <p:txBody>
+          <a:bodyPr wrap="square">
+            <a:spAutoFit/>
+          </a:bodyPr>
+          <a:lstStyle/>
+          <a:p>
+            <a:r>
+              <a:rPr lang="en-US" altLang="ja-JP" sz="1400" dirty="0"/>
+              <a:t>HKDF("resumption“, </a:t>
+            </a:r>
+            <a:r>
+              <a:rPr lang="en-US" altLang="ja-JP" sz="1400" dirty="0" err="1"/>
+              <a:t>ticket_nonce</a:t>
+            </a:r>
+            <a:r>
+              <a:rPr lang="en-US" altLang="ja-JP" sz="1400" dirty="0"/>
+              <a:t>)</a:t>
+            </a:r>
+            <a:endParaRPr lang="ja-JP" altLang="en-US" sz="1400" dirty="0"/>
+          </a:p>
+        </p:txBody>
+      </p:sp>
+      <p:sp>
+        <p:nvSpPr>
+          <p:cNvPr id="24" name="正方形/長方形 23">
+            <a:extLst>
+              <a:ext uri="{FF2B5EF4-FFF2-40B4-BE49-F238E27FC236}">
+                <a16:creationId xmlns:a16="http://schemas.microsoft.com/office/drawing/2014/main" id="{F846E367-F46B-8B4F-90E8-C1E666BCCD0E}"/>
+              </a:ext>
+            </a:extLst>
+          </p:cNvPr>
+          <p:cNvSpPr/>
+          <p:nvPr/>
+        </p:nvSpPr>
+        <p:spPr>
+          <a:xfrm>
+            <a:off x="1260034" y="4211886"/>
+            <a:ext cx="3111911" cy="307777"/>
+          </a:xfrm>
+          <a:prstGeom prst="rect">
+            <a:avLst/>
+          </a:prstGeom>
+          <a:solidFill>
+            <a:schemeClr val="bg1"/>
+          </a:solidFill>
+        </p:spPr>
+        <p:txBody>
+          <a:bodyPr wrap="square">
+            <a:spAutoFit/>
+          </a:bodyPr>
+          <a:lstStyle/>
+          <a:p>
+            <a:r>
+              <a:rPr lang="en-US" altLang="ja-JP" sz="1400" dirty="0"/>
+              <a:t>HKDF("resumption“, </a:t>
+            </a:r>
+            <a:r>
+              <a:rPr lang="en-US" altLang="ja-JP" sz="1400" dirty="0" err="1"/>
+              <a:t>ticket_nonce</a:t>
+            </a:r>
+            <a:r>
+              <a:rPr lang="en-US" altLang="ja-JP" sz="1400" dirty="0"/>
+              <a:t>)</a:t>
+            </a:r>
+            <a:endParaRPr lang="ja-JP" altLang="en-US" sz="1400" dirty="0"/>
+          </a:p>
+        </p:txBody>
+      </p:sp>
+      <p:sp>
+        <p:nvSpPr>
+          <p:cNvPr id="36" name="正方形/長方形 35">
+            <a:extLst>
+              <a:ext uri="{FF2B5EF4-FFF2-40B4-BE49-F238E27FC236}">
+                <a16:creationId xmlns:a16="http://schemas.microsoft.com/office/drawing/2014/main" id="{05292F4B-047B-2640-B65F-C5DFB6C4B2CF}"/>
+              </a:ext>
+            </a:extLst>
+          </p:cNvPr>
+          <p:cNvSpPr/>
+          <p:nvPr/>
+        </p:nvSpPr>
+        <p:spPr>
+          <a:xfrm>
+            <a:off x="344349" y="5138149"/>
+            <a:ext cx="1396722" cy="467074"/>
+          </a:xfrm>
+          <a:prstGeom prst="rect">
+            <a:avLst/>
+          </a:prstGeom>
+          <a:noFill/>
+          <a:ln w="19050">
+            <a:solidFill>
               <a:schemeClr val="tx1"/>
-            </a:fontRef>
-          </p:style>
-        </p:cxnSp>
-        <p:sp>
-          <p:nvSpPr>
-            <p:cNvPr id="45" name="正方形/長方形 44">
-              <a:extLst>
-                <a:ext uri="{FF2B5EF4-FFF2-40B4-BE49-F238E27FC236}">
-                  <a16:creationId xmlns:a16="http://schemas.microsoft.com/office/drawing/2014/main" id="{CD33FFB4-3146-9747-B413-1AFA70DC1DF7}"/>
-                </a:ext>
-              </a:extLst>
-            </p:cNvPr>
-            <p:cNvSpPr/>
-            <p:nvPr/>
-          </p:nvSpPr>
-          <p:spPr>
-            <a:xfrm>
-              <a:off x="8234582" y="6241325"/>
-              <a:ext cx="2524251" cy="535285"/>
-            </a:xfrm>
-            <a:prstGeom prst="rect">
-              <a:avLst/>
-            </a:prstGeom>
-            <a:noFill/>
-            <a:ln w="19050">
-              <a:solidFill>
-                <a:schemeClr val="tx1"/>
-              </a:solidFill>
-            </a:ln>
-          </p:spPr>
-          <p:style>
-            <a:lnRef idx="2">
-              <a:schemeClr val="accent1">
-                <a:shade val="50000"/>
-              </a:schemeClr>
-            </a:lnRef>
-            <a:fillRef idx="1">
-              <a:schemeClr val="accent1"/>
-            </a:fillRef>
-            <a:effectRef idx="0">
-              <a:schemeClr val="accent1"/>
-            </a:effectRef>
-            <a:fontRef idx="minor">
-              <a:schemeClr val="lt1"/>
-            </a:fontRef>
-          </p:style>
-          <p:txBody>
-            <a:bodyPr rtlCol="0" anchor="ctr"/>
-            <a:lstStyle/>
-            <a:p>
-              <a:pPr algn="ctr"/>
-              <a:endParaRPr kumimoji="1" lang="ja-JP" altLang="en-US" sz="1600"/>
-            </a:p>
-          </p:txBody>
-        </p:sp>
-        <p:sp>
-          <p:nvSpPr>
-            <p:cNvPr id="46" name="テキスト ボックス 45">
-              <a:extLst>
-                <a:ext uri="{FF2B5EF4-FFF2-40B4-BE49-F238E27FC236}">
-                  <a16:creationId xmlns:a16="http://schemas.microsoft.com/office/drawing/2014/main" id="{F9ACBC8F-69AF-DF41-87C9-77FF7D76AFBF}"/>
-                </a:ext>
-              </a:extLst>
-            </p:cNvPr>
-            <p:cNvSpPr txBox="1"/>
-            <p:nvPr/>
-          </p:nvSpPr>
-          <p:spPr>
-            <a:xfrm>
-              <a:off x="8468107" y="6311552"/>
-              <a:ext cx="2247308" cy="368953"/>
-            </a:xfrm>
-            <a:prstGeom prst="rect">
-              <a:avLst/>
-            </a:prstGeom>
-            <a:noFill/>
-          </p:spPr>
-          <p:txBody>
-            <a:bodyPr wrap="square" rtlCol="0">
-              <a:spAutoFit/>
-            </a:bodyPr>
-            <a:lstStyle/>
-            <a:p>
-              <a:r>
-                <a:rPr kumimoji="1" lang="en-US" altLang="ja-JP" sz="1400" dirty="0"/>
-                <a:t>Pre-master Secret</a:t>
-              </a:r>
-            </a:p>
-          </p:txBody>
-        </p:sp>
-        <p:sp>
-          <p:nvSpPr>
-            <p:cNvPr id="47" name="正方形/長方形 46">
-              <a:extLst>
-                <a:ext uri="{FF2B5EF4-FFF2-40B4-BE49-F238E27FC236}">
-                  <a16:creationId xmlns:a16="http://schemas.microsoft.com/office/drawing/2014/main" id="{341E6C62-223A-B74D-AE7B-CAFCD9B818D1}"/>
-                </a:ext>
-              </a:extLst>
-            </p:cNvPr>
-            <p:cNvSpPr/>
-            <p:nvPr/>
-          </p:nvSpPr>
-          <p:spPr>
-            <a:xfrm>
-              <a:off x="1288576" y="6250663"/>
-              <a:ext cx="2524251" cy="535284"/>
-            </a:xfrm>
-            <a:prstGeom prst="rect">
-              <a:avLst/>
-            </a:prstGeom>
-            <a:noFill/>
-            <a:ln w="19050">
-              <a:solidFill>
-                <a:schemeClr val="tx1"/>
-              </a:solidFill>
-            </a:ln>
-          </p:spPr>
-          <p:style>
-            <a:lnRef idx="2">
-              <a:schemeClr val="accent1">
-                <a:shade val="50000"/>
-              </a:schemeClr>
-            </a:lnRef>
-            <a:fillRef idx="1">
-              <a:schemeClr val="accent1"/>
-            </a:fillRef>
-            <a:effectRef idx="0">
-              <a:schemeClr val="accent1"/>
-            </a:effectRef>
-            <a:fontRef idx="minor">
-              <a:schemeClr val="lt1"/>
-            </a:fontRef>
-          </p:style>
-          <p:txBody>
-            <a:bodyPr rtlCol="0" anchor="ctr"/>
-            <a:lstStyle/>
-            <a:p>
-              <a:pPr algn="ctr"/>
-              <a:endParaRPr kumimoji="1" lang="ja-JP" altLang="en-US" sz="1600"/>
-            </a:p>
-          </p:txBody>
-        </p:sp>
-        <p:sp>
-          <p:nvSpPr>
-            <p:cNvPr id="48" name="テキスト ボックス 47">
-              <a:extLst>
-                <a:ext uri="{FF2B5EF4-FFF2-40B4-BE49-F238E27FC236}">
-                  <a16:creationId xmlns:a16="http://schemas.microsoft.com/office/drawing/2014/main" id="{BA19D37D-45C3-684E-88F2-04BFF5C8AC84}"/>
-                </a:ext>
-              </a:extLst>
-            </p:cNvPr>
-            <p:cNvSpPr txBox="1"/>
-            <p:nvPr/>
-          </p:nvSpPr>
-          <p:spPr>
-            <a:xfrm>
-              <a:off x="1522101" y="6320888"/>
-              <a:ext cx="2247308" cy="368953"/>
-            </a:xfrm>
-            <a:prstGeom prst="rect">
-              <a:avLst/>
-            </a:prstGeom>
-            <a:noFill/>
-          </p:spPr>
-          <p:txBody>
-            <a:bodyPr wrap="square" rtlCol="0">
-              <a:spAutoFit/>
-            </a:bodyPr>
-            <a:lstStyle/>
-            <a:p>
-              <a:r>
-                <a:rPr kumimoji="1" lang="en-US" altLang="ja-JP" sz="1400" dirty="0"/>
-                <a:t>Pre-master Secret</a:t>
-              </a:r>
-            </a:p>
-          </p:txBody>
-        </p:sp>
-        <p:sp>
-          <p:nvSpPr>
-            <p:cNvPr id="50" name="円柱 49">
-              <a:extLst>
-                <a:ext uri="{FF2B5EF4-FFF2-40B4-BE49-F238E27FC236}">
-                  <a16:creationId xmlns:a16="http://schemas.microsoft.com/office/drawing/2014/main" id="{BE273921-F424-0A4A-BEFE-C33688AAD4EE}"/>
-                </a:ext>
-              </a:extLst>
-            </p:cNvPr>
-            <p:cNvSpPr/>
-            <p:nvPr/>
-          </p:nvSpPr>
-          <p:spPr>
-            <a:xfrm rot="5400000">
-              <a:off x="5878952" y="4634604"/>
-              <a:ext cx="359628" cy="2191472"/>
-            </a:xfrm>
-            <a:prstGeom prst="can">
-              <a:avLst/>
-            </a:prstGeom>
-            <a:noFill/>
-            <a:ln w="19050">
-              <a:solidFill>
-                <a:schemeClr val="tx1"/>
-              </a:solidFill>
-            </a:ln>
-          </p:spPr>
-          <p:style>
-            <a:lnRef idx="2">
-              <a:schemeClr val="accent1">
-                <a:shade val="50000"/>
-              </a:schemeClr>
-            </a:lnRef>
-            <a:fillRef idx="1">
-              <a:schemeClr val="accent1"/>
-            </a:fillRef>
-            <a:effectRef idx="0">
-              <a:schemeClr val="accent1"/>
-            </a:effectRef>
-            <a:fontRef idx="minor">
-              <a:schemeClr val="lt1"/>
-            </a:fontRef>
-          </p:style>
-          <p:txBody>
-            <a:bodyPr rtlCol="0" anchor="ctr"/>
-            <a:lstStyle/>
-            <a:p>
-              <a:pPr algn="ctr"/>
-              <a:endParaRPr kumimoji="1" lang="ja-JP" altLang="en-US" sz="1600"/>
-            </a:p>
-          </p:txBody>
-        </p:sp>
-        <p:sp>
-          <p:nvSpPr>
-            <p:cNvPr id="51" name="テキスト ボックス 50">
-              <a:extLst>
-                <a:ext uri="{FF2B5EF4-FFF2-40B4-BE49-F238E27FC236}">
-                  <a16:creationId xmlns:a16="http://schemas.microsoft.com/office/drawing/2014/main" id="{19197817-3EB6-0245-B6DE-BE7769268F97}"/>
-                </a:ext>
-              </a:extLst>
-            </p:cNvPr>
-            <p:cNvSpPr txBox="1"/>
-            <p:nvPr/>
-          </p:nvSpPr>
-          <p:spPr>
-            <a:xfrm>
-              <a:off x="5402856" y="5550524"/>
-              <a:ext cx="1151277" cy="368953"/>
-            </a:xfrm>
-            <a:prstGeom prst="rect">
-              <a:avLst/>
-            </a:prstGeom>
-            <a:noFill/>
-          </p:spPr>
-          <p:txBody>
-            <a:bodyPr wrap="square" rtlCol="0">
-              <a:spAutoFit/>
-            </a:bodyPr>
-            <a:lstStyle/>
-            <a:p>
-              <a:pPr algn="ctr"/>
-              <a:r>
-                <a:rPr kumimoji="1" lang="en-US" altLang="ja-JP" sz="1400" dirty="0"/>
-                <a:t>DH</a:t>
-              </a:r>
-            </a:p>
-          </p:txBody>
-        </p:sp>
-        <p:sp>
-          <p:nvSpPr>
-            <p:cNvPr id="54" name="フリーフォーム 53">
-              <a:extLst>
-                <a:ext uri="{FF2B5EF4-FFF2-40B4-BE49-F238E27FC236}">
-                  <a16:creationId xmlns:a16="http://schemas.microsoft.com/office/drawing/2014/main" id="{E0BAA64A-FA1D-2240-9988-2DCB9F01774F}"/>
-                </a:ext>
-              </a:extLst>
-            </p:cNvPr>
-            <p:cNvSpPr/>
-            <p:nvPr/>
-          </p:nvSpPr>
-          <p:spPr>
-            <a:xfrm flipH="1" flipV="1">
-              <a:off x="7064333" y="5753411"/>
-              <a:ext cx="2471895" cy="480011"/>
-            </a:xfrm>
-            <a:custGeom>
-              <a:avLst/>
-              <a:gdLst>
-                <a:gd name="connsiteX0" fmla="*/ 0 w 2471895"/>
-                <a:gd name="connsiteY0" fmla="*/ 0 h 823965"/>
-                <a:gd name="connsiteX1" fmla="*/ 0 w 2471895"/>
-                <a:gd name="connsiteY1" fmla="*/ 673239 h 823965"/>
-                <a:gd name="connsiteX2" fmla="*/ 100484 w 2471895"/>
-                <a:gd name="connsiteY2" fmla="*/ 823965 h 823965"/>
-                <a:gd name="connsiteX3" fmla="*/ 2471895 w 2471895"/>
-                <a:gd name="connsiteY3" fmla="*/ 823965 h 823965"/>
-              </a:gdLst>
-              <a:ahLst/>
-              <a:cxnLst>
-                <a:cxn ang="0">
-                  <a:pos x="connsiteX0" y="connsiteY0"/>
-                </a:cxn>
-                <a:cxn ang="0">
-                  <a:pos x="connsiteX1" y="connsiteY1"/>
-                </a:cxn>
-                <a:cxn ang="0">
-                  <a:pos x="connsiteX2" y="connsiteY2"/>
-                </a:cxn>
-                <a:cxn ang="0">
-                  <a:pos x="connsiteX3" y="connsiteY3"/>
-                </a:cxn>
-              </a:cxnLst>
-              <a:rect l="l" t="t" r="r" b="b"/>
-              <a:pathLst>
-                <a:path w="2471895" h="823965">
-                  <a:moveTo>
-                    <a:pt x="0" y="0"/>
-                  </a:moveTo>
-                  <a:lnTo>
-                    <a:pt x="0" y="673239"/>
-                  </a:lnTo>
-                  <a:lnTo>
-                    <a:pt x="100484" y="823965"/>
-                  </a:lnTo>
-                  <a:lnTo>
-                    <a:pt x="2471895" y="823965"/>
-                  </a:lnTo>
-                </a:path>
-              </a:pathLst>
-            </a:custGeom>
-            <a:noFill/>
-            <a:ln w="19050">
-              <a:solidFill>
-                <a:schemeClr val="tx1"/>
-              </a:solidFill>
-              <a:headEnd type="arrow" w="med" len="med"/>
-              <a:tailEnd type="none" w="med" len="med"/>
-            </a:ln>
-          </p:spPr>
-          <p:style>
-            <a:lnRef idx="2">
-              <a:schemeClr val="accent1">
-                <a:shade val="50000"/>
-              </a:schemeClr>
-            </a:lnRef>
-            <a:fillRef idx="1">
-              <a:schemeClr val="accent1"/>
-            </a:fillRef>
-            <a:effectRef idx="0">
-              <a:schemeClr val="accent1"/>
-            </a:effectRef>
-            <a:fontRef idx="minor">
-              <a:schemeClr val="lt1"/>
-            </a:fontRef>
-          </p:style>
-          <p:txBody>
-            <a:bodyPr rtlCol="0" anchor="ctr"/>
-            <a:lstStyle/>
-            <a:p>
-              <a:pPr algn="ctr"/>
-              <a:endParaRPr kumimoji="1" lang="ja-JP" altLang="en-US" sz="1600"/>
-            </a:p>
-          </p:txBody>
-        </p:sp>
-        <p:sp>
-          <p:nvSpPr>
-            <p:cNvPr id="57" name="フリーフォーム 56">
-              <a:extLst>
-                <a:ext uri="{FF2B5EF4-FFF2-40B4-BE49-F238E27FC236}">
-                  <a16:creationId xmlns:a16="http://schemas.microsoft.com/office/drawing/2014/main" id="{7E7F8067-77BC-8B45-9972-B08A7B3FFF77}"/>
-                </a:ext>
-              </a:extLst>
-            </p:cNvPr>
-            <p:cNvSpPr/>
-            <p:nvPr/>
-          </p:nvSpPr>
-          <p:spPr>
-            <a:xfrm flipV="1">
-              <a:off x="2505392" y="5770652"/>
-              <a:ext cx="2471895" cy="480011"/>
-            </a:xfrm>
-            <a:custGeom>
-              <a:avLst/>
-              <a:gdLst>
-                <a:gd name="connsiteX0" fmla="*/ 0 w 2471895"/>
-                <a:gd name="connsiteY0" fmla="*/ 0 h 823965"/>
-                <a:gd name="connsiteX1" fmla="*/ 0 w 2471895"/>
-                <a:gd name="connsiteY1" fmla="*/ 673239 h 823965"/>
-                <a:gd name="connsiteX2" fmla="*/ 100484 w 2471895"/>
-                <a:gd name="connsiteY2" fmla="*/ 823965 h 823965"/>
-                <a:gd name="connsiteX3" fmla="*/ 2471895 w 2471895"/>
-                <a:gd name="connsiteY3" fmla="*/ 823965 h 823965"/>
-              </a:gdLst>
-              <a:ahLst/>
-              <a:cxnLst>
-                <a:cxn ang="0">
-                  <a:pos x="connsiteX0" y="connsiteY0"/>
-                </a:cxn>
-                <a:cxn ang="0">
-                  <a:pos x="connsiteX1" y="connsiteY1"/>
-                </a:cxn>
-                <a:cxn ang="0">
-                  <a:pos x="connsiteX2" y="connsiteY2"/>
-                </a:cxn>
-                <a:cxn ang="0">
-                  <a:pos x="connsiteX3" y="connsiteY3"/>
-                </a:cxn>
-              </a:cxnLst>
-              <a:rect l="l" t="t" r="r" b="b"/>
-              <a:pathLst>
-                <a:path w="2471895" h="823965">
-                  <a:moveTo>
-                    <a:pt x="0" y="0"/>
-                  </a:moveTo>
-                  <a:lnTo>
-                    <a:pt x="0" y="673239"/>
-                  </a:lnTo>
-                  <a:lnTo>
-                    <a:pt x="100484" y="823965"/>
-                  </a:lnTo>
-                  <a:lnTo>
-                    <a:pt x="2471895" y="823965"/>
-                  </a:lnTo>
-                </a:path>
-              </a:pathLst>
-            </a:custGeom>
-            <a:noFill/>
-            <a:ln w="19050">
-              <a:solidFill>
-                <a:schemeClr val="tx1"/>
-              </a:solidFill>
-              <a:headEnd type="arrow" w="med" len="med"/>
-              <a:tailEnd type="none" w="med" len="med"/>
-            </a:ln>
-          </p:spPr>
-          <p:style>
-            <a:lnRef idx="2">
-              <a:schemeClr val="accent1">
-                <a:shade val="50000"/>
-              </a:schemeClr>
-            </a:lnRef>
-            <a:fillRef idx="1">
-              <a:schemeClr val="accent1"/>
-            </a:fillRef>
-            <a:effectRef idx="0">
-              <a:schemeClr val="accent1"/>
-            </a:effectRef>
-            <a:fontRef idx="minor">
-              <a:schemeClr val="lt1"/>
-            </a:fontRef>
-          </p:style>
-          <p:txBody>
-            <a:bodyPr rtlCol="0" anchor="ctr"/>
-            <a:lstStyle/>
-            <a:p>
-              <a:pPr algn="ctr"/>
-              <a:endParaRPr kumimoji="1" lang="ja-JP" altLang="en-US" sz="1600"/>
-            </a:p>
-          </p:txBody>
-        </p:sp>
-        <p:sp>
-          <p:nvSpPr>
-            <p:cNvPr id="31" name="正方形/長方形 30">
-              <a:extLst>
-                <a:ext uri="{FF2B5EF4-FFF2-40B4-BE49-F238E27FC236}">
-                  <a16:creationId xmlns:a16="http://schemas.microsoft.com/office/drawing/2014/main" id="{A165FC1C-03B1-8647-A91B-FDE46CC3979C}"/>
-                </a:ext>
-              </a:extLst>
-            </p:cNvPr>
-            <p:cNvSpPr/>
-            <p:nvPr/>
-          </p:nvSpPr>
-          <p:spPr>
-            <a:xfrm>
-              <a:off x="1828800" y="4423939"/>
-              <a:ext cx="1396722" cy="463164"/>
-            </a:xfrm>
-            <a:prstGeom prst="rect">
-              <a:avLst/>
-            </a:prstGeom>
+            </a:solidFill>
+          </a:ln>
+        </p:spPr>
+        <p:style>
+          <a:lnRef idx="2">
+            <a:schemeClr val="accent1">
+              <a:shade val="50000"/>
+            </a:schemeClr>
+          </a:lnRef>
+          <a:fillRef idx="1">
+            <a:schemeClr val="accent1"/>
+          </a:fillRef>
+          <a:effectRef idx="0">
+            <a:schemeClr val="accent1"/>
+          </a:effectRef>
+          <a:fontRef idx="minor">
+            <a:schemeClr val="lt1"/>
+          </a:fontRef>
+        </p:style>
+        <p:txBody>
+          <a:bodyPr rtlCol="0" anchor="ctr"/>
+          <a:lstStyle/>
+          <a:p>
+            <a:pPr algn="ctr"/>
+            <a:endParaRPr kumimoji="1" lang="ja-JP" altLang="en-US" sz="1600"/>
+          </a:p>
+        </p:txBody>
+      </p:sp>
+      <p:sp>
+        <p:nvSpPr>
+          <p:cNvPr id="37" name="テキスト ボックス 36">
+            <a:extLst>
+              <a:ext uri="{FF2B5EF4-FFF2-40B4-BE49-F238E27FC236}">
+                <a16:creationId xmlns:a16="http://schemas.microsoft.com/office/drawing/2014/main" id="{DB8B0FCA-B0A0-AA46-8E07-8771070D9A6B}"/>
+              </a:ext>
+            </a:extLst>
+          </p:cNvPr>
+          <p:cNvSpPr txBox="1"/>
+          <p:nvPr/>
+        </p:nvSpPr>
+        <p:spPr>
+          <a:xfrm>
+            <a:off x="433327" y="5157785"/>
+            <a:ext cx="1151277" cy="479914"/>
+          </a:xfrm>
+          <a:prstGeom prst="rect">
+            <a:avLst/>
+          </a:prstGeom>
+          <a:noFill/>
+        </p:spPr>
+        <p:txBody>
+          <a:bodyPr wrap="square" rtlCol="0">
+            <a:spAutoFit/>
+          </a:bodyPr>
+          <a:lstStyle/>
+          <a:p>
+            <a:pPr algn="ctr"/>
+            <a:r>
+              <a:rPr kumimoji="1" lang="en-US" altLang="ja-JP" sz="1400" dirty="0"/>
+              <a:t>DH</a:t>
+            </a:r>
+          </a:p>
+          <a:p>
+            <a:pPr algn="ctr"/>
+            <a:r>
+              <a:rPr lang="en-US" altLang="ja-JP" sz="1400" dirty="0"/>
+              <a:t>Key Share</a:t>
+            </a:r>
+            <a:endParaRPr kumimoji="1" lang="ja-JP" altLang="en-US" sz="1400"/>
+          </a:p>
+        </p:txBody>
+      </p:sp>
+      <p:sp>
+        <p:nvSpPr>
+          <p:cNvPr id="41" name="正方形/長方形 40">
+            <a:extLst>
+              <a:ext uri="{FF2B5EF4-FFF2-40B4-BE49-F238E27FC236}">
+                <a16:creationId xmlns:a16="http://schemas.microsoft.com/office/drawing/2014/main" id="{0583D151-9A49-A248-802B-2C46AF5E8B0E}"/>
+              </a:ext>
+            </a:extLst>
+          </p:cNvPr>
+          <p:cNvSpPr/>
+          <p:nvPr/>
+        </p:nvSpPr>
+        <p:spPr>
+          <a:xfrm>
+            <a:off x="10695262" y="5153521"/>
+            <a:ext cx="1396722" cy="467074"/>
+          </a:xfrm>
+          <a:prstGeom prst="rect">
+            <a:avLst/>
+          </a:prstGeom>
+          <a:noFill/>
+          <a:ln w="19050">
             <a:solidFill>
-              <a:schemeClr val="bg1"/>
+              <a:schemeClr val="tx1"/>
             </a:solidFill>
-            <a:ln w="19050">
-              <a:solidFill>
-                <a:schemeClr val="tx1"/>
-              </a:solidFill>
-            </a:ln>
-          </p:spPr>
-          <p:style>
-            <a:lnRef idx="2">
-              <a:schemeClr val="accent1">
-                <a:shade val="50000"/>
-              </a:schemeClr>
-            </a:lnRef>
-            <a:fillRef idx="1">
-              <a:schemeClr val="accent1"/>
-            </a:fillRef>
-            <a:effectRef idx="0">
-              <a:schemeClr val="accent1"/>
-            </a:effectRef>
-            <a:fontRef idx="minor">
-              <a:schemeClr val="lt1"/>
-            </a:fontRef>
-          </p:style>
-          <p:txBody>
-            <a:bodyPr rtlCol="0" anchor="ctr"/>
-            <a:lstStyle/>
-            <a:p>
-              <a:pPr algn="ctr"/>
-              <a:endParaRPr kumimoji="1" lang="ja-JP" altLang="en-US" sz="1600"/>
-            </a:p>
-          </p:txBody>
-        </p:sp>
-        <p:sp>
-          <p:nvSpPr>
-            <p:cNvPr id="33" name="テキスト ボックス 32">
-              <a:extLst>
-                <a:ext uri="{FF2B5EF4-FFF2-40B4-BE49-F238E27FC236}">
-                  <a16:creationId xmlns:a16="http://schemas.microsoft.com/office/drawing/2014/main" id="{B77A94D4-E44F-B942-A3F4-495DD132276D}"/>
-                </a:ext>
-              </a:extLst>
-            </p:cNvPr>
-            <p:cNvSpPr txBox="1"/>
-            <p:nvPr/>
-          </p:nvSpPr>
-          <p:spPr>
-            <a:xfrm>
-              <a:off x="2172631" y="4537822"/>
-              <a:ext cx="591829" cy="368953"/>
-            </a:xfrm>
-            <a:prstGeom prst="rect">
-              <a:avLst/>
-            </a:prstGeom>
-            <a:noFill/>
-          </p:spPr>
-          <p:txBody>
-            <a:bodyPr wrap="square" rtlCol="0">
-              <a:spAutoFit/>
-            </a:bodyPr>
-            <a:lstStyle/>
-            <a:p>
-              <a:r>
-                <a:rPr kumimoji="1" lang="en-US" altLang="ja-JP" sz="1400" dirty="0"/>
-                <a:t>PSK</a:t>
-              </a:r>
-              <a:endParaRPr kumimoji="1" lang="ja-JP" altLang="en-US" sz="1400"/>
-            </a:p>
-          </p:txBody>
-        </p:sp>
-        <p:sp>
-          <p:nvSpPr>
-            <p:cNvPr id="34" name="正方形/長方形 33">
-              <a:extLst>
-                <a:ext uri="{FF2B5EF4-FFF2-40B4-BE49-F238E27FC236}">
-                  <a16:creationId xmlns:a16="http://schemas.microsoft.com/office/drawing/2014/main" id="{5FAAC5D9-5500-C644-A5D4-4C704DEA93E6}"/>
-                </a:ext>
-              </a:extLst>
-            </p:cNvPr>
-            <p:cNvSpPr/>
-            <p:nvPr/>
-          </p:nvSpPr>
-          <p:spPr>
-            <a:xfrm>
-              <a:off x="8837868" y="4526937"/>
-              <a:ext cx="1396722" cy="433504"/>
-            </a:xfrm>
-            <a:prstGeom prst="rect">
-              <a:avLst/>
-            </a:prstGeom>
+          </a:ln>
+        </p:spPr>
+        <p:style>
+          <a:lnRef idx="2">
+            <a:schemeClr val="accent1">
+              <a:shade val="50000"/>
+            </a:schemeClr>
+          </a:lnRef>
+          <a:fillRef idx="1">
+            <a:schemeClr val="accent1"/>
+          </a:fillRef>
+          <a:effectRef idx="0">
+            <a:schemeClr val="accent1"/>
+          </a:effectRef>
+          <a:fontRef idx="minor">
+            <a:schemeClr val="lt1"/>
+          </a:fontRef>
+        </p:style>
+        <p:txBody>
+          <a:bodyPr rtlCol="0" anchor="ctr"/>
+          <a:lstStyle/>
+          <a:p>
+            <a:pPr algn="ctr"/>
+            <a:endParaRPr kumimoji="1" lang="ja-JP" altLang="en-US" sz="1600"/>
+          </a:p>
+        </p:txBody>
+      </p:sp>
+      <p:sp>
+        <p:nvSpPr>
+          <p:cNvPr id="42" name="テキスト ボックス 41">
+            <a:extLst>
+              <a:ext uri="{FF2B5EF4-FFF2-40B4-BE49-F238E27FC236}">
+                <a16:creationId xmlns:a16="http://schemas.microsoft.com/office/drawing/2014/main" id="{84370A4D-41BD-8F46-872A-414C683EF15F}"/>
+              </a:ext>
+            </a:extLst>
+          </p:cNvPr>
+          <p:cNvSpPr txBox="1"/>
+          <p:nvPr/>
+        </p:nvSpPr>
+        <p:spPr>
+          <a:xfrm>
+            <a:off x="10784240" y="5173157"/>
+            <a:ext cx="1151277" cy="479914"/>
+          </a:xfrm>
+          <a:prstGeom prst="rect">
+            <a:avLst/>
+          </a:prstGeom>
+          <a:noFill/>
+        </p:spPr>
+        <p:txBody>
+          <a:bodyPr wrap="square" rtlCol="0">
+            <a:spAutoFit/>
+          </a:bodyPr>
+          <a:lstStyle/>
+          <a:p>
+            <a:pPr algn="ctr"/>
+            <a:r>
+              <a:rPr kumimoji="1" lang="en-US" altLang="ja-JP" sz="1400" dirty="0"/>
+              <a:t>DH</a:t>
+            </a:r>
+          </a:p>
+          <a:p>
+            <a:pPr algn="ctr"/>
+            <a:r>
+              <a:rPr lang="en-US" altLang="ja-JP" sz="1400" dirty="0"/>
+              <a:t>Key Share</a:t>
+            </a:r>
+            <a:endParaRPr kumimoji="1" lang="ja-JP" altLang="en-US" sz="1400"/>
+          </a:p>
+        </p:txBody>
+      </p:sp>
+      <p:cxnSp>
+        <p:nvCxnSpPr>
+          <p:cNvPr id="44" name="直線コネクタ 43">
+            <a:extLst>
+              <a:ext uri="{FF2B5EF4-FFF2-40B4-BE49-F238E27FC236}">
+                <a16:creationId xmlns:a16="http://schemas.microsoft.com/office/drawing/2014/main" id="{DC6F7D6B-2E80-1E47-A60F-EA0A1FEE5D9E}"/>
+              </a:ext>
+            </a:extLst>
+          </p:cNvPr>
+          <p:cNvCxnSpPr>
+            <a:cxnSpLocks/>
+          </p:cNvCxnSpPr>
+          <p:nvPr/>
+        </p:nvCxnSpPr>
+        <p:spPr>
+          <a:xfrm>
+            <a:off x="1741071" y="5370267"/>
+            <a:ext cx="8954191" cy="12590"/>
+          </a:xfrm>
+          <a:prstGeom prst="line">
+            <a:avLst/>
+          </a:prstGeom>
+          <a:ln w="19050">
             <a:solidFill>
-              <a:schemeClr val="bg1"/>
+              <a:schemeClr val="tx1"/>
             </a:solidFill>
-            <a:ln w="19050">
-              <a:solidFill>
-                <a:schemeClr val="tx1"/>
-              </a:solidFill>
-            </a:ln>
-          </p:spPr>
-          <p:style>
-            <a:lnRef idx="2">
-              <a:schemeClr val="accent1">
-                <a:shade val="50000"/>
-              </a:schemeClr>
-            </a:lnRef>
-            <a:fillRef idx="1">
-              <a:schemeClr val="accent1"/>
-            </a:fillRef>
-            <a:effectRef idx="0">
-              <a:schemeClr val="accent1"/>
-            </a:effectRef>
-            <a:fontRef idx="minor">
-              <a:schemeClr val="lt1"/>
-            </a:fontRef>
-          </p:style>
-          <p:txBody>
-            <a:bodyPr rtlCol="0" anchor="ctr"/>
-            <a:lstStyle/>
-            <a:p>
-              <a:pPr algn="ctr"/>
-              <a:endParaRPr kumimoji="1" lang="ja-JP" altLang="en-US" sz="1600"/>
-            </a:p>
-          </p:txBody>
-        </p:sp>
-        <p:sp>
-          <p:nvSpPr>
-            <p:cNvPr id="35" name="テキスト ボックス 34">
-              <a:extLst>
-                <a:ext uri="{FF2B5EF4-FFF2-40B4-BE49-F238E27FC236}">
-                  <a16:creationId xmlns:a16="http://schemas.microsoft.com/office/drawing/2014/main" id="{C01167D6-9F3B-CE4F-A7B7-E953CBEC1F97}"/>
-                </a:ext>
-              </a:extLst>
-            </p:cNvPr>
-            <p:cNvSpPr txBox="1"/>
-            <p:nvPr/>
-          </p:nvSpPr>
-          <p:spPr>
-            <a:xfrm>
-              <a:off x="9200792" y="4559212"/>
-              <a:ext cx="591829" cy="368953"/>
-            </a:xfrm>
-            <a:prstGeom prst="rect">
-              <a:avLst/>
-            </a:prstGeom>
-            <a:noFill/>
-          </p:spPr>
-          <p:txBody>
-            <a:bodyPr wrap="square" rtlCol="0">
-              <a:spAutoFit/>
-            </a:bodyPr>
-            <a:lstStyle/>
-            <a:p>
-              <a:r>
-                <a:rPr kumimoji="1" lang="en-US" altLang="ja-JP" sz="1400" dirty="0"/>
-                <a:t>PSK</a:t>
-              </a:r>
-              <a:endParaRPr kumimoji="1" lang="ja-JP" altLang="en-US" sz="1400"/>
-            </a:p>
-          </p:txBody>
-        </p:sp>
-        <p:sp>
-          <p:nvSpPr>
-            <p:cNvPr id="8" name="テキスト ボックス 7">
-              <a:extLst>
-                <a:ext uri="{FF2B5EF4-FFF2-40B4-BE49-F238E27FC236}">
-                  <a16:creationId xmlns:a16="http://schemas.microsoft.com/office/drawing/2014/main" id="{67267F13-C660-0147-9E8B-49AB435D971B}"/>
-                </a:ext>
-              </a:extLst>
-            </p:cNvPr>
-            <p:cNvSpPr txBox="1"/>
-            <p:nvPr/>
-          </p:nvSpPr>
-          <p:spPr>
-            <a:xfrm>
-              <a:off x="8618832" y="881683"/>
-              <a:ext cx="2710996" cy="368953"/>
-            </a:xfrm>
-            <a:prstGeom prst="rect">
-              <a:avLst/>
-            </a:prstGeom>
+            <a:headEnd type="none" w="med" len="med"/>
+            <a:tailEnd type="arrow" w="med" len="med"/>
+          </a:ln>
+        </p:spPr>
+        <p:style>
+          <a:lnRef idx="1">
+            <a:schemeClr val="accent1"/>
+          </a:lnRef>
+          <a:fillRef idx="0">
+            <a:schemeClr val="accent1"/>
+          </a:fillRef>
+          <a:effectRef idx="0">
+            <a:schemeClr val="accent1"/>
+          </a:effectRef>
+          <a:fontRef idx="minor">
+            <a:schemeClr val="tx1"/>
+          </a:fontRef>
+        </p:style>
+      </p:cxnSp>
+      <p:sp>
+        <p:nvSpPr>
+          <p:cNvPr id="45" name="正方形/長方形 44">
+            <a:extLst>
+              <a:ext uri="{FF2B5EF4-FFF2-40B4-BE49-F238E27FC236}">
+                <a16:creationId xmlns:a16="http://schemas.microsoft.com/office/drawing/2014/main" id="{CD33FFB4-3146-9747-B413-1AFA70DC1DF7}"/>
+              </a:ext>
+            </a:extLst>
+          </p:cNvPr>
+          <p:cNvSpPr/>
+          <p:nvPr/>
+        </p:nvSpPr>
+        <p:spPr>
+          <a:xfrm>
+            <a:off x="8453552" y="6074718"/>
+            <a:ext cx="2524251" cy="409571"/>
+          </a:xfrm>
+          <a:prstGeom prst="rect">
+            <a:avLst/>
+          </a:prstGeom>
+          <a:noFill/>
+          <a:ln w="19050">
             <a:solidFill>
-              <a:schemeClr val="bg1"/>
+              <a:schemeClr val="tx1"/>
             </a:solidFill>
-          </p:spPr>
-          <p:txBody>
-            <a:bodyPr wrap="square" rtlCol="0">
-              <a:spAutoFit/>
-            </a:bodyPr>
-            <a:lstStyle/>
-            <a:p>
-              <a:r>
-                <a:rPr kumimoji="1" lang="en-US" altLang="ja-JP" sz="1400" dirty="0"/>
-                <a:t>HKDF(</a:t>
-              </a:r>
-              <a:r>
-                <a:rPr lang="en-US" altLang="ja-JP" sz="1400" dirty="0"/>
-                <a:t>"s ap traffic"</a:t>
-              </a:r>
-              <a:r>
-                <a:rPr kumimoji="1" lang="en-US" altLang="ja-JP" sz="1400" dirty="0"/>
-                <a:t>)</a:t>
-              </a:r>
-              <a:endParaRPr kumimoji="1" lang="ja-JP" altLang="en-US" sz="1400"/>
-            </a:p>
-          </p:txBody>
-        </p:sp>
-      </p:grpSp>
+          </a:ln>
+        </p:spPr>
+        <p:style>
+          <a:lnRef idx="2">
+            <a:schemeClr val="accent1">
+              <a:shade val="50000"/>
+            </a:schemeClr>
+          </a:lnRef>
+          <a:fillRef idx="1">
+            <a:schemeClr val="accent1"/>
+          </a:fillRef>
+          <a:effectRef idx="0">
+            <a:schemeClr val="accent1"/>
+          </a:effectRef>
+          <a:fontRef idx="minor">
+            <a:schemeClr val="lt1"/>
+          </a:fontRef>
+        </p:style>
+        <p:txBody>
+          <a:bodyPr rtlCol="0" anchor="ctr"/>
+          <a:lstStyle/>
+          <a:p>
+            <a:pPr algn="ctr"/>
+            <a:endParaRPr kumimoji="1" lang="ja-JP" altLang="en-US" sz="1600"/>
+          </a:p>
+        </p:txBody>
+      </p:sp>
+      <p:sp>
+        <p:nvSpPr>
+          <p:cNvPr id="46" name="テキスト ボックス 45">
+            <a:extLst>
+              <a:ext uri="{FF2B5EF4-FFF2-40B4-BE49-F238E27FC236}">
+                <a16:creationId xmlns:a16="http://schemas.microsoft.com/office/drawing/2014/main" id="{F9ACBC8F-69AF-DF41-87C9-77FF7D76AFBF}"/>
+              </a:ext>
+            </a:extLst>
+          </p:cNvPr>
+          <p:cNvSpPr txBox="1"/>
+          <p:nvPr/>
+        </p:nvSpPr>
+        <p:spPr>
+          <a:xfrm>
+            <a:off x="8687077" y="6128452"/>
+            <a:ext cx="2247308" cy="282303"/>
+          </a:xfrm>
+          <a:prstGeom prst="rect">
+            <a:avLst/>
+          </a:prstGeom>
+          <a:noFill/>
+        </p:spPr>
+        <p:txBody>
+          <a:bodyPr wrap="square" rtlCol="0">
+            <a:spAutoFit/>
+          </a:bodyPr>
+          <a:lstStyle/>
+          <a:p>
+            <a:r>
+              <a:rPr kumimoji="1" lang="en-US" altLang="ja-JP" sz="1400" dirty="0"/>
+              <a:t>Pre-master Secret</a:t>
+            </a:r>
+          </a:p>
+        </p:txBody>
+      </p:sp>
+      <p:sp>
+        <p:nvSpPr>
+          <p:cNvPr id="47" name="正方形/長方形 46">
+            <a:extLst>
+              <a:ext uri="{FF2B5EF4-FFF2-40B4-BE49-F238E27FC236}">
+                <a16:creationId xmlns:a16="http://schemas.microsoft.com/office/drawing/2014/main" id="{341E6C62-223A-B74D-AE7B-CAFCD9B818D1}"/>
+              </a:ext>
+            </a:extLst>
+          </p:cNvPr>
+          <p:cNvSpPr/>
+          <p:nvPr/>
+        </p:nvSpPr>
+        <p:spPr>
+          <a:xfrm>
+            <a:off x="1507546" y="6081863"/>
+            <a:ext cx="2524251" cy="409570"/>
+          </a:xfrm>
+          <a:prstGeom prst="rect">
+            <a:avLst/>
+          </a:prstGeom>
+          <a:noFill/>
+          <a:ln w="19050">
+            <a:solidFill>
+              <a:schemeClr val="tx1"/>
+            </a:solidFill>
+          </a:ln>
+        </p:spPr>
+        <p:style>
+          <a:lnRef idx="2">
+            <a:schemeClr val="accent1">
+              <a:shade val="50000"/>
+            </a:schemeClr>
+          </a:lnRef>
+          <a:fillRef idx="1">
+            <a:schemeClr val="accent1"/>
+          </a:fillRef>
+          <a:effectRef idx="0">
+            <a:schemeClr val="accent1"/>
+          </a:effectRef>
+          <a:fontRef idx="minor">
+            <a:schemeClr val="lt1"/>
+          </a:fontRef>
+        </p:style>
+        <p:txBody>
+          <a:bodyPr rtlCol="0" anchor="ctr"/>
+          <a:lstStyle/>
+          <a:p>
+            <a:pPr algn="ctr"/>
+            <a:endParaRPr kumimoji="1" lang="ja-JP" altLang="en-US" sz="1600"/>
+          </a:p>
+        </p:txBody>
+      </p:sp>
+      <p:sp>
+        <p:nvSpPr>
+          <p:cNvPr id="48" name="テキスト ボックス 47">
+            <a:extLst>
+              <a:ext uri="{FF2B5EF4-FFF2-40B4-BE49-F238E27FC236}">
+                <a16:creationId xmlns:a16="http://schemas.microsoft.com/office/drawing/2014/main" id="{BA19D37D-45C3-684E-88F2-04BFF5C8AC84}"/>
+              </a:ext>
+            </a:extLst>
+          </p:cNvPr>
+          <p:cNvSpPr txBox="1"/>
+          <p:nvPr/>
+        </p:nvSpPr>
+        <p:spPr>
+          <a:xfrm>
+            <a:off x="1741071" y="6135595"/>
+            <a:ext cx="2247308" cy="282303"/>
+          </a:xfrm>
+          <a:prstGeom prst="rect">
+            <a:avLst/>
+          </a:prstGeom>
+          <a:noFill/>
+        </p:spPr>
+        <p:txBody>
+          <a:bodyPr wrap="square" rtlCol="0">
+            <a:spAutoFit/>
+          </a:bodyPr>
+          <a:lstStyle/>
+          <a:p>
+            <a:r>
+              <a:rPr kumimoji="1" lang="en-US" altLang="ja-JP" sz="1400" dirty="0"/>
+              <a:t>Pre-master Secret</a:t>
+            </a:r>
+          </a:p>
+        </p:txBody>
+      </p:sp>
+      <p:sp>
+        <p:nvSpPr>
+          <p:cNvPr id="50" name="円柱 49">
+            <a:extLst>
+              <a:ext uri="{FF2B5EF4-FFF2-40B4-BE49-F238E27FC236}">
+                <a16:creationId xmlns:a16="http://schemas.microsoft.com/office/drawing/2014/main" id="{BE273921-F424-0A4A-BEFE-C33688AAD4EE}"/>
+              </a:ext>
+            </a:extLst>
+          </p:cNvPr>
+          <p:cNvSpPr/>
+          <p:nvPr/>
+        </p:nvSpPr>
+        <p:spPr>
+          <a:xfrm rot="5400000">
+            <a:off x="6140152" y="4559428"/>
+            <a:ext cx="275168" cy="2191472"/>
+          </a:xfrm>
+          <a:prstGeom prst="can">
+            <a:avLst/>
+          </a:prstGeom>
+          <a:noFill/>
+          <a:ln w="19050">
+            <a:solidFill>
+              <a:schemeClr val="tx1"/>
+            </a:solidFill>
+          </a:ln>
+        </p:spPr>
+        <p:style>
+          <a:lnRef idx="2">
+            <a:schemeClr val="accent1">
+              <a:shade val="50000"/>
+            </a:schemeClr>
+          </a:lnRef>
+          <a:fillRef idx="1">
+            <a:schemeClr val="accent1"/>
+          </a:fillRef>
+          <a:effectRef idx="0">
+            <a:schemeClr val="accent1"/>
+          </a:effectRef>
+          <a:fontRef idx="minor">
+            <a:schemeClr val="lt1"/>
+          </a:fontRef>
+        </p:style>
+        <p:txBody>
+          <a:bodyPr rtlCol="0" anchor="ctr"/>
+          <a:lstStyle/>
+          <a:p>
+            <a:pPr algn="ctr"/>
+            <a:endParaRPr kumimoji="1" lang="ja-JP" altLang="en-US" sz="1600"/>
+          </a:p>
+        </p:txBody>
+      </p:sp>
+      <p:sp>
+        <p:nvSpPr>
+          <p:cNvPr id="51" name="テキスト ボックス 50">
+            <a:extLst>
+              <a:ext uri="{FF2B5EF4-FFF2-40B4-BE49-F238E27FC236}">
+                <a16:creationId xmlns:a16="http://schemas.microsoft.com/office/drawing/2014/main" id="{19197817-3EB6-0245-B6DE-BE7769268F97}"/>
+              </a:ext>
+            </a:extLst>
+          </p:cNvPr>
+          <p:cNvSpPr txBox="1"/>
+          <p:nvPr/>
+        </p:nvSpPr>
+        <p:spPr>
+          <a:xfrm>
+            <a:off x="5621826" y="5546155"/>
+            <a:ext cx="1076799" cy="307777"/>
+          </a:xfrm>
+          <a:prstGeom prst="rect">
+            <a:avLst/>
+          </a:prstGeom>
+          <a:noFill/>
+        </p:spPr>
+        <p:txBody>
+          <a:bodyPr wrap="square" rtlCol="0">
+            <a:spAutoFit/>
+          </a:bodyPr>
+          <a:lstStyle/>
+          <a:p>
+            <a:pPr algn="ctr"/>
+            <a:r>
+              <a:rPr kumimoji="1" lang="en-US" altLang="ja-JP" sz="1400" dirty="0"/>
+              <a:t>DH</a:t>
+            </a:r>
+          </a:p>
+        </p:txBody>
+      </p:sp>
+      <p:sp>
+        <p:nvSpPr>
+          <p:cNvPr id="54" name="フリーフォーム 53">
+            <a:extLst>
+              <a:ext uri="{FF2B5EF4-FFF2-40B4-BE49-F238E27FC236}">
+                <a16:creationId xmlns:a16="http://schemas.microsoft.com/office/drawing/2014/main" id="{E0BAA64A-FA1D-2240-9988-2DCB9F01774F}"/>
+              </a:ext>
+            </a:extLst>
+          </p:cNvPr>
+          <p:cNvSpPr/>
+          <p:nvPr/>
+        </p:nvSpPr>
+        <p:spPr>
+          <a:xfrm flipH="1" flipV="1">
+            <a:off x="7283303" y="5701393"/>
+            <a:ext cx="2471895" cy="367278"/>
+          </a:xfrm>
+          <a:custGeom>
+            <a:avLst/>
+            <a:gdLst>
+              <a:gd name="connsiteX0" fmla="*/ 0 w 2471895"/>
+              <a:gd name="connsiteY0" fmla="*/ 0 h 823965"/>
+              <a:gd name="connsiteX1" fmla="*/ 0 w 2471895"/>
+              <a:gd name="connsiteY1" fmla="*/ 673239 h 823965"/>
+              <a:gd name="connsiteX2" fmla="*/ 100484 w 2471895"/>
+              <a:gd name="connsiteY2" fmla="*/ 823965 h 823965"/>
+              <a:gd name="connsiteX3" fmla="*/ 2471895 w 2471895"/>
+              <a:gd name="connsiteY3" fmla="*/ 823965 h 823965"/>
+            </a:gdLst>
+            <a:ahLst/>
+            <a:cxnLst>
+              <a:cxn ang="0">
+                <a:pos x="connsiteX0" y="connsiteY0"/>
+              </a:cxn>
+              <a:cxn ang="0">
+                <a:pos x="connsiteX1" y="connsiteY1"/>
+              </a:cxn>
+              <a:cxn ang="0">
+                <a:pos x="connsiteX2" y="connsiteY2"/>
+              </a:cxn>
+              <a:cxn ang="0">
+                <a:pos x="connsiteX3" y="connsiteY3"/>
+              </a:cxn>
+            </a:cxnLst>
+            <a:rect l="l" t="t" r="r" b="b"/>
+            <a:pathLst>
+              <a:path w="2471895" h="823965">
+                <a:moveTo>
+                  <a:pt x="0" y="0"/>
+                </a:moveTo>
+                <a:lnTo>
+                  <a:pt x="0" y="673239"/>
+                </a:lnTo>
+                <a:lnTo>
+                  <a:pt x="100484" y="823965"/>
+                </a:lnTo>
+                <a:lnTo>
+                  <a:pt x="2471895" y="823965"/>
+                </a:lnTo>
+              </a:path>
+            </a:pathLst>
+          </a:custGeom>
+          <a:noFill/>
+          <a:ln w="19050">
+            <a:solidFill>
+              <a:schemeClr val="tx1"/>
+            </a:solidFill>
+            <a:headEnd type="arrow" w="med" len="med"/>
+            <a:tailEnd type="none" w="med" len="med"/>
+          </a:ln>
+        </p:spPr>
+        <p:style>
+          <a:lnRef idx="2">
+            <a:schemeClr val="accent1">
+              <a:shade val="50000"/>
+            </a:schemeClr>
+          </a:lnRef>
+          <a:fillRef idx="1">
+            <a:schemeClr val="accent1"/>
+          </a:fillRef>
+          <a:effectRef idx="0">
+            <a:schemeClr val="accent1"/>
+          </a:effectRef>
+          <a:fontRef idx="minor">
+            <a:schemeClr val="lt1"/>
+          </a:fontRef>
+        </p:style>
+        <p:txBody>
+          <a:bodyPr rtlCol="0" anchor="ctr"/>
+          <a:lstStyle/>
+          <a:p>
+            <a:pPr algn="ctr"/>
+            <a:endParaRPr kumimoji="1" lang="ja-JP" altLang="en-US" sz="1600"/>
+          </a:p>
+        </p:txBody>
+      </p:sp>
+      <p:sp>
+        <p:nvSpPr>
+          <p:cNvPr id="57" name="フリーフォーム 56">
+            <a:extLst>
+              <a:ext uri="{FF2B5EF4-FFF2-40B4-BE49-F238E27FC236}">
+                <a16:creationId xmlns:a16="http://schemas.microsoft.com/office/drawing/2014/main" id="{7E7F8067-77BC-8B45-9972-B08A7B3FFF77}"/>
+              </a:ext>
+            </a:extLst>
+          </p:cNvPr>
+          <p:cNvSpPr/>
+          <p:nvPr/>
+        </p:nvSpPr>
+        <p:spPr>
+          <a:xfrm flipV="1">
+            <a:off x="2724362" y="5714584"/>
+            <a:ext cx="2471895" cy="367278"/>
+          </a:xfrm>
+          <a:custGeom>
+            <a:avLst/>
+            <a:gdLst>
+              <a:gd name="connsiteX0" fmla="*/ 0 w 2471895"/>
+              <a:gd name="connsiteY0" fmla="*/ 0 h 823965"/>
+              <a:gd name="connsiteX1" fmla="*/ 0 w 2471895"/>
+              <a:gd name="connsiteY1" fmla="*/ 673239 h 823965"/>
+              <a:gd name="connsiteX2" fmla="*/ 100484 w 2471895"/>
+              <a:gd name="connsiteY2" fmla="*/ 823965 h 823965"/>
+              <a:gd name="connsiteX3" fmla="*/ 2471895 w 2471895"/>
+              <a:gd name="connsiteY3" fmla="*/ 823965 h 823965"/>
+            </a:gdLst>
+            <a:ahLst/>
+            <a:cxnLst>
+              <a:cxn ang="0">
+                <a:pos x="connsiteX0" y="connsiteY0"/>
+              </a:cxn>
+              <a:cxn ang="0">
+                <a:pos x="connsiteX1" y="connsiteY1"/>
+              </a:cxn>
+              <a:cxn ang="0">
+                <a:pos x="connsiteX2" y="connsiteY2"/>
+              </a:cxn>
+              <a:cxn ang="0">
+                <a:pos x="connsiteX3" y="connsiteY3"/>
+              </a:cxn>
+            </a:cxnLst>
+            <a:rect l="l" t="t" r="r" b="b"/>
+            <a:pathLst>
+              <a:path w="2471895" h="823965">
+                <a:moveTo>
+                  <a:pt x="0" y="0"/>
+                </a:moveTo>
+                <a:lnTo>
+                  <a:pt x="0" y="673239"/>
+                </a:lnTo>
+                <a:lnTo>
+                  <a:pt x="100484" y="823965"/>
+                </a:lnTo>
+                <a:lnTo>
+                  <a:pt x="2471895" y="823965"/>
+                </a:lnTo>
+              </a:path>
+            </a:pathLst>
+          </a:custGeom>
+          <a:noFill/>
+          <a:ln w="19050">
+            <a:solidFill>
+              <a:schemeClr val="tx1"/>
+            </a:solidFill>
+            <a:headEnd type="arrow" w="med" len="med"/>
+            <a:tailEnd type="none" w="med" len="med"/>
+          </a:ln>
+        </p:spPr>
+        <p:style>
+          <a:lnRef idx="2">
+            <a:schemeClr val="accent1">
+              <a:shade val="50000"/>
+            </a:schemeClr>
+          </a:lnRef>
+          <a:fillRef idx="1">
+            <a:schemeClr val="accent1"/>
+          </a:fillRef>
+          <a:effectRef idx="0">
+            <a:schemeClr val="accent1"/>
+          </a:effectRef>
+          <a:fontRef idx="minor">
+            <a:schemeClr val="lt1"/>
+          </a:fontRef>
+        </p:style>
+        <p:txBody>
+          <a:bodyPr rtlCol="0" anchor="ctr"/>
+          <a:lstStyle/>
+          <a:p>
+            <a:pPr algn="ctr"/>
+            <a:endParaRPr kumimoji="1" lang="ja-JP" altLang="en-US" sz="1600"/>
+          </a:p>
+        </p:txBody>
+      </p:sp>
+      <p:sp>
+        <p:nvSpPr>
+          <p:cNvPr id="31" name="正方形/長方形 30">
+            <a:extLst>
+              <a:ext uri="{FF2B5EF4-FFF2-40B4-BE49-F238E27FC236}">
+                <a16:creationId xmlns:a16="http://schemas.microsoft.com/office/drawing/2014/main" id="{A165FC1C-03B1-8647-A91B-FDE46CC3979C}"/>
+              </a:ext>
+            </a:extLst>
+          </p:cNvPr>
+          <p:cNvSpPr/>
+          <p:nvPr/>
+        </p:nvSpPr>
+        <p:spPr>
+          <a:xfrm>
+            <a:off x="2033832" y="4658041"/>
+            <a:ext cx="1396722" cy="354388"/>
+          </a:xfrm>
+          <a:prstGeom prst="rect">
+            <a:avLst/>
+          </a:prstGeom>
+          <a:solidFill>
+            <a:schemeClr val="bg1"/>
+          </a:solidFill>
+          <a:ln w="19050">
+            <a:solidFill>
+              <a:schemeClr val="tx1"/>
+            </a:solidFill>
+          </a:ln>
+        </p:spPr>
+        <p:style>
+          <a:lnRef idx="2">
+            <a:schemeClr val="accent1">
+              <a:shade val="50000"/>
+            </a:schemeClr>
+          </a:lnRef>
+          <a:fillRef idx="1">
+            <a:schemeClr val="accent1"/>
+          </a:fillRef>
+          <a:effectRef idx="0">
+            <a:schemeClr val="accent1"/>
+          </a:effectRef>
+          <a:fontRef idx="minor">
+            <a:schemeClr val="lt1"/>
+          </a:fontRef>
+        </p:style>
+        <p:txBody>
+          <a:bodyPr rtlCol="0" anchor="ctr"/>
+          <a:lstStyle/>
+          <a:p>
+            <a:pPr algn="ctr"/>
+            <a:endParaRPr kumimoji="1" lang="ja-JP" altLang="en-US" sz="1600"/>
+          </a:p>
+        </p:txBody>
+      </p:sp>
+      <p:sp>
+        <p:nvSpPr>
+          <p:cNvPr id="33" name="テキスト ボックス 32">
+            <a:extLst>
+              <a:ext uri="{FF2B5EF4-FFF2-40B4-BE49-F238E27FC236}">
+                <a16:creationId xmlns:a16="http://schemas.microsoft.com/office/drawing/2014/main" id="{B77A94D4-E44F-B942-A3F4-495DD132276D}"/>
+              </a:ext>
+            </a:extLst>
+          </p:cNvPr>
+          <p:cNvSpPr txBox="1"/>
+          <p:nvPr/>
+        </p:nvSpPr>
+        <p:spPr>
+          <a:xfrm>
+            <a:off x="2377663" y="4745178"/>
+            <a:ext cx="591829" cy="282303"/>
+          </a:xfrm>
+          <a:prstGeom prst="rect">
+            <a:avLst/>
+          </a:prstGeom>
+          <a:noFill/>
+        </p:spPr>
+        <p:txBody>
+          <a:bodyPr wrap="square" rtlCol="0">
+            <a:spAutoFit/>
+          </a:bodyPr>
+          <a:lstStyle/>
+          <a:p>
+            <a:r>
+              <a:rPr kumimoji="1" lang="en-US" altLang="ja-JP" sz="1400" dirty="0"/>
+              <a:t>PSK</a:t>
+            </a:r>
+            <a:endParaRPr kumimoji="1" lang="ja-JP" altLang="en-US" sz="1400"/>
+          </a:p>
+        </p:txBody>
+      </p:sp>
+      <p:sp>
+        <p:nvSpPr>
+          <p:cNvPr id="34" name="正方形/長方形 33">
+            <a:extLst>
+              <a:ext uri="{FF2B5EF4-FFF2-40B4-BE49-F238E27FC236}">
+                <a16:creationId xmlns:a16="http://schemas.microsoft.com/office/drawing/2014/main" id="{5FAAC5D9-5500-C644-A5D4-4C704DEA93E6}"/>
+              </a:ext>
+            </a:extLst>
+          </p:cNvPr>
+          <p:cNvSpPr/>
+          <p:nvPr/>
+        </p:nvSpPr>
+        <p:spPr>
+          <a:xfrm>
+            <a:off x="9056838" y="4862985"/>
+            <a:ext cx="1396722" cy="331694"/>
+          </a:xfrm>
+          <a:prstGeom prst="rect">
+            <a:avLst/>
+          </a:prstGeom>
+          <a:solidFill>
+            <a:schemeClr val="bg1"/>
+          </a:solidFill>
+          <a:ln w="19050">
+            <a:solidFill>
+              <a:schemeClr val="tx1"/>
+            </a:solidFill>
+          </a:ln>
+        </p:spPr>
+        <p:style>
+          <a:lnRef idx="2">
+            <a:schemeClr val="accent1">
+              <a:shade val="50000"/>
+            </a:schemeClr>
+          </a:lnRef>
+          <a:fillRef idx="1">
+            <a:schemeClr val="accent1"/>
+          </a:fillRef>
+          <a:effectRef idx="0">
+            <a:schemeClr val="accent1"/>
+          </a:effectRef>
+          <a:fontRef idx="minor">
+            <a:schemeClr val="lt1"/>
+          </a:fontRef>
+        </p:style>
+        <p:txBody>
+          <a:bodyPr rtlCol="0" anchor="ctr"/>
+          <a:lstStyle/>
+          <a:p>
+            <a:pPr algn="ctr"/>
+            <a:endParaRPr kumimoji="1" lang="ja-JP" altLang="en-US" sz="1600"/>
+          </a:p>
+        </p:txBody>
+      </p:sp>
+      <p:sp>
+        <p:nvSpPr>
+          <p:cNvPr id="35" name="テキスト ボックス 34">
+            <a:extLst>
+              <a:ext uri="{FF2B5EF4-FFF2-40B4-BE49-F238E27FC236}">
+                <a16:creationId xmlns:a16="http://schemas.microsoft.com/office/drawing/2014/main" id="{C01167D6-9F3B-CE4F-A7B7-E953CBEC1F97}"/>
+              </a:ext>
+            </a:extLst>
+          </p:cNvPr>
+          <p:cNvSpPr txBox="1"/>
+          <p:nvPr/>
+        </p:nvSpPr>
+        <p:spPr>
+          <a:xfrm>
+            <a:off x="9419762" y="4887680"/>
+            <a:ext cx="591829" cy="282303"/>
+          </a:xfrm>
+          <a:prstGeom prst="rect">
+            <a:avLst/>
+          </a:prstGeom>
+          <a:noFill/>
+        </p:spPr>
+        <p:txBody>
+          <a:bodyPr wrap="square" rtlCol="0">
+            <a:spAutoFit/>
+          </a:bodyPr>
+          <a:lstStyle/>
+          <a:p>
+            <a:r>
+              <a:rPr kumimoji="1" lang="en-US" altLang="ja-JP" sz="1400" dirty="0"/>
+              <a:t>PSK</a:t>
+            </a:r>
+            <a:endParaRPr kumimoji="1" lang="ja-JP" altLang="en-US" sz="1400"/>
+          </a:p>
+        </p:txBody>
+      </p:sp>
+      <p:sp>
+        <p:nvSpPr>
+          <p:cNvPr id="8" name="テキスト ボックス 7">
+            <a:extLst>
+              <a:ext uri="{FF2B5EF4-FFF2-40B4-BE49-F238E27FC236}">
+                <a16:creationId xmlns:a16="http://schemas.microsoft.com/office/drawing/2014/main" id="{67267F13-C660-0147-9E8B-49AB435D971B}"/>
+              </a:ext>
+            </a:extLst>
+          </p:cNvPr>
+          <p:cNvSpPr txBox="1"/>
+          <p:nvPr/>
+        </p:nvSpPr>
+        <p:spPr>
+          <a:xfrm>
+            <a:off x="9010779" y="1400837"/>
+            <a:ext cx="2710996" cy="461665"/>
+          </a:xfrm>
+          <a:prstGeom prst="rect">
+            <a:avLst/>
+          </a:prstGeom>
+          <a:solidFill>
+            <a:schemeClr val="bg1"/>
+          </a:solidFill>
+        </p:spPr>
+        <p:txBody>
+          <a:bodyPr wrap="square" rtlCol="0">
+            <a:spAutoFit/>
+          </a:bodyPr>
+          <a:lstStyle/>
+          <a:p>
+            <a:r>
+              <a:rPr kumimoji="1" lang="en-US" altLang="ja-JP" sz="1200" dirty="0"/>
+              <a:t>HKDF(</a:t>
+            </a:r>
+            <a:r>
+              <a:rPr lang="en-US" altLang="ja-JP" sz="1200" dirty="0"/>
+              <a:t>“</a:t>
+            </a:r>
+            <a:r>
+              <a:rPr lang="en-US" altLang="ja-JP" sz="1200" dirty="0" err="1"/>
+              <a:t>resumption_master</a:t>
+            </a:r>
+            <a:r>
+              <a:rPr lang="en-US" altLang="ja-JP" sz="1200" dirty="0"/>
+              <a:t>“</a:t>
+            </a:r>
+            <a:r>
+              <a:rPr kumimoji="1" lang="en-US" altLang="ja-JP" sz="1200" dirty="0"/>
+              <a:t>)</a:t>
+            </a:r>
+          </a:p>
+          <a:p>
+            <a:r>
+              <a:rPr lang="en-US" altLang="ja-JP" sz="1200" dirty="0"/>
+              <a:t>Server side encryption</a:t>
+            </a:r>
+            <a:endParaRPr kumimoji="1" lang="ja-JP" altLang="en-US" sz="1200" dirty="0"/>
+          </a:p>
+        </p:txBody>
+      </p:sp>
+      <p:sp>
+        <p:nvSpPr>
+          <p:cNvPr id="6" name="正方形/長方形 5">
+            <a:extLst>
+              <a:ext uri="{FF2B5EF4-FFF2-40B4-BE49-F238E27FC236}">
+                <a16:creationId xmlns:a16="http://schemas.microsoft.com/office/drawing/2014/main" id="{25FFDC74-D195-E14F-ACA7-0F993576619C}"/>
+              </a:ext>
+            </a:extLst>
+          </p:cNvPr>
+          <p:cNvSpPr/>
+          <p:nvPr/>
+        </p:nvSpPr>
+        <p:spPr>
+          <a:xfrm>
+            <a:off x="8096878" y="2056567"/>
+            <a:ext cx="3245617" cy="467074"/>
+          </a:xfrm>
+          <a:prstGeom prst="rect">
+            <a:avLst/>
+          </a:prstGeom>
+          <a:solidFill>
+            <a:schemeClr val="bg1"/>
+          </a:solidFill>
+          <a:ln w="19050">
+            <a:solidFill>
+              <a:schemeClr val="tx1"/>
+            </a:solidFill>
+          </a:ln>
+        </p:spPr>
+        <p:style>
+          <a:lnRef idx="2">
+            <a:schemeClr val="accent1">
+              <a:shade val="50000"/>
+            </a:schemeClr>
+          </a:lnRef>
+          <a:fillRef idx="1">
+            <a:schemeClr val="accent1"/>
+          </a:fillRef>
+          <a:effectRef idx="0">
+            <a:schemeClr val="accent1"/>
+          </a:effectRef>
+          <a:fontRef idx="minor">
+            <a:schemeClr val="lt1"/>
+          </a:fontRef>
+        </p:style>
+        <p:txBody>
+          <a:bodyPr rtlCol="0" anchor="ctr"/>
+          <a:lstStyle/>
+          <a:p>
+            <a:pPr algn="ctr"/>
+            <a:endParaRPr kumimoji="1" lang="ja-JP" altLang="en-US" sz="1600"/>
+          </a:p>
+        </p:txBody>
+      </p:sp>
+      <p:sp>
+        <p:nvSpPr>
+          <p:cNvPr id="7" name="テキスト ボックス 6">
+            <a:extLst>
+              <a:ext uri="{FF2B5EF4-FFF2-40B4-BE49-F238E27FC236}">
+                <a16:creationId xmlns:a16="http://schemas.microsoft.com/office/drawing/2014/main" id="{F65CC9C4-FCB9-2D46-9861-B60C029A3794}"/>
+              </a:ext>
+            </a:extLst>
+          </p:cNvPr>
+          <p:cNvSpPr txBox="1"/>
+          <p:nvPr/>
+        </p:nvSpPr>
+        <p:spPr>
+          <a:xfrm>
+            <a:off x="8242605" y="2148487"/>
+            <a:ext cx="2758767" cy="307777"/>
+          </a:xfrm>
+          <a:prstGeom prst="rect">
+            <a:avLst/>
+          </a:prstGeom>
+          <a:noFill/>
+        </p:spPr>
+        <p:txBody>
+          <a:bodyPr wrap="square" rtlCol="0">
+            <a:spAutoFit/>
+          </a:bodyPr>
+          <a:lstStyle/>
+          <a:p>
+            <a:r>
+              <a:rPr lang="en-US" altLang="ja-JP" sz="1400" dirty="0"/>
+              <a:t>Resumption Master Secret</a:t>
+            </a:r>
+          </a:p>
+        </p:txBody>
+      </p:sp>
       <p:cxnSp>
         <p:nvCxnSpPr>
           <p:cNvPr id="60" name="直線コネクタ 59">
@@ -9082,7 +9005,7 @@
         </p:nvCxnSpPr>
         <p:spPr>
           <a:xfrm flipH="1">
-            <a:off x="7299804" y="5032687"/>
+            <a:off x="7299804" y="5618479"/>
             <a:ext cx="2728287" cy="0"/>
           </a:xfrm>
           <a:prstGeom prst="line">
@@ -9127,7 +9050,7 @@
         </p:nvCxnSpPr>
         <p:spPr>
           <a:xfrm>
-            <a:off x="2470213" y="5032687"/>
+            <a:off x="2470213" y="5618479"/>
             <a:ext cx="2728287" cy="0"/>
           </a:xfrm>
           <a:prstGeom prst="line">
@@ -9207,7 +9130,7 @@
         </p:nvSpPr>
         <p:spPr>
           <a:xfrm>
-            <a:off x="1299487" y="929844"/>
+            <a:off x="1369139" y="315634"/>
             <a:ext cx="2629305" cy="369332"/>
           </a:xfrm>
           <a:prstGeom prst="rect">
@@ -9227,6 +9150,470 @@
               <a:t>Client</a:t>
             </a:r>
             <a:endParaRPr kumimoji="1" lang="ja-JP" altLang="en-US" b="1" dirty="0"/>
+          </a:p>
+        </p:txBody>
+      </p:sp>
+      <p:cxnSp>
+        <p:nvCxnSpPr>
+          <p:cNvPr id="55" name="直線コネクタ 54">
+            <a:extLst>
+              <a:ext uri="{FF2B5EF4-FFF2-40B4-BE49-F238E27FC236}">
+                <a16:creationId xmlns:a16="http://schemas.microsoft.com/office/drawing/2014/main" id="{05CE6801-55F2-4D64-A495-E42294117886}"/>
+              </a:ext>
+            </a:extLst>
+          </p:cNvPr>
+          <p:cNvCxnSpPr/>
+          <p:nvPr/>
+        </p:nvCxnSpPr>
+        <p:spPr>
+          <a:xfrm>
+            <a:off x="2721421" y="1082774"/>
+            <a:ext cx="0" cy="640689"/>
+          </a:xfrm>
+          <a:prstGeom prst="line">
+            <a:avLst/>
+          </a:prstGeom>
+          <a:ln w="19050">
+            <a:solidFill>
+              <a:schemeClr val="tx1"/>
+            </a:solidFill>
+            <a:headEnd type="none" w="med" len="med"/>
+            <a:tailEnd type="arrow" w="med" len="med"/>
+          </a:ln>
+        </p:spPr>
+        <p:style>
+          <a:lnRef idx="1">
+            <a:schemeClr val="accent1"/>
+          </a:lnRef>
+          <a:fillRef idx="0">
+            <a:schemeClr val="accent1"/>
+          </a:fillRef>
+          <a:effectRef idx="0">
+            <a:schemeClr val="accent1"/>
+          </a:effectRef>
+          <a:fontRef idx="minor">
+            <a:schemeClr val="tx1"/>
+          </a:fontRef>
+        </p:style>
+      </p:cxnSp>
+      <p:sp>
+        <p:nvSpPr>
+          <p:cNvPr id="56" name="テキスト ボックス 55">
+            <a:extLst>
+              <a:ext uri="{FF2B5EF4-FFF2-40B4-BE49-F238E27FC236}">
+                <a16:creationId xmlns:a16="http://schemas.microsoft.com/office/drawing/2014/main" id="{3C4651FD-C04F-4BB8-AFAB-393153D66484}"/>
+              </a:ext>
+            </a:extLst>
+          </p:cNvPr>
+          <p:cNvSpPr txBox="1"/>
+          <p:nvPr/>
+        </p:nvSpPr>
+        <p:spPr>
+          <a:xfrm>
+            <a:off x="1825723" y="1352285"/>
+            <a:ext cx="2710996" cy="276999"/>
+          </a:xfrm>
+          <a:prstGeom prst="rect">
+            <a:avLst/>
+          </a:prstGeom>
+          <a:solidFill>
+            <a:schemeClr val="bg1"/>
+          </a:solidFill>
+        </p:spPr>
+        <p:txBody>
+          <a:bodyPr wrap="square" rtlCol="0">
+            <a:spAutoFit/>
+          </a:bodyPr>
+          <a:lstStyle/>
+          <a:p>
+            <a:r>
+              <a:rPr kumimoji="1" lang="en-US" altLang="ja-JP" sz="1200" dirty="0"/>
+              <a:t>HKDF(</a:t>
+            </a:r>
+            <a:r>
+              <a:rPr lang="en-US" altLang="ja-JP" sz="1200" dirty="0"/>
+              <a:t>“</a:t>
+            </a:r>
+            <a:r>
+              <a:rPr lang="en-US" altLang="ja-JP" sz="1200" dirty="0" err="1"/>
+              <a:t>resumption_master</a:t>
+            </a:r>
+            <a:r>
+              <a:rPr lang="en-US" altLang="ja-JP" sz="1200" dirty="0"/>
+              <a:t>"</a:t>
+            </a:r>
+            <a:r>
+              <a:rPr kumimoji="1" lang="en-US" altLang="ja-JP" sz="1200" dirty="0"/>
+              <a:t>)</a:t>
+            </a:r>
+          </a:p>
+        </p:txBody>
+      </p:sp>
+      <p:sp>
+        <p:nvSpPr>
+          <p:cNvPr id="52" name="正方形/長方形 51">
+            <a:extLst>
+              <a:ext uri="{FF2B5EF4-FFF2-40B4-BE49-F238E27FC236}">
+                <a16:creationId xmlns:a16="http://schemas.microsoft.com/office/drawing/2014/main" id="{97B13C35-942B-4B53-86E6-38C2DD167660}"/>
+              </a:ext>
+            </a:extLst>
+          </p:cNvPr>
+          <p:cNvSpPr/>
+          <p:nvPr/>
+        </p:nvSpPr>
+        <p:spPr>
+          <a:xfrm>
+            <a:off x="1126328" y="786763"/>
+            <a:ext cx="3245617" cy="467073"/>
+          </a:xfrm>
+          <a:prstGeom prst="rect">
+            <a:avLst/>
+          </a:prstGeom>
+          <a:solidFill>
+            <a:schemeClr val="bg1"/>
+          </a:solidFill>
+          <a:ln w="19050">
+            <a:solidFill>
+              <a:schemeClr val="tx1"/>
+            </a:solidFill>
+          </a:ln>
+        </p:spPr>
+        <p:style>
+          <a:lnRef idx="2">
+            <a:schemeClr val="accent1">
+              <a:shade val="50000"/>
+            </a:schemeClr>
+          </a:lnRef>
+          <a:fillRef idx="1">
+            <a:schemeClr val="accent1"/>
+          </a:fillRef>
+          <a:effectRef idx="0">
+            <a:schemeClr val="accent1"/>
+          </a:effectRef>
+          <a:fontRef idx="minor">
+            <a:schemeClr val="lt1"/>
+          </a:fontRef>
+        </p:style>
+        <p:txBody>
+          <a:bodyPr rtlCol="0" anchor="ctr"/>
+          <a:lstStyle/>
+          <a:p>
+            <a:pPr algn="ctr"/>
+            <a:endParaRPr kumimoji="1" lang="ja-JP" altLang="en-US" sz="1600"/>
+          </a:p>
+        </p:txBody>
+      </p:sp>
+      <p:sp>
+        <p:nvSpPr>
+          <p:cNvPr id="53" name="テキスト ボックス 52">
+            <a:extLst>
+              <a:ext uri="{FF2B5EF4-FFF2-40B4-BE49-F238E27FC236}">
+                <a16:creationId xmlns:a16="http://schemas.microsoft.com/office/drawing/2014/main" id="{97CB39D4-BE50-4AEC-8030-CAC2BEB6CED9}"/>
+              </a:ext>
+            </a:extLst>
+          </p:cNvPr>
+          <p:cNvSpPr txBox="1"/>
+          <p:nvPr/>
+        </p:nvSpPr>
+        <p:spPr>
+          <a:xfrm>
+            <a:off x="1676566" y="879004"/>
+            <a:ext cx="2137124" cy="310532"/>
+          </a:xfrm>
+          <a:prstGeom prst="rect">
+            <a:avLst/>
+          </a:prstGeom>
+          <a:solidFill>
+            <a:schemeClr val="bg1"/>
+          </a:solidFill>
+        </p:spPr>
+        <p:txBody>
+          <a:bodyPr wrap="square" rtlCol="0">
+            <a:spAutoFit/>
+          </a:bodyPr>
+          <a:lstStyle/>
+          <a:p>
+            <a:r>
+              <a:rPr kumimoji="1" lang="en-US" altLang="ja-JP" sz="1600" dirty="0"/>
+              <a:t>Pre-master Secret</a:t>
+            </a:r>
+            <a:endParaRPr kumimoji="1" lang="ja-JP" altLang="en-US" sz="1600"/>
+          </a:p>
+        </p:txBody>
+      </p:sp>
+      <p:sp>
+        <p:nvSpPr>
+          <p:cNvPr id="14" name="正方形/長方形 13">
+            <a:extLst>
+              <a:ext uri="{FF2B5EF4-FFF2-40B4-BE49-F238E27FC236}">
+                <a16:creationId xmlns:a16="http://schemas.microsoft.com/office/drawing/2014/main" id="{9477197E-5D68-7646-8F1F-23BF1F2A9316}"/>
+              </a:ext>
+            </a:extLst>
+          </p:cNvPr>
+          <p:cNvSpPr/>
+          <p:nvPr/>
+        </p:nvSpPr>
+        <p:spPr>
+          <a:xfrm>
+            <a:off x="1126328" y="1761068"/>
+            <a:ext cx="3245617" cy="812145"/>
+          </a:xfrm>
+          <a:prstGeom prst="rect">
+            <a:avLst/>
+          </a:prstGeom>
+          <a:solidFill>
+            <a:schemeClr val="bg1"/>
+          </a:solidFill>
+          <a:ln w="19050">
+            <a:solidFill>
+              <a:schemeClr val="tx1"/>
+            </a:solidFill>
+          </a:ln>
+        </p:spPr>
+        <p:style>
+          <a:lnRef idx="2">
+            <a:schemeClr val="accent1">
+              <a:shade val="50000"/>
+            </a:schemeClr>
+          </a:lnRef>
+          <a:fillRef idx="1">
+            <a:schemeClr val="accent1"/>
+          </a:fillRef>
+          <a:effectRef idx="0">
+            <a:schemeClr val="accent1"/>
+          </a:effectRef>
+          <a:fontRef idx="minor">
+            <a:schemeClr val="lt1"/>
+          </a:fontRef>
+        </p:style>
+        <p:txBody>
+          <a:bodyPr rtlCol="0" anchor="ctr"/>
+          <a:lstStyle/>
+          <a:p>
+            <a:pPr algn="ctr"/>
+            <a:endParaRPr kumimoji="1" lang="ja-JP" altLang="en-US" sz="1600"/>
+          </a:p>
+        </p:txBody>
+      </p:sp>
+      <p:sp>
+        <p:nvSpPr>
+          <p:cNvPr id="15" name="テキスト ボックス 14">
+            <a:extLst>
+              <a:ext uri="{FF2B5EF4-FFF2-40B4-BE49-F238E27FC236}">
+                <a16:creationId xmlns:a16="http://schemas.microsoft.com/office/drawing/2014/main" id="{5B655627-D378-5D41-BE6F-C2276B9949BB}"/>
+              </a:ext>
+            </a:extLst>
+          </p:cNvPr>
+          <p:cNvSpPr txBox="1"/>
+          <p:nvPr/>
+        </p:nvSpPr>
+        <p:spPr>
+          <a:xfrm>
+            <a:off x="1319823" y="1820512"/>
+            <a:ext cx="2710999" cy="738664"/>
+          </a:xfrm>
+          <a:prstGeom prst="rect">
+            <a:avLst/>
+          </a:prstGeom>
+          <a:solidFill>
+            <a:schemeClr val="bg1"/>
+          </a:solidFill>
+        </p:spPr>
+        <p:txBody>
+          <a:bodyPr wrap="square" rtlCol="0">
+            <a:spAutoFit/>
+          </a:bodyPr>
+          <a:lstStyle/>
+          <a:p>
+            <a:r>
+              <a:rPr lang="en-US" altLang="ja-JP" sz="1400" dirty="0"/>
+              <a:t>Resumption Master Secret</a:t>
+            </a:r>
+          </a:p>
+          <a:p>
+            <a:endParaRPr lang="en-US" altLang="ja-JP" sz="1400" dirty="0"/>
+          </a:p>
+          <a:p>
+            <a:r>
+              <a:rPr lang="en-US" altLang="ja-JP" sz="1400" dirty="0"/>
+              <a:t>Session Ticket</a:t>
+            </a:r>
+          </a:p>
+        </p:txBody>
+      </p:sp>
+      <p:cxnSp>
+        <p:nvCxnSpPr>
+          <p:cNvPr id="58" name="直線コネクタ 57">
+            <a:extLst>
+              <a:ext uri="{FF2B5EF4-FFF2-40B4-BE49-F238E27FC236}">
+                <a16:creationId xmlns:a16="http://schemas.microsoft.com/office/drawing/2014/main" id="{162E0169-D2CE-4C38-8156-375C32403FF9}"/>
+              </a:ext>
+            </a:extLst>
+          </p:cNvPr>
+          <p:cNvCxnSpPr>
+            <a:cxnSpLocks/>
+          </p:cNvCxnSpPr>
+          <p:nvPr/>
+        </p:nvCxnSpPr>
+        <p:spPr>
+          <a:xfrm>
+            <a:off x="1078361" y="2165660"/>
+            <a:ext cx="3245131" cy="0"/>
+          </a:xfrm>
+          <a:prstGeom prst="line">
+            <a:avLst/>
+          </a:prstGeom>
+          <a:ln w="19050">
+            <a:solidFill>
+              <a:schemeClr val="tx1"/>
+            </a:solidFill>
+            <a:prstDash val="dash"/>
+          </a:ln>
+        </p:spPr>
+        <p:style>
+          <a:lnRef idx="1">
+            <a:schemeClr val="accent1"/>
+          </a:lnRef>
+          <a:fillRef idx="0">
+            <a:schemeClr val="accent1"/>
+          </a:fillRef>
+          <a:effectRef idx="0">
+            <a:schemeClr val="accent1"/>
+          </a:effectRef>
+          <a:fontRef idx="minor">
+            <a:schemeClr val="tx1"/>
+          </a:fontRef>
+        </p:style>
+      </p:cxnSp>
+      <p:sp>
+        <p:nvSpPr>
+          <p:cNvPr id="59" name="テキスト ボックス 58">
+            <a:extLst>
+              <a:ext uri="{FF2B5EF4-FFF2-40B4-BE49-F238E27FC236}">
+                <a16:creationId xmlns:a16="http://schemas.microsoft.com/office/drawing/2014/main" id="{F632FC60-2D5A-4FD2-8B5E-CBCF3DFCFA76}"/>
+              </a:ext>
+            </a:extLst>
+          </p:cNvPr>
+          <p:cNvSpPr txBox="1"/>
+          <p:nvPr/>
+        </p:nvSpPr>
+        <p:spPr>
+          <a:xfrm>
+            <a:off x="9518422" y="3427245"/>
+            <a:ext cx="2710996" cy="276999"/>
+          </a:xfrm>
+          <a:prstGeom prst="rect">
+            <a:avLst/>
+          </a:prstGeom>
+          <a:noFill/>
+        </p:spPr>
+        <p:txBody>
+          <a:bodyPr wrap="square" rtlCol="0">
+            <a:spAutoFit/>
+          </a:bodyPr>
+          <a:lstStyle/>
+          <a:p>
+            <a:r>
+              <a:rPr lang="en-US" altLang="ja-JP" sz="1200" dirty="0"/>
+              <a:t>Server side decryption</a:t>
+            </a:r>
+            <a:endParaRPr kumimoji="1" lang="ja-JP" altLang="en-US" sz="1200" dirty="0"/>
+          </a:p>
+        </p:txBody>
+      </p:sp>
+      <p:sp>
+        <p:nvSpPr>
+          <p:cNvPr id="61" name="正方形/長方形 60">
+            <a:extLst>
+              <a:ext uri="{FF2B5EF4-FFF2-40B4-BE49-F238E27FC236}">
+                <a16:creationId xmlns:a16="http://schemas.microsoft.com/office/drawing/2014/main" id="{7DE86CFB-ECDF-4CBC-8EA1-3F01064D1A24}"/>
+              </a:ext>
+            </a:extLst>
+          </p:cNvPr>
+          <p:cNvSpPr/>
+          <p:nvPr/>
+        </p:nvSpPr>
+        <p:spPr>
+          <a:xfrm>
+            <a:off x="8148554" y="3836089"/>
+            <a:ext cx="3245617" cy="467074"/>
+          </a:xfrm>
+          <a:prstGeom prst="rect">
+            <a:avLst/>
+          </a:prstGeom>
+          <a:solidFill>
+            <a:schemeClr val="bg1"/>
+          </a:solidFill>
+          <a:ln w="19050">
+            <a:solidFill>
+              <a:schemeClr val="tx1"/>
+            </a:solidFill>
+          </a:ln>
+        </p:spPr>
+        <p:style>
+          <a:lnRef idx="2">
+            <a:schemeClr val="accent1">
+              <a:shade val="50000"/>
+            </a:schemeClr>
+          </a:lnRef>
+          <a:fillRef idx="1">
+            <a:schemeClr val="accent1"/>
+          </a:fillRef>
+          <a:effectRef idx="0">
+            <a:schemeClr val="accent1"/>
+          </a:effectRef>
+          <a:fontRef idx="minor">
+            <a:schemeClr val="lt1"/>
+          </a:fontRef>
+        </p:style>
+        <p:txBody>
+          <a:bodyPr rtlCol="0" anchor="ctr"/>
+          <a:lstStyle/>
+          <a:p>
+            <a:pPr algn="ctr"/>
+            <a:endParaRPr kumimoji="1" lang="ja-JP" altLang="en-US" sz="1600"/>
+          </a:p>
+        </p:txBody>
+      </p:sp>
+      <p:sp>
+        <p:nvSpPr>
+          <p:cNvPr id="63" name="テキスト ボックス 62">
+            <a:extLst>
+              <a:ext uri="{FF2B5EF4-FFF2-40B4-BE49-F238E27FC236}">
+                <a16:creationId xmlns:a16="http://schemas.microsoft.com/office/drawing/2014/main" id="{1C01FA61-2105-47C0-8EA4-037F44F9C8F6}"/>
+              </a:ext>
+            </a:extLst>
+          </p:cNvPr>
+          <p:cNvSpPr txBox="1"/>
+          <p:nvPr/>
+        </p:nvSpPr>
+        <p:spPr>
+          <a:xfrm>
+            <a:off x="8294281" y="3856569"/>
+            <a:ext cx="2758767" cy="523220"/>
+          </a:xfrm>
+          <a:prstGeom prst="rect">
+            <a:avLst/>
+          </a:prstGeom>
+          <a:noFill/>
+        </p:spPr>
+        <p:txBody>
+          <a:bodyPr wrap="square" rtlCol="0">
+            <a:spAutoFit/>
+          </a:bodyPr>
+          <a:lstStyle/>
+          <a:p>
+            <a:r>
+              <a:rPr lang="en-US" altLang="ja-JP" sz="1400" dirty="0"/>
+              <a:t>Resumption Master Secret</a:t>
+            </a:r>
+          </a:p>
+          <a:p>
+            <a:r>
+              <a:rPr kumimoji="1" lang="en-US" altLang="ja-JP" sz="1400" dirty="0"/>
+              <a:t>Ticket Nonce</a:t>
+            </a:r>
+            <a:endParaRPr kumimoji="1" lang="ja-JP" altLang="en-US" sz="1400" dirty="0"/>
           </a:p>
         </p:txBody>
       </p:sp>

</xml_diff>